<commit_message>
fix latest chapters of microvg
</commit_message>
<xml_diff>
--- a/VEEPortingGuide/images/vgLL.pptx
+++ b/VEEPortingGuide/images/vgLL.pptx
@@ -204,7 +204,7 @@
           <a:p>
             <a:fld id="{F47202D6-4449-4ABC-9430-570B72DCED4F}" type="datetimeFigureOut">
               <a:rPr lang="en-US" smtClean="0"/>
-              <a:t>23/06/02</a:t>
+              <a:t>23/06/05</a:t>
             </a:fld>
             <a:endParaRPr lang="en-US"/>
           </a:p>
@@ -956,7 +956,7 @@
           <a:p>
             <a:fld id="{4E285625-C24A-4341-90BC-6CD71F835625}" type="datetimeFigureOut">
               <a:rPr lang="en-GB" smtClean="0"/>
-              <a:t>02/06/2023</a:t>
+              <a:t>05/06/2023</a:t>
             </a:fld>
             <a:endParaRPr lang="en-GB"/>
           </a:p>
@@ -1156,7 +1156,7 @@
           <a:p>
             <a:fld id="{4E285625-C24A-4341-90BC-6CD71F835625}" type="datetimeFigureOut">
               <a:rPr lang="en-GB" smtClean="0"/>
-              <a:t>02/06/2023</a:t>
+              <a:t>05/06/2023</a:t>
             </a:fld>
             <a:endParaRPr lang="en-GB"/>
           </a:p>
@@ -1366,7 +1366,7 @@
           <a:p>
             <a:fld id="{4E285625-C24A-4341-90BC-6CD71F835625}" type="datetimeFigureOut">
               <a:rPr lang="en-GB" smtClean="0"/>
-              <a:t>02/06/2023</a:t>
+              <a:t>05/06/2023</a:t>
             </a:fld>
             <a:endParaRPr lang="en-GB"/>
           </a:p>
@@ -1566,7 +1566,7 @@
           <a:p>
             <a:fld id="{4E285625-C24A-4341-90BC-6CD71F835625}" type="datetimeFigureOut">
               <a:rPr lang="en-GB" smtClean="0"/>
-              <a:t>02/06/2023</a:t>
+              <a:t>05/06/2023</a:t>
             </a:fld>
             <a:endParaRPr lang="en-GB"/>
           </a:p>
@@ -1842,7 +1842,7 @@
           <a:p>
             <a:fld id="{4E285625-C24A-4341-90BC-6CD71F835625}" type="datetimeFigureOut">
               <a:rPr lang="en-GB" smtClean="0"/>
-              <a:t>02/06/2023</a:t>
+              <a:t>05/06/2023</a:t>
             </a:fld>
             <a:endParaRPr lang="en-GB"/>
           </a:p>
@@ -2110,7 +2110,7 @@
           <a:p>
             <a:fld id="{4E285625-C24A-4341-90BC-6CD71F835625}" type="datetimeFigureOut">
               <a:rPr lang="en-GB" smtClean="0"/>
-              <a:t>02/06/2023</a:t>
+              <a:t>05/06/2023</a:t>
             </a:fld>
             <a:endParaRPr lang="en-GB"/>
           </a:p>
@@ -2525,7 +2525,7 @@
           <a:p>
             <a:fld id="{4E285625-C24A-4341-90BC-6CD71F835625}" type="datetimeFigureOut">
               <a:rPr lang="en-GB" smtClean="0"/>
-              <a:t>02/06/2023</a:t>
+              <a:t>05/06/2023</a:t>
             </a:fld>
             <a:endParaRPr lang="en-GB"/>
           </a:p>
@@ -2667,7 +2667,7 @@
           <a:p>
             <a:fld id="{4E285625-C24A-4341-90BC-6CD71F835625}" type="datetimeFigureOut">
               <a:rPr lang="en-GB" smtClean="0"/>
-              <a:t>02/06/2023</a:t>
+              <a:t>05/06/2023</a:t>
             </a:fld>
             <a:endParaRPr lang="en-GB"/>
           </a:p>
@@ -2780,7 +2780,7 @@
           <a:p>
             <a:fld id="{4E285625-C24A-4341-90BC-6CD71F835625}" type="datetimeFigureOut">
               <a:rPr lang="en-GB" smtClean="0"/>
-              <a:t>02/06/2023</a:t>
+              <a:t>05/06/2023</a:t>
             </a:fld>
             <a:endParaRPr lang="en-GB"/>
           </a:p>
@@ -3093,7 +3093,7 @@
           <a:p>
             <a:fld id="{4E285625-C24A-4341-90BC-6CD71F835625}" type="datetimeFigureOut">
               <a:rPr lang="en-GB" smtClean="0"/>
-              <a:t>02/06/2023</a:t>
+              <a:t>05/06/2023</a:t>
             </a:fld>
             <a:endParaRPr lang="en-GB"/>
           </a:p>
@@ -3382,7 +3382,7 @@
           <a:p>
             <a:fld id="{4E285625-C24A-4341-90BC-6CD71F835625}" type="datetimeFigureOut">
               <a:rPr lang="en-GB" smtClean="0"/>
-              <a:t>02/06/2023</a:t>
+              <a:t>05/06/2023</a:t>
             </a:fld>
             <a:endParaRPr lang="en-GB"/>
           </a:p>
@@ -3625,7 +3625,7 @@
           <a:p>
             <a:fld id="{4E285625-C24A-4341-90BC-6CD71F835625}" type="datetimeFigureOut">
               <a:rPr lang="en-GB" smtClean="0"/>
-              <a:t>02/06/2023</a:t>
+              <a:t>05/06/2023</a:t>
             </a:fld>
             <a:endParaRPr lang="en-GB"/>
           </a:p>
@@ -15260,10 +15260,10 @@
       </p:grpSpPr>
       <p:sp>
         <p:nvSpPr>
-          <p:cNvPr id="4" name="Rounded Rectangle 62">
+          <p:cNvPr id="93" name="Rounded Rectangle 62">
             <a:extLst>
               <a:ext uri="{FF2B5EF4-FFF2-40B4-BE49-F238E27FC236}">
-                <a16:creationId xmlns:a16="http://schemas.microsoft.com/office/drawing/2014/main" id="{AA9A0801-3292-173F-A4DC-91210479254F}"/>
+                <a16:creationId xmlns:a16="http://schemas.microsoft.com/office/drawing/2014/main" id="{466DC2D3-0BA1-595F-6742-7D30999FEC65}"/>
               </a:ext>
             </a:extLst>
           </p:cNvPr>
@@ -15351,164 +15351,6 @@
               <a:rPr lang="en-US" sz="1200" dirty="0"/>
               <a:t>UI Pack</a:t>
             </a:r>
-          </a:p>
-        </p:txBody>
-      </p:sp>
-      <p:sp>
-        <p:nvSpPr>
-          <p:cNvPr id="10" name="Rounded Rectangle 19">
-            <a:extLst>
-              <a:ext uri="{FF2B5EF4-FFF2-40B4-BE49-F238E27FC236}">
-                <a16:creationId xmlns:a16="http://schemas.microsoft.com/office/drawing/2014/main" id="{7BE5A21C-B0B5-1A1F-CE65-55BE61AF62B5}"/>
-              </a:ext>
-            </a:extLst>
-          </p:cNvPr>
-          <p:cNvSpPr/>
-          <p:nvPr/>
-        </p:nvSpPr>
-        <p:spPr>
-          <a:xfrm>
-            <a:off x="291036" y="5421846"/>
-            <a:ext cx="1645920" cy="288000"/>
-          </a:xfrm>
-          <a:prstGeom prst="roundRect">
-            <a:avLst/>
-          </a:prstGeom>
-          <a:solidFill>
-            <a:srgbClr val="6CC24A"/>
-          </a:solidFill>
-          <a:ln>
-            <a:noFill/>
-          </a:ln>
-        </p:spPr>
-        <p:style>
-          <a:lnRef idx="2">
-            <a:schemeClr val="accent1">
-              <a:shade val="50000"/>
-            </a:schemeClr>
-          </a:lnRef>
-          <a:fillRef idx="1">
-            <a:schemeClr val="accent1"/>
-          </a:fillRef>
-          <a:effectRef idx="0">
-            <a:schemeClr val="accent1"/>
-          </a:effectRef>
-          <a:fontRef idx="minor">
-            <a:schemeClr val="lt1"/>
-          </a:fontRef>
-        </p:style>
-        <p:txBody>
-          <a:bodyPr rtlCol="0" anchor="ctr"/>
-          <a:lstStyle>
-            <a:defPPr>
-              <a:defRPr lang="en-US"/>
-            </a:defPPr>
-            <a:lvl1pPr marL="0" algn="l" defTabSz="914377" rtl="0" eaLnBrk="1" latinLnBrk="0" hangingPunct="1">
-              <a:defRPr sz="1800" kern="1200">
-                <a:solidFill>
-                  <a:schemeClr val="lt1"/>
-                </a:solidFill>
-                <a:latin typeface="+mn-lt"/>
-                <a:ea typeface="+mn-ea"/>
-                <a:cs typeface="+mn-cs"/>
-              </a:defRPr>
-            </a:lvl1pPr>
-            <a:lvl2pPr marL="457189" algn="l" defTabSz="914377" rtl="0" eaLnBrk="1" latinLnBrk="0" hangingPunct="1">
-              <a:defRPr sz="1800" kern="1200">
-                <a:solidFill>
-                  <a:schemeClr val="lt1"/>
-                </a:solidFill>
-                <a:latin typeface="+mn-lt"/>
-                <a:ea typeface="+mn-ea"/>
-                <a:cs typeface="+mn-cs"/>
-              </a:defRPr>
-            </a:lvl2pPr>
-            <a:lvl3pPr marL="914377" algn="l" defTabSz="914377" rtl="0" eaLnBrk="1" latinLnBrk="0" hangingPunct="1">
-              <a:defRPr sz="1800" kern="1200">
-                <a:solidFill>
-                  <a:schemeClr val="lt1"/>
-                </a:solidFill>
-                <a:latin typeface="+mn-lt"/>
-                <a:ea typeface="+mn-ea"/>
-                <a:cs typeface="+mn-cs"/>
-              </a:defRPr>
-            </a:lvl3pPr>
-            <a:lvl4pPr marL="1371566" algn="l" defTabSz="914377" rtl="0" eaLnBrk="1" latinLnBrk="0" hangingPunct="1">
-              <a:defRPr sz="1800" kern="1200">
-                <a:solidFill>
-                  <a:schemeClr val="lt1"/>
-                </a:solidFill>
-                <a:latin typeface="+mn-lt"/>
-                <a:ea typeface="+mn-ea"/>
-                <a:cs typeface="+mn-cs"/>
-              </a:defRPr>
-            </a:lvl4pPr>
-            <a:lvl5pPr marL="1828754" algn="l" defTabSz="914377" rtl="0" eaLnBrk="1" latinLnBrk="0" hangingPunct="1">
-              <a:defRPr sz="1800" kern="1200">
-                <a:solidFill>
-                  <a:schemeClr val="lt1"/>
-                </a:solidFill>
-                <a:latin typeface="+mn-lt"/>
-                <a:ea typeface="+mn-ea"/>
-                <a:cs typeface="+mn-cs"/>
-              </a:defRPr>
-            </a:lvl5pPr>
-            <a:lvl6pPr marL="2285943" algn="l" defTabSz="914377" rtl="0" eaLnBrk="1" latinLnBrk="0" hangingPunct="1">
-              <a:defRPr sz="1800" kern="1200">
-                <a:solidFill>
-                  <a:schemeClr val="lt1"/>
-                </a:solidFill>
-                <a:latin typeface="+mn-lt"/>
-                <a:ea typeface="+mn-ea"/>
-                <a:cs typeface="+mn-cs"/>
-              </a:defRPr>
-            </a:lvl6pPr>
-            <a:lvl7pPr marL="2743131" algn="l" defTabSz="914377" rtl="0" eaLnBrk="1" latinLnBrk="0" hangingPunct="1">
-              <a:defRPr sz="1800" kern="1200">
-                <a:solidFill>
-                  <a:schemeClr val="lt1"/>
-                </a:solidFill>
-                <a:latin typeface="+mn-lt"/>
-                <a:ea typeface="+mn-ea"/>
-                <a:cs typeface="+mn-cs"/>
-              </a:defRPr>
-            </a:lvl7pPr>
-            <a:lvl8pPr marL="3200320" algn="l" defTabSz="914377" rtl="0" eaLnBrk="1" latinLnBrk="0" hangingPunct="1">
-              <a:defRPr sz="1800" kern="1200">
-                <a:solidFill>
-                  <a:schemeClr val="lt1"/>
-                </a:solidFill>
-                <a:latin typeface="+mn-lt"/>
-                <a:ea typeface="+mn-ea"/>
-                <a:cs typeface="+mn-cs"/>
-              </a:defRPr>
-            </a:lvl8pPr>
-            <a:lvl9pPr marL="3657509" algn="l" defTabSz="914377" rtl="0" eaLnBrk="1" latinLnBrk="0" hangingPunct="1">
-              <a:defRPr sz="1800" kern="1200">
-                <a:solidFill>
-                  <a:schemeClr val="lt1"/>
-                </a:solidFill>
-                <a:latin typeface="+mn-lt"/>
-                <a:ea typeface="+mn-ea"/>
-                <a:cs typeface="+mn-cs"/>
-              </a:defRPr>
-            </a:lvl9pPr>
-          </a:lstStyle>
-          <a:p>
-            <a:pPr algn="ctr"/>
-            <a:r>
-              <a:rPr lang="en-US" sz="1200" dirty="0" err="1">
-                <a:solidFill>
-                  <a:schemeClr val="bg1"/>
-                </a:solidFill>
-              </a:rPr>
-              <a:t>ui_drawing.h</a:t>
-            </a:r>
-            <a:endParaRPr lang="en-US" sz="1200" dirty="0">
-              <a:solidFill>
-                <a:schemeClr val="bg1"/>
-              </a:solidFill>
-            </a:endParaRPr>
           </a:p>
         </p:txBody>
       </p:sp>
@@ -15684,8 +15526,8 @@
         </p:nvSpPr>
         <p:spPr>
           <a:xfrm>
-            <a:off x="2264121" y="4932758"/>
-            <a:ext cx="1887202" cy="502936"/>
+            <a:off x="2679767" y="3958296"/>
+            <a:ext cx="3791850" cy="502936"/>
           </a:xfrm>
           <a:prstGeom prst="roundRect">
             <a:avLst>
@@ -15748,7 +15590,7 @@
         </p:nvSpPr>
         <p:spPr>
           <a:xfrm>
-            <a:off x="2259463" y="4628542"/>
+            <a:off x="2675110" y="3654080"/>
             <a:ext cx="1325106" cy="276999"/>
           </a:xfrm>
           <a:prstGeom prst="rect">
@@ -15787,7 +15629,7 @@
         </p:nvSpPr>
         <p:spPr>
           <a:xfrm>
-            <a:off x="2384762" y="5019396"/>
+            <a:off x="2800409" y="4044934"/>
             <a:ext cx="1645920" cy="288000"/>
           </a:xfrm>
           <a:prstGeom prst="roundRect">
@@ -15946,7 +15788,7 @@
         <p:spPr>
           <a:xfrm>
             <a:off x="115315" y="1517748"/>
-            <a:ext cx="1997363" cy="2747372"/>
+            <a:ext cx="1997363" cy="2501518"/>
           </a:xfrm>
           <a:prstGeom prst="roundRect">
             <a:avLst>
@@ -16199,8 +16041,8 @@
         </p:nvSpPr>
         <p:spPr>
           <a:xfrm>
-            <a:off x="291036" y="3292165"/>
-            <a:ext cx="1645920" cy="346952"/>
+            <a:off x="291036" y="3186358"/>
+            <a:ext cx="1645920" cy="293120"/>
           </a:xfrm>
           <a:prstGeom prst="roundRect">
             <a:avLst/>
@@ -16328,25 +16170,14 @@
           <a:p>
             <a:pPr algn="ctr"/>
             <a:r>
-              <a:rPr lang="en-US" sz="1100" dirty="0">
+              <a:rPr lang="en-US" sz="1200" dirty="0" err="1">
                 <a:solidFill>
                   <a:schemeClr val="bg1"/>
                 </a:solidFill>
               </a:rPr>
-              <a:t>LLVG_PATH_PAINTER_</a:t>
+              <a:t>LLVG_PAINTER_impl.h</a:t>
             </a:r>
-          </a:p>
-          <a:p>
-            <a:pPr algn="ctr"/>
-            <a:r>
-              <a:rPr lang="en-US" sz="1100" dirty="0" err="1">
-                <a:solidFill>
-                  <a:schemeClr val="bg1"/>
-                </a:solidFill>
-              </a:rPr>
-              <a:t>impl.h</a:t>
-            </a:r>
-            <a:endParaRPr lang="en-US" sz="1100" dirty="0">
+            <a:endParaRPr lang="en-US" sz="1200" dirty="0">
               <a:solidFill>
                 <a:schemeClr val="bg1"/>
               </a:solidFill>
@@ -16830,175 +16661,6 @@
       </p:sp>
       <p:sp>
         <p:nvSpPr>
-          <p:cNvPr id="35" name="Rounded Rectangle 17">
-            <a:extLst>
-              <a:ext uri="{FF2B5EF4-FFF2-40B4-BE49-F238E27FC236}">
-                <a16:creationId xmlns:a16="http://schemas.microsoft.com/office/drawing/2014/main" id="{964A3335-D84B-24E2-E127-1840C1931814}"/>
-              </a:ext>
-            </a:extLst>
-          </p:cNvPr>
-          <p:cNvSpPr/>
-          <p:nvPr/>
-        </p:nvSpPr>
-        <p:spPr>
-          <a:xfrm>
-            <a:off x="291036" y="3716361"/>
-            <a:ext cx="1645920" cy="374130"/>
-          </a:xfrm>
-          <a:prstGeom prst="roundRect">
-            <a:avLst/>
-          </a:prstGeom>
-          <a:solidFill>
-            <a:srgbClr val="6CC24A"/>
-          </a:solidFill>
-          <a:ln>
-            <a:noFill/>
-          </a:ln>
-        </p:spPr>
-        <p:style>
-          <a:lnRef idx="2">
-            <a:schemeClr val="accent1">
-              <a:shade val="50000"/>
-            </a:schemeClr>
-          </a:lnRef>
-          <a:fillRef idx="1">
-            <a:schemeClr val="accent1"/>
-          </a:fillRef>
-          <a:effectRef idx="0">
-            <a:schemeClr val="accent1"/>
-          </a:effectRef>
-          <a:fontRef idx="minor">
-            <a:schemeClr val="lt1"/>
-          </a:fontRef>
-        </p:style>
-        <p:txBody>
-          <a:bodyPr rtlCol="0" anchor="ctr"/>
-          <a:lstStyle>
-            <a:defPPr>
-              <a:defRPr lang="en-US"/>
-            </a:defPPr>
-            <a:lvl1pPr marL="0" algn="l" defTabSz="914377" rtl="0" eaLnBrk="1" latinLnBrk="0" hangingPunct="1">
-              <a:defRPr sz="1800" kern="1200">
-                <a:solidFill>
-                  <a:schemeClr val="lt1"/>
-                </a:solidFill>
-                <a:latin typeface="+mn-lt"/>
-                <a:ea typeface="+mn-ea"/>
-                <a:cs typeface="+mn-cs"/>
-              </a:defRPr>
-            </a:lvl1pPr>
-            <a:lvl2pPr marL="457189" algn="l" defTabSz="914377" rtl="0" eaLnBrk="1" latinLnBrk="0" hangingPunct="1">
-              <a:defRPr sz="1800" kern="1200">
-                <a:solidFill>
-                  <a:schemeClr val="lt1"/>
-                </a:solidFill>
-                <a:latin typeface="+mn-lt"/>
-                <a:ea typeface="+mn-ea"/>
-                <a:cs typeface="+mn-cs"/>
-              </a:defRPr>
-            </a:lvl2pPr>
-            <a:lvl3pPr marL="914377" algn="l" defTabSz="914377" rtl="0" eaLnBrk="1" latinLnBrk="0" hangingPunct="1">
-              <a:defRPr sz="1800" kern="1200">
-                <a:solidFill>
-                  <a:schemeClr val="lt1"/>
-                </a:solidFill>
-                <a:latin typeface="+mn-lt"/>
-                <a:ea typeface="+mn-ea"/>
-                <a:cs typeface="+mn-cs"/>
-              </a:defRPr>
-            </a:lvl3pPr>
-            <a:lvl4pPr marL="1371566" algn="l" defTabSz="914377" rtl="0" eaLnBrk="1" latinLnBrk="0" hangingPunct="1">
-              <a:defRPr sz="1800" kern="1200">
-                <a:solidFill>
-                  <a:schemeClr val="lt1"/>
-                </a:solidFill>
-                <a:latin typeface="+mn-lt"/>
-                <a:ea typeface="+mn-ea"/>
-                <a:cs typeface="+mn-cs"/>
-              </a:defRPr>
-            </a:lvl4pPr>
-            <a:lvl5pPr marL="1828754" algn="l" defTabSz="914377" rtl="0" eaLnBrk="1" latinLnBrk="0" hangingPunct="1">
-              <a:defRPr sz="1800" kern="1200">
-                <a:solidFill>
-                  <a:schemeClr val="lt1"/>
-                </a:solidFill>
-                <a:latin typeface="+mn-lt"/>
-                <a:ea typeface="+mn-ea"/>
-                <a:cs typeface="+mn-cs"/>
-              </a:defRPr>
-            </a:lvl5pPr>
-            <a:lvl6pPr marL="2285943" algn="l" defTabSz="914377" rtl="0" eaLnBrk="1" latinLnBrk="0" hangingPunct="1">
-              <a:defRPr sz="1800" kern="1200">
-                <a:solidFill>
-                  <a:schemeClr val="lt1"/>
-                </a:solidFill>
-                <a:latin typeface="+mn-lt"/>
-                <a:ea typeface="+mn-ea"/>
-                <a:cs typeface="+mn-cs"/>
-              </a:defRPr>
-            </a:lvl6pPr>
-            <a:lvl7pPr marL="2743131" algn="l" defTabSz="914377" rtl="0" eaLnBrk="1" latinLnBrk="0" hangingPunct="1">
-              <a:defRPr sz="1800" kern="1200">
-                <a:solidFill>
-                  <a:schemeClr val="lt1"/>
-                </a:solidFill>
-                <a:latin typeface="+mn-lt"/>
-                <a:ea typeface="+mn-ea"/>
-                <a:cs typeface="+mn-cs"/>
-              </a:defRPr>
-            </a:lvl7pPr>
-            <a:lvl8pPr marL="3200320" algn="l" defTabSz="914377" rtl="0" eaLnBrk="1" latinLnBrk="0" hangingPunct="1">
-              <a:defRPr sz="1800" kern="1200">
-                <a:solidFill>
-                  <a:schemeClr val="lt1"/>
-                </a:solidFill>
-                <a:latin typeface="+mn-lt"/>
-                <a:ea typeface="+mn-ea"/>
-                <a:cs typeface="+mn-cs"/>
-              </a:defRPr>
-            </a:lvl8pPr>
-            <a:lvl9pPr marL="3657509" algn="l" defTabSz="914377" rtl="0" eaLnBrk="1" latinLnBrk="0" hangingPunct="1">
-              <a:defRPr sz="1800" kern="1200">
-                <a:solidFill>
-                  <a:schemeClr val="lt1"/>
-                </a:solidFill>
-                <a:latin typeface="+mn-lt"/>
-                <a:ea typeface="+mn-ea"/>
-                <a:cs typeface="+mn-cs"/>
-              </a:defRPr>
-            </a:lvl9pPr>
-          </a:lstStyle>
-          <a:p>
-            <a:pPr algn="ctr"/>
-            <a:r>
-              <a:rPr lang="en-US" sz="1100" dirty="0">
-                <a:solidFill>
-                  <a:schemeClr val="bg1"/>
-                </a:solidFill>
-              </a:rPr>
-              <a:t>LLVG_FONT_PAINTER_</a:t>
-            </a:r>
-          </a:p>
-          <a:p>
-            <a:pPr algn="ctr"/>
-            <a:r>
-              <a:rPr lang="en-US" sz="1100" dirty="0" err="1">
-                <a:solidFill>
-                  <a:schemeClr val="bg1"/>
-                </a:solidFill>
-              </a:rPr>
-              <a:t>impl.h</a:t>
-            </a:r>
-            <a:endParaRPr lang="en-US" sz="1100" dirty="0">
-              <a:solidFill>
-                <a:schemeClr val="bg1"/>
-              </a:solidFill>
-            </a:endParaRPr>
-          </a:p>
-        </p:txBody>
-      </p:sp>
-      <p:sp>
-        <p:nvSpPr>
           <p:cNvPr id="36" name="Rounded Rectangle 62">
             <a:extLst>
               <a:ext uri="{FF2B5EF4-FFF2-40B4-BE49-F238E27FC236}">
@@ -17012,7 +16674,7 @@
         <p:spPr>
           <a:xfrm>
             <a:off x="2659564" y="1517748"/>
-            <a:ext cx="3828088" cy="1773065"/>
+            <a:ext cx="3828088" cy="2023195"/>
           </a:xfrm>
           <a:prstGeom prst="roundRect">
             <a:avLst>
@@ -18062,8 +17724,8 @@
         </p:nvSpPr>
         <p:spPr>
           <a:xfrm>
-            <a:off x="7075521" y="3059572"/>
-            <a:ext cx="1887202" cy="1203941"/>
+            <a:off x="7163881" y="2587551"/>
+            <a:ext cx="1887202" cy="1916123"/>
           </a:xfrm>
           <a:prstGeom prst="roundRect">
             <a:avLst>
@@ -18126,7 +17788,7 @@
         </p:nvSpPr>
         <p:spPr>
           <a:xfrm>
-            <a:off x="7075521" y="2804402"/>
+            <a:off x="7162420" y="2302633"/>
             <a:ext cx="1824667" cy="276999"/>
           </a:xfrm>
           <a:prstGeom prst="rect">
@@ -18165,7 +17827,165 @@
         </p:nvSpPr>
         <p:spPr>
           <a:xfrm>
-            <a:off x="7196162" y="3292165"/>
+            <a:off x="7284522" y="2737224"/>
+            <a:ext cx="1645920" cy="288000"/>
+          </a:xfrm>
+          <a:prstGeom prst="roundRect">
+            <a:avLst/>
+          </a:prstGeom>
+          <a:solidFill>
+            <a:srgbClr val="00AEC7"/>
+          </a:solidFill>
+          <a:ln>
+            <a:noFill/>
+          </a:ln>
+        </p:spPr>
+        <p:style>
+          <a:lnRef idx="2">
+            <a:schemeClr val="accent1">
+              <a:shade val="50000"/>
+            </a:schemeClr>
+          </a:lnRef>
+          <a:fillRef idx="1">
+            <a:schemeClr val="accent1"/>
+          </a:fillRef>
+          <a:effectRef idx="0">
+            <a:schemeClr val="accent1"/>
+          </a:effectRef>
+          <a:fontRef idx="minor">
+            <a:schemeClr val="lt1"/>
+          </a:fontRef>
+        </p:style>
+        <p:txBody>
+          <a:bodyPr rtlCol="0" anchor="ctr"/>
+          <a:lstStyle>
+            <a:defPPr>
+              <a:defRPr lang="en-US"/>
+            </a:defPPr>
+            <a:lvl1pPr marL="0" algn="l" defTabSz="914377" rtl="0" eaLnBrk="1" latinLnBrk="0" hangingPunct="1">
+              <a:defRPr sz="1800" kern="1200">
+                <a:solidFill>
+                  <a:schemeClr val="lt1"/>
+                </a:solidFill>
+                <a:latin typeface="+mn-lt"/>
+                <a:ea typeface="+mn-ea"/>
+                <a:cs typeface="+mn-cs"/>
+              </a:defRPr>
+            </a:lvl1pPr>
+            <a:lvl2pPr marL="457189" algn="l" defTabSz="914377" rtl="0" eaLnBrk="1" latinLnBrk="0" hangingPunct="1">
+              <a:defRPr sz="1800" kern="1200">
+                <a:solidFill>
+                  <a:schemeClr val="lt1"/>
+                </a:solidFill>
+                <a:latin typeface="+mn-lt"/>
+                <a:ea typeface="+mn-ea"/>
+                <a:cs typeface="+mn-cs"/>
+              </a:defRPr>
+            </a:lvl2pPr>
+            <a:lvl3pPr marL="914377" algn="l" defTabSz="914377" rtl="0" eaLnBrk="1" latinLnBrk="0" hangingPunct="1">
+              <a:defRPr sz="1800" kern="1200">
+                <a:solidFill>
+                  <a:schemeClr val="lt1"/>
+                </a:solidFill>
+                <a:latin typeface="+mn-lt"/>
+                <a:ea typeface="+mn-ea"/>
+                <a:cs typeface="+mn-cs"/>
+              </a:defRPr>
+            </a:lvl3pPr>
+            <a:lvl4pPr marL="1371566" algn="l" defTabSz="914377" rtl="0" eaLnBrk="1" latinLnBrk="0" hangingPunct="1">
+              <a:defRPr sz="1800" kern="1200">
+                <a:solidFill>
+                  <a:schemeClr val="lt1"/>
+                </a:solidFill>
+                <a:latin typeface="+mn-lt"/>
+                <a:ea typeface="+mn-ea"/>
+                <a:cs typeface="+mn-cs"/>
+              </a:defRPr>
+            </a:lvl4pPr>
+            <a:lvl5pPr marL="1828754" algn="l" defTabSz="914377" rtl="0" eaLnBrk="1" latinLnBrk="0" hangingPunct="1">
+              <a:defRPr sz="1800" kern="1200">
+                <a:solidFill>
+                  <a:schemeClr val="lt1"/>
+                </a:solidFill>
+                <a:latin typeface="+mn-lt"/>
+                <a:ea typeface="+mn-ea"/>
+                <a:cs typeface="+mn-cs"/>
+              </a:defRPr>
+            </a:lvl5pPr>
+            <a:lvl6pPr marL="2285943" algn="l" defTabSz="914377" rtl="0" eaLnBrk="1" latinLnBrk="0" hangingPunct="1">
+              <a:defRPr sz="1800" kern="1200">
+                <a:solidFill>
+                  <a:schemeClr val="lt1"/>
+                </a:solidFill>
+                <a:latin typeface="+mn-lt"/>
+                <a:ea typeface="+mn-ea"/>
+                <a:cs typeface="+mn-cs"/>
+              </a:defRPr>
+            </a:lvl6pPr>
+            <a:lvl7pPr marL="2743131" algn="l" defTabSz="914377" rtl="0" eaLnBrk="1" latinLnBrk="0" hangingPunct="1">
+              <a:defRPr sz="1800" kern="1200">
+                <a:solidFill>
+                  <a:schemeClr val="lt1"/>
+                </a:solidFill>
+                <a:latin typeface="+mn-lt"/>
+                <a:ea typeface="+mn-ea"/>
+                <a:cs typeface="+mn-cs"/>
+              </a:defRPr>
+            </a:lvl7pPr>
+            <a:lvl8pPr marL="3200320" algn="l" defTabSz="914377" rtl="0" eaLnBrk="1" latinLnBrk="0" hangingPunct="1">
+              <a:defRPr sz="1800" kern="1200">
+                <a:solidFill>
+                  <a:schemeClr val="lt1"/>
+                </a:solidFill>
+                <a:latin typeface="+mn-lt"/>
+                <a:ea typeface="+mn-ea"/>
+                <a:cs typeface="+mn-cs"/>
+              </a:defRPr>
+            </a:lvl8pPr>
+            <a:lvl9pPr marL="3657509" algn="l" defTabSz="914377" rtl="0" eaLnBrk="1" latinLnBrk="0" hangingPunct="1">
+              <a:defRPr sz="1800" kern="1200">
+                <a:solidFill>
+                  <a:schemeClr val="lt1"/>
+                </a:solidFill>
+                <a:latin typeface="+mn-lt"/>
+                <a:ea typeface="+mn-ea"/>
+                <a:cs typeface="+mn-cs"/>
+              </a:defRPr>
+            </a:lvl9pPr>
+          </a:lstStyle>
+          <a:p>
+            <a:pPr algn="ctr"/>
+            <a:r>
+              <a:rPr lang="en-US" sz="1100" dirty="0" err="1">
+                <a:solidFill>
+                  <a:schemeClr val="bg1"/>
+                </a:solidFill>
+              </a:rPr>
+              <a:t>vg_drawing_vglite.c</a:t>
+            </a:r>
+            <a:endParaRPr lang="en-US" sz="1100" dirty="0">
+              <a:solidFill>
+                <a:schemeClr val="bg1"/>
+              </a:solidFill>
+            </a:endParaRPr>
+          </a:p>
+        </p:txBody>
+      </p:sp>
+      <p:sp>
+        <p:nvSpPr>
+          <p:cNvPr id="55" name="Rounded Rectangle 48">
+            <a:extLst>
+              <a:ext uri="{FF2B5EF4-FFF2-40B4-BE49-F238E27FC236}">
+                <a16:creationId xmlns:a16="http://schemas.microsoft.com/office/drawing/2014/main" id="{DC7B4017-597C-8AFF-4BDE-CD325BD76370}"/>
+              </a:ext>
+            </a:extLst>
+          </p:cNvPr>
+          <p:cNvSpPr/>
+          <p:nvPr/>
+        </p:nvSpPr>
+        <p:spPr>
+          <a:xfrm>
+            <a:off x="7284522" y="3189950"/>
             <a:ext cx="1645920" cy="345600"/>
           </a:xfrm>
           <a:prstGeom prst="roundRect">
@@ -18299,175 +18119,6 @@
                   <a:schemeClr val="bg1"/>
                 </a:solidFill>
               </a:rPr>
-              <a:t>LLVG_PATH_PAINTER_</a:t>
-            </a:r>
-          </a:p>
-          <a:p>
-            <a:pPr algn="ctr"/>
-            <a:r>
-              <a:rPr lang="en-US" sz="1100" dirty="0" err="1">
-                <a:solidFill>
-                  <a:schemeClr val="bg1"/>
-                </a:solidFill>
-              </a:rPr>
-              <a:t>vglite.c</a:t>
-            </a:r>
-            <a:endParaRPr lang="en-US" sz="1100" dirty="0">
-              <a:solidFill>
-                <a:schemeClr val="bg1"/>
-              </a:solidFill>
-            </a:endParaRPr>
-          </a:p>
-        </p:txBody>
-      </p:sp>
-      <p:sp>
-        <p:nvSpPr>
-          <p:cNvPr id="55" name="Rounded Rectangle 48">
-            <a:extLst>
-              <a:ext uri="{FF2B5EF4-FFF2-40B4-BE49-F238E27FC236}">
-                <a16:creationId xmlns:a16="http://schemas.microsoft.com/office/drawing/2014/main" id="{DC7B4017-597C-8AFF-4BDE-CD325BD76370}"/>
-              </a:ext>
-            </a:extLst>
-          </p:cNvPr>
-          <p:cNvSpPr/>
-          <p:nvPr/>
-        </p:nvSpPr>
-        <p:spPr>
-          <a:xfrm>
-            <a:off x="7196162" y="3744891"/>
-            <a:ext cx="1645920" cy="345600"/>
-          </a:xfrm>
-          <a:prstGeom prst="roundRect">
-            <a:avLst/>
-          </a:prstGeom>
-          <a:solidFill>
-            <a:srgbClr val="00AEC7"/>
-          </a:solidFill>
-          <a:ln>
-            <a:noFill/>
-          </a:ln>
-        </p:spPr>
-        <p:style>
-          <a:lnRef idx="2">
-            <a:schemeClr val="accent1">
-              <a:shade val="50000"/>
-            </a:schemeClr>
-          </a:lnRef>
-          <a:fillRef idx="1">
-            <a:schemeClr val="accent1"/>
-          </a:fillRef>
-          <a:effectRef idx="0">
-            <a:schemeClr val="accent1"/>
-          </a:effectRef>
-          <a:fontRef idx="minor">
-            <a:schemeClr val="lt1"/>
-          </a:fontRef>
-        </p:style>
-        <p:txBody>
-          <a:bodyPr rtlCol="0" anchor="ctr"/>
-          <a:lstStyle>
-            <a:defPPr>
-              <a:defRPr lang="en-US"/>
-            </a:defPPr>
-            <a:lvl1pPr marL="0" algn="l" defTabSz="914377" rtl="0" eaLnBrk="1" latinLnBrk="0" hangingPunct="1">
-              <a:defRPr sz="1800" kern="1200">
-                <a:solidFill>
-                  <a:schemeClr val="lt1"/>
-                </a:solidFill>
-                <a:latin typeface="+mn-lt"/>
-                <a:ea typeface="+mn-ea"/>
-                <a:cs typeface="+mn-cs"/>
-              </a:defRPr>
-            </a:lvl1pPr>
-            <a:lvl2pPr marL="457189" algn="l" defTabSz="914377" rtl="0" eaLnBrk="1" latinLnBrk="0" hangingPunct="1">
-              <a:defRPr sz="1800" kern="1200">
-                <a:solidFill>
-                  <a:schemeClr val="lt1"/>
-                </a:solidFill>
-                <a:latin typeface="+mn-lt"/>
-                <a:ea typeface="+mn-ea"/>
-                <a:cs typeface="+mn-cs"/>
-              </a:defRPr>
-            </a:lvl2pPr>
-            <a:lvl3pPr marL="914377" algn="l" defTabSz="914377" rtl="0" eaLnBrk="1" latinLnBrk="0" hangingPunct="1">
-              <a:defRPr sz="1800" kern="1200">
-                <a:solidFill>
-                  <a:schemeClr val="lt1"/>
-                </a:solidFill>
-                <a:latin typeface="+mn-lt"/>
-                <a:ea typeface="+mn-ea"/>
-                <a:cs typeface="+mn-cs"/>
-              </a:defRPr>
-            </a:lvl3pPr>
-            <a:lvl4pPr marL="1371566" algn="l" defTabSz="914377" rtl="0" eaLnBrk="1" latinLnBrk="0" hangingPunct="1">
-              <a:defRPr sz="1800" kern="1200">
-                <a:solidFill>
-                  <a:schemeClr val="lt1"/>
-                </a:solidFill>
-                <a:latin typeface="+mn-lt"/>
-                <a:ea typeface="+mn-ea"/>
-                <a:cs typeface="+mn-cs"/>
-              </a:defRPr>
-            </a:lvl4pPr>
-            <a:lvl5pPr marL="1828754" algn="l" defTabSz="914377" rtl="0" eaLnBrk="1" latinLnBrk="0" hangingPunct="1">
-              <a:defRPr sz="1800" kern="1200">
-                <a:solidFill>
-                  <a:schemeClr val="lt1"/>
-                </a:solidFill>
-                <a:latin typeface="+mn-lt"/>
-                <a:ea typeface="+mn-ea"/>
-                <a:cs typeface="+mn-cs"/>
-              </a:defRPr>
-            </a:lvl5pPr>
-            <a:lvl6pPr marL="2285943" algn="l" defTabSz="914377" rtl="0" eaLnBrk="1" latinLnBrk="0" hangingPunct="1">
-              <a:defRPr sz="1800" kern="1200">
-                <a:solidFill>
-                  <a:schemeClr val="lt1"/>
-                </a:solidFill>
-                <a:latin typeface="+mn-lt"/>
-                <a:ea typeface="+mn-ea"/>
-                <a:cs typeface="+mn-cs"/>
-              </a:defRPr>
-            </a:lvl6pPr>
-            <a:lvl7pPr marL="2743131" algn="l" defTabSz="914377" rtl="0" eaLnBrk="1" latinLnBrk="0" hangingPunct="1">
-              <a:defRPr sz="1800" kern="1200">
-                <a:solidFill>
-                  <a:schemeClr val="lt1"/>
-                </a:solidFill>
-                <a:latin typeface="+mn-lt"/>
-                <a:ea typeface="+mn-ea"/>
-                <a:cs typeface="+mn-cs"/>
-              </a:defRPr>
-            </a:lvl7pPr>
-            <a:lvl8pPr marL="3200320" algn="l" defTabSz="914377" rtl="0" eaLnBrk="1" latinLnBrk="0" hangingPunct="1">
-              <a:defRPr sz="1800" kern="1200">
-                <a:solidFill>
-                  <a:schemeClr val="lt1"/>
-                </a:solidFill>
-                <a:latin typeface="+mn-lt"/>
-                <a:ea typeface="+mn-ea"/>
-                <a:cs typeface="+mn-cs"/>
-              </a:defRPr>
-            </a:lvl8pPr>
-            <a:lvl9pPr marL="3657509" algn="l" defTabSz="914377" rtl="0" eaLnBrk="1" latinLnBrk="0" hangingPunct="1">
-              <a:defRPr sz="1800" kern="1200">
-                <a:solidFill>
-                  <a:schemeClr val="lt1"/>
-                </a:solidFill>
-                <a:latin typeface="+mn-lt"/>
-                <a:ea typeface="+mn-ea"/>
-                <a:cs typeface="+mn-cs"/>
-              </a:defRPr>
-            </a:lvl9pPr>
-          </a:lstStyle>
-          <a:p>
-            <a:pPr algn="ctr"/>
-            <a:r>
-              <a:rPr lang="en-US" sz="1100" dirty="0">
-                <a:solidFill>
-                  <a:schemeClr val="bg1"/>
-                </a:solidFill>
-              </a:rPr>
               <a:t>LLVG_FONT_PAINTER_</a:t>
             </a:r>
           </a:p>
@@ -18500,14 +18151,15 @@
           </p:cNvPr>
           <p:cNvCxnSpPr>
             <a:cxnSpLocks/>
+            <a:stCxn id="5" idx="1"/>
             <a:endCxn id="11" idx="3"/>
           </p:cNvCxnSpPr>
           <p:nvPr/>
         </p:nvCxnSpPr>
         <p:spPr>
-          <a:xfrm flipH="1" flipV="1">
-            <a:off x="1936956" y="5178636"/>
-            <a:ext cx="447806" cy="5871"/>
+          <a:xfrm flipH="1">
+            <a:off x="1936956" y="4188934"/>
+            <a:ext cx="863453" cy="989702"/>
           </a:xfrm>
           <a:prstGeom prst="straightConnector1">
             <a:avLst/>
@@ -18714,15 +18366,15 @@
           </p:cNvPr>
           <p:cNvCxnSpPr>
             <a:cxnSpLocks/>
-            <a:stCxn id="55" idx="1"/>
-            <a:endCxn id="35" idx="3"/>
+            <a:stCxn id="129" idx="1"/>
+            <a:endCxn id="29" idx="3"/>
           </p:cNvCxnSpPr>
           <p:nvPr/>
         </p:nvCxnSpPr>
         <p:spPr>
           <a:xfrm flipH="1" flipV="1">
-            <a:off x="1936956" y="3903426"/>
-            <a:ext cx="5259206" cy="14265"/>
+            <a:off x="1936956" y="3710203"/>
+            <a:ext cx="5347566" cy="68662"/>
           </a:xfrm>
           <a:prstGeom prst="straightConnector1">
             <a:avLst/>
@@ -18757,15 +18409,15 @@
           </p:cNvPr>
           <p:cNvCxnSpPr>
             <a:cxnSpLocks/>
-            <a:stCxn id="54" idx="1"/>
+            <a:stCxn id="39" idx="1"/>
             <a:endCxn id="23" idx="3"/>
           </p:cNvCxnSpPr>
           <p:nvPr/>
         </p:nvCxnSpPr>
         <p:spPr>
           <a:xfrm flipH="1">
-            <a:off x="1936956" y="3464965"/>
-            <a:ext cx="5259206" cy="676"/>
+            <a:off x="1936956" y="3319622"/>
+            <a:ext cx="835707" cy="13296"/>
           </a:xfrm>
           <a:prstGeom prst="straightConnector1">
             <a:avLst/>
@@ -18886,15 +18538,15 @@
           </p:cNvPr>
           <p:cNvCxnSpPr>
             <a:cxnSpLocks/>
-            <a:stCxn id="54" idx="1"/>
-            <a:endCxn id="50" idx="3"/>
+            <a:stCxn id="52" idx="1"/>
+            <a:endCxn id="36" idx="3"/>
           </p:cNvCxnSpPr>
           <p:nvPr/>
         </p:nvCxnSpPr>
         <p:spPr>
           <a:xfrm flipH="1" flipV="1">
-            <a:off x="6322323" y="2582426"/>
-            <a:ext cx="873839" cy="882539"/>
+            <a:off x="6487652" y="2529346"/>
+            <a:ext cx="676229" cy="1016267"/>
           </a:xfrm>
           <a:prstGeom prst="straightConnector1">
             <a:avLst/>
@@ -19360,8 +19012,8 @@
         </p:nvSpPr>
         <p:spPr>
           <a:xfrm>
-            <a:off x="4313409" y="5307396"/>
-            <a:ext cx="4007166" cy="1273820"/>
+            <a:off x="4574859" y="5294476"/>
+            <a:ext cx="4007166" cy="1305613"/>
           </a:xfrm>
           <a:prstGeom prst="roundRect">
             <a:avLst>
@@ -19424,7 +19076,7 @@
         </p:nvSpPr>
         <p:spPr>
           <a:xfrm>
-            <a:off x="4313409" y="5049442"/>
+            <a:off x="4573632" y="5011853"/>
             <a:ext cx="2296168" cy="276999"/>
           </a:xfrm>
           <a:prstGeom prst="rect">
@@ -19463,7 +19115,7 @@
         </p:nvSpPr>
         <p:spPr>
           <a:xfrm>
-            <a:off x="6476181" y="5795159"/>
+            <a:off x="6737631" y="5814032"/>
             <a:ext cx="1645920" cy="288000"/>
           </a:xfrm>
           <a:prstGeom prst="roundRect">
@@ -19621,7 +19273,7 @@
         </p:nvSpPr>
         <p:spPr>
           <a:xfrm>
-            <a:off x="6476181" y="6154357"/>
+            <a:off x="6737631" y="6173230"/>
             <a:ext cx="1645920" cy="288000"/>
           </a:xfrm>
           <a:prstGeom prst="roundRect">
@@ -19779,7 +19431,7 @@
         </p:nvSpPr>
         <p:spPr>
           <a:xfrm>
-            <a:off x="4397320" y="5421846"/>
+            <a:off x="4658770" y="5440719"/>
             <a:ext cx="1645920" cy="288000"/>
           </a:xfrm>
           <a:prstGeom prst="roundRect">
@@ -19913,7 +19565,7 @@
                   <a:schemeClr val="bg1"/>
                 </a:solidFill>
               </a:rPr>
-              <a:t>drawing_vglite.c</a:t>
+              <a:t>ui_drawing_vglite.c</a:t>
             </a:r>
             <a:endParaRPr lang="en-US" sz="1200" dirty="0">
               <a:solidFill>
@@ -19937,7 +19589,7 @@
         </p:nvSpPr>
         <p:spPr>
           <a:xfrm>
-            <a:off x="4397320" y="5795159"/>
+            <a:off x="4658770" y="5814032"/>
             <a:ext cx="1645920" cy="288000"/>
           </a:xfrm>
           <a:prstGeom prst="roundRect">
@@ -20095,7 +19747,7 @@
         </p:nvSpPr>
         <p:spPr>
           <a:xfrm>
-            <a:off x="4397320" y="6154357"/>
+            <a:off x="4658770" y="6173230"/>
             <a:ext cx="1645920" cy="288000"/>
           </a:xfrm>
           <a:prstGeom prst="roundRect">
@@ -20257,7 +19909,7 @@
         </p:nvCxnSpPr>
         <p:spPr>
           <a:xfrm>
-            <a:off x="6043240" y="6298357"/>
+            <a:off x="6304690" y="6317230"/>
             <a:ext cx="432941" cy="0"/>
           </a:xfrm>
           <a:prstGeom prst="straightConnector1">
@@ -20293,14 +19945,15 @@
           </p:cNvPr>
           <p:cNvCxnSpPr>
             <a:cxnSpLocks/>
+            <a:stCxn id="7" idx="3"/>
             <a:endCxn id="12" idx="1"/>
           </p:cNvCxnSpPr>
           <p:nvPr/>
         </p:nvCxnSpPr>
         <p:spPr>
           <a:xfrm>
-            <a:off x="6049892" y="5939159"/>
-            <a:ext cx="426289" cy="0"/>
+            <a:off x="6304690" y="5958032"/>
+            <a:ext cx="432941" cy="0"/>
           </a:xfrm>
           <a:prstGeom prst="straightConnector1">
             <a:avLst/>
@@ -20342,8 +19995,8 @@
         </p:nvCxnSpPr>
         <p:spPr>
           <a:xfrm flipH="1">
-            <a:off x="6316992" y="4263513"/>
-            <a:ext cx="1702130" cy="1043883"/>
+            <a:off x="6578442" y="4503674"/>
+            <a:ext cx="1529040" cy="790802"/>
           </a:xfrm>
           <a:prstGeom prst="straightConnector1">
             <a:avLst/>
@@ -20361,49 +20014,6 @@
           </a:fillRef>
           <a:effectRef idx="0">
             <a:schemeClr val="accent2"/>
-          </a:effectRef>
-          <a:fontRef idx="minor">
-            <a:schemeClr val="tx1"/>
-          </a:fontRef>
-        </p:style>
-      </p:cxnSp>
-      <p:cxnSp>
-        <p:nvCxnSpPr>
-          <p:cNvPr id="131" name="Straight Arrow Connector 130">
-            <a:extLst>
-              <a:ext uri="{FF2B5EF4-FFF2-40B4-BE49-F238E27FC236}">
-                <a16:creationId xmlns:a16="http://schemas.microsoft.com/office/drawing/2014/main" id="{DC055C7A-1B5A-C412-A406-99B4E94108EA}"/>
-              </a:ext>
-            </a:extLst>
-          </p:cNvPr>
-          <p:cNvCxnSpPr>
-            <a:cxnSpLocks/>
-            <a:stCxn id="54" idx="1"/>
-            <a:endCxn id="48" idx="3"/>
-          </p:cNvCxnSpPr>
-          <p:nvPr/>
-        </p:nvCxnSpPr>
-        <p:spPr>
-          <a:xfrm flipH="1" flipV="1">
-            <a:off x="6322323" y="2207559"/>
-            <a:ext cx="873839" cy="1257406"/>
-          </a:xfrm>
-          <a:prstGeom prst="straightConnector1">
-            <a:avLst/>
-          </a:prstGeom>
-          <a:ln>
-            <a:tailEnd type="triangle"/>
-          </a:ln>
-        </p:spPr>
-        <p:style>
-          <a:lnRef idx="1">
-            <a:schemeClr val="accent1"/>
-          </a:lnRef>
-          <a:fillRef idx="0">
-            <a:schemeClr val="accent1"/>
-          </a:fillRef>
-          <a:effectRef idx="0">
-            <a:schemeClr val="accent1"/>
           </a:effectRef>
           <a:fontRef idx="minor">
             <a:schemeClr val="tx1"/>
@@ -20593,14 +20203,14 @@
           <p:cNvCxnSpPr>
             <a:cxnSpLocks/>
             <a:stCxn id="18" idx="2"/>
-            <a:endCxn id="4" idx="0"/>
+            <a:endCxn id="93" idx="0"/>
           </p:cNvCxnSpPr>
           <p:nvPr/>
         </p:nvCxnSpPr>
         <p:spPr>
           <a:xfrm flipH="1">
-            <a:off x="1097372" y="4265120"/>
-            <a:ext cx="16625" cy="621550"/>
+            <a:off x="1097372" y="4019266"/>
+            <a:ext cx="16625" cy="867404"/>
           </a:xfrm>
           <a:prstGeom prst="straightConnector1">
             <a:avLst/>
@@ -20642,8 +20252,8 @@
         </p:nvCxnSpPr>
         <p:spPr>
           <a:xfrm flipV="1">
-            <a:off x="8320575" y="4598223"/>
-            <a:ext cx="1607304" cy="1346083"/>
+            <a:off x="8582025" y="4598223"/>
+            <a:ext cx="1345854" cy="1349060"/>
           </a:xfrm>
           <a:prstGeom prst="straightConnector1">
             <a:avLst/>
@@ -20685,8 +20295,8 @@
         </p:nvCxnSpPr>
         <p:spPr>
           <a:xfrm>
-            <a:off x="8962723" y="3661543"/>
-            <a:ext cx="965156" cy="936680"/>
+            <a:off x="9051083" y="3545613"/>
+            <a:ext cx="876796" cy="1052610"/>
           </a:xfrm>
           <a:prstGeom prst="straightConnector1">
             <a:avLst/>
@@ -20728,8 +20338,8 @@
         </p:nvCxnSpPr>
         <p:spPr>
           <a:xfrm flipV="1">
-            <a:off x="8962723" y="2314301"/>
-            <a:ext cx="983395" cy="1347242"/>
+            <a:off x="9051083" y="2314301"/>
+            <a:ext cx="895035" cy="1231312"/>
           </a:xfrm>
           <a:prstGeom prst="straightConnector1">
             <a:avLst/>
@@ -20850,15 +20460,15 @@
           </p:cNvPr>
           <p:cNvCxnSpPr>
             <a:cxnSpLocks/>
-            <a:stCxn id="16" idx="1"/>
-            <a:endCxn id="10" idx="3"/>
+            <a:stCxn id="16" idx="0"/>
+            <a:endCxn id="70" idx="2"/>
           </p:cNvCxnSpPr>
           <p:nvPr/>
         </p:nvCxnSpPr>
         <p:spPr>
-          <a:xfrm flipH="1">
-            <a:off x="1936956" y="5565846"/>
-            <a:ext cx="2460364" cy="0"/>
+          <a:xfrm flipV="1">
+            <a:off x="5481730" y="4332934"/>
+            <a:ext cx="1598" cy="1107785"/>
           </a:xfrm>
           <a:prstGeom prst="straightConnector1">
             <a:avLst/>
@@ -21746,6 +21356,1485 @@
           </p:txBody>
         </p:sp>
       </p:grpSp>
+      <p:sp>
+        <p:nvSpPr>
+          <p:cNvPr id="29" name="Rounded Rectangle 28">
+            <a:extLst>
+              <a:ext uri="{FF2B5EF4-FFF2-40B4-BE49-F238E27FC236}">
+                <a16:creationId xmlns:a16="http://schemas.microsoft.com/office/drawing/2014/main" id="{81A4EAAD-5557-51BD-A8B7-F11CB44C01A1}"/>
+              </a:ext>
+            </a:extLst>
+          </p:cNvPr>
+          <p:cNvSpPr/>
+          <p:nvPr/>
+        </p:nvSpPr>
+        <p:spPr>
+          <a:xfrm>
+            <a:off x="291036" y="3566203"/>
+            <a:ext cx="1645920" cy="288000"/>
+          </a:xfrm>
+          <a:prstGeom prst="roundRect">
+            <a:avLst/>
+          </a:prstGeom>
+          <a:solidFill>
+            <a:srgbClr val="6CC24A"/>
+          </a:solidFill>
+          <a:ln>
+            <a:noFill/>
+          </a:ln>
+        </p:spPr>
+        <p:style>
+          <a:lnRef idx="2">
+            <a:schemeClr val="accent1">
+              <a:shade val="50000"/>
+            </a:schemeClr>
+          </a:lnRef>
+          <a:fillRef idx="1">
+            <a:schemeClr val="accent1"/>
+          </a:fillRef>
+          <a:effectRef idx="0">
+            <a:schemeClr val="accent1"/>
+          </a:effectRef>
+          <a:fontRef idx="minor">
+            <a:schemeClr val="lt1"/>
+          </a:fontRef>
+        </p:style>
+        <p:txBody>
+          <a:bodyPr rtlCol="0" anchor="ctr"/>
+          <a:lstStyle>
+            <a:defPPr>
+              <a:defRPr lang="en-US"/>
+            </a:defPPr>
+            <a:lvl1pPr marL="0" algn="l" defTabSz="914377" rtl="0" eaLnBrk="1" latinLnBrk="0" hangingPunct="1">
+              <a:defRPr sz="1800" kern="1200">
+                <a:solidFill>
+                  <a:schemeClr val="lt1"/>
+                </a:solidFill>
+                <a:latin typeface="+mn-lt"/>
+                <a:ea typeface="+mn-ea"/>
+                <a:cs typeface="+mn-cs"/>
+              </a:defRPr>
+            </a:lvl1pPr>
+            <a:lvl2pPr marL="457189" algn="l" defTabSz="914377" rtl="0" eaLnBrk="1" latinLnBrk="0" hangingPunct="1">
+              <a:defRPr sz="1800" kern="1200">
+                <a:solidFill>
+                  <a:schemeClr val="lt1"/>
+                </a:solidFill>
+                <a:latin typeface="+mn-lt"/>
+                <a:ea typeface="+mn-ea"/>
+                <a:cs typeface="+mn-cs"/>
+              </a:defRPr>
+            </a:lvl2pPr>
+            <a:lvl3pPr marL="914377" algn="l" defTabSz="914377" rtl="0" eaLnBrk="1" latinLnBrk="0" hangingPunct="1">
+              <a:defRPr sz="1800" kern="1200">
+                <a:solidFill>
+                  <a:schemeClr val="lt1"/>
+                </a:solidFill>
+                <a:latin typeface="+mn-lt"/>
+                <a:ea typeface="+mn-ea"/>
+                <a:cs typeface="+mn-cs"/>
+              </a:defRPr>
+            </a:lvl3pPr>
+            <a:lvl4pPr marL="1371566" algn="l" defTabSz="914377" rtl="0" eaLnBrk="1" latinLnBrk="0" hangingPunct="1">
+              <a:defRPr sz="1800" kern="1200">
+                <a:solidFill>
+                  <a:schemeClr val="lt1"/>
+                </a:solidFill>
+                <a:latin typeface="+mn-lt"/>
+                <a:ea typeface="+mn-ea"/>
+                <a:cs typeface="+mn-cs"/>
+              </a:defRPr>
+            </a:lvl4pPr>
+            <a:lvl5pPr marL="1828754" algn="l" defTabSz="914377" rtl="0" eaLnBrk="1" latinLnBrk="0" hangingPunct="1">
+              <a:defRPr sz="1800" kern="1200">
+                <a:solidFill>
+                  <a:schemeClr val="lt1"/>
+                </a:solidFill>
+                <a:latin typeface="+mn-lt"/>
+                <a:ea typeface="+mn-ea"/>
+                <a:cs typeface="+mn-cs"/>
+              </a:defRPr>
+            </a:lvl5pPr>
+            <a:lvl6pPr marL="2285943" algn="l" defTabSz="914377" rtl="0" eaLnBrk="1" latinLnBrk="0" hangingPunct="1">
+              <a:defRPr sz="1800" kern="1200">
+                <a:solidFill>
+                  <a:schemeClr val="lt1"/>
+                </a:solidFill>
+                <a:latin typeface="+mn-lt"/>
+                <a:ea typeface="+mn-ea"/>
+                <a:cs typeface="+mn-cs"/>
+              </a:defRPr>
+            </a:lvl6pPr>
+            <a:lvl7pPr marL="2743131" algn="l" defTabSz="914377" rtl="0" eaLnBrk="1" latinLnBrk="0" hangingPunct="1">
+              <a:defRPr sz="1800" kern="1200">
+                <a:solidFill>
+                  <a:schemeClr val="lt1"/>
+                </a:solidFill>
+                <a:latin typeface="+mn-lt"/>
+                <a:ea typeface="+mn-ea"/>
+                <a:cs typeface="+mn-cs"/>
+              </a:defRPr>
+            </a:lvl7pPr>
+            <a:lvl8pPr marL="3200320" algn="l" defTabSz="914377" rtl="0" eaLnBrk="1" latinLnBrk="0" hangingPunct="1">
+              <a:defRPr sz="1800" kern="1200">
+                <a:solidFill>
+                  <a:schemeClr val="lt1"/>
+                </a:solidFill>
+                <a:latin typeface="+mn-lt"/>
+                <a:ea typeface="+mn-ea"/>
+                <a:cs typeface="+mn-cs"/>
+              </a:defRPr>
+            </a:lvl8pPr>
+            <a:lvl9pPr marL="3657509" algn="l" defTabSz="914377" rtl="0" eaLnBrk="1" latinLnBrk="0" hangingPunct="1">
+              <a:defRPr sz="1800" kern="1200">
+                <a:solidFill>
+                  <a:schemeClr val="lt1"/>
+                </a:solidFill>
+                <a:latin typeface="+mn-lt"/>
+                <a:ea typeface="+mn-ea"/>
+                <a:cs typeface="+mn-cs"/>
+              </a:defRPr>
+            </a:lvl9pPr>
+          </a:lstStyle>
+          <a:p>
+            <a:pPr algn="ctr"/>
+            <a:r>
+              <a:rPr lang="en-US" sz="1200" dirty="0" err="1">
+                <a:solidFill>
+                  <a:schemeClr val="bg1"/>
+                </a:solidFill>
+              </a:rPr>
+              <a:t>LLVG_BVI_impl.h</a:t>
+            </a:r>
+            <a:endParaRPr lang="en-US" sz="1200" dirty="0">
+              <a:solidFill>
+                <a:schemeClr val="bg1"/>
+              </a:solidFill>
+            </a:endParaRPr>
+          </a:p>
+        </p:txBody>
+      </p:sp>
+      <p:sp>
+        <p:nvSpPr>
+          <p:cNvPr id="39" name="Rounded Rectangle 29">
+            <a:extLst>
+              <a:ext uri="{FF2B5EF4-FFF2-40B4-BE49-F238E27FC236}">
+                <a16:creationId xmlns:a16="http://schemas.microsoft.com/office/drawing/2014/main" id="{A71495CD-542C-59CB-232B-A113EA218169}"/>
+              </a:ext>
+            </a:extLst>
+          </p:cNvPr>
+          <p:cNvSpPr/>
+          <p:nvPr/>
+        </p:nvSpPr>
+        <p:spPr>
+          <a:xfrm>
+            <a:off x="2772663" y="3175622"/>
+            <a:ext cx="1645920" cy="288000"/>
+          </a:xfrm>
+          <a:prstGeom prst="roundRect">
+            <a:avLst/>
+          </a:prstGeom>
+          <a:solidFill>
+            <a:srgbClr val="00AEC7"/>
+          </a:solidFill>
+          <a:ln>
+            <a:noFill/>
+          </a:ln>
+        </p:spPr>
+        <p:style>
+          <a:lnRef idx="2">
+            <a:schemeClr val="accent1">
+              <a:shade val="50000"/>
+            </a:schemeClr>
+          </a:lnRef>
+          <a:fillRef idx="1">
+            <a:schemeClr val="accent1"/>
+          </a:fillRef>
+          <a:effectRef idx="0">
+            <a:schemeClr val="accent1"/>
+          </a:effectRef>
+          <a:fontRef idx="minor">
+            <a:schemeClr val="lt1"/>
+          </a:fontRef>
+        </p:style>
+        <p:txBody>
+          <a:bodyPr rtlCol="0" anchor="ctr"/>
+          <a:lstStyle>
+            <a:defPPr>
+              <a:defRPr lang="en-US"/>
+            </a:defPPr>
+            <a:lvl1pPr marL="0" algn="l" defTabSz="914377" rtl="0" eaLnBrk="1" latinLnBrk="0" hangingPunct="1">
+              <a:defRPr sz="1800" kern="1200">
+                <a:solidFill>
+                  <a:schemeClr val="lt1"/>
+                </a:solidFill>
+                <a:latin typeface="+mn-lt"/>
+                <a:ea typeface="+mn-ea"/>
+                <a:cs typeface="+mn-cs"/>
+              </a:defRPr>
+            </a:lvl1pPr>
+            <a:lvl2pPr marL="457189" algn="l" defTabSz="914377" rtl="0" eaLnBrk="1" latinLnBrk="0" hangingPunct="1">
+              <a:defRPr sz="1800" kern="1200">
+                <a:solidFill>
+                  <a:schemeClr val="lt1"/>
+                </a:solidFill>
+                <a:latin typeface="+mn-lt"/>
+                <a:ea typeface="+mn-ea"/>
+                <a:cs typeface="+mn-cs"/>
+              </a:defRPr>
+            </a:lvl2pPr>
+            <a:lvl3pPr marL="914377" algn="l" defTabSz="914377" rtl="0" eaLnBrk="1" latinLnBrk="0" hangingPunct="1">
+              <a:defRPr sz="1800" kern="1200">
+                <a:solidFill>
+                  <a:schemeClr val="lt1"/>
+                </a:solidFill>
+                <a:latin typeface="+mn-lt"/>
+                <a:ea typeface="+mn-ea"/>
+                <a:cs typeface="+mn-cs"/>
+              </a:defRPr>
+            </a:lvl3pPr>
+            <a:lvl4pPr marL="1371566" algn="l" defTabSz="914377" rtl="0" eaLnBrk="1" latinLnBrk="0" hangingPunct="1">
+              <a:defRPr sz="1800" kern="1200">
+                <a:solidFill>
+                  <a:schemeClr val="lt1"/>
+                </a:solidFill>
+                <a:latin typeface="+mn-lt"/>
+                <a:ea typeface="+mn-ea"/>
+                <a:cs typeface="+mn-cs"/>
+              </a:defRPr>
+            </a:lvl4pPr>
+            <a:lvl5pPr marL="1828754" algn="l" defTabSz="914377" rtl="0" eaLnBrk="1" latinLnBrk="0" hangingPunct="1">
+              <a:defRPr sz="1800" kern="1200">
+                <a:solidFill>
+                  <a:schemeClr val="lt1"/>
+                </a:solidFill>
+                <a:latin typeface="+mn-lt"/>
+                <a:ea typeface="+mn-ea"/>
+                <a:cs typeface="+mn-cs"/>
+              </a:defRPr>
+            </a:lvl5pPr>
+            <a:lvl6pPr marL="2285943" algn="l" defTabSz="914377" rtl="0" eaLnBrk="1" latinLnBrk="0" hangingPunct="1">
+              <a:defRPr sz="1800" kern="1200">
+                <a:solidFill>
+                  <a:schemeClr val="lt1"/>
+                </a:solidFill>
+                <a:latin typeface="+mn-lt"/>
+                <a:ea typeface="+mn-ea"/>
+                <a:cs typeface="+mn-cs"/>
+              </a:defRPr>
+            </a:lvl6pPr>
+            <a:lvl7pPr marL="2743131" algn="l" defTabSz="914377" rtl="0" eaLnBrk="1" latinLnBrk="0" hangingPunct="1">
+              <a:defRPr sz="1800" kern="1200">
+                <a:solidFill>
+                  <a:schemeClr val="lt1"/>
+                </a:solidFill>
+                <a:latin typeface="+mn-lt"/>
+                <a:ea typeface="+mn-ea"/>
+                <a:cs typeface="+mn-cs"/>
+              </a:defRPr>
+            </a:lvl7pPr>
+            <a:lvl8pPr marL="3200320" algn="l" defTabSz="914377" rtl="0" eaLnBrk="1" latinLnBrk="0" hangingPunct="1">
+              <a:defRPr sz="1800" kern="1200">
+                <a:solidFill>
+                  <a:schemeClr val="lt1"/>
+                </a:solidFill>
+                <a:latin typeface="+mn-lt"/>
+                <a:ea typeface="+mn-ea"/>
+                <a:cs typeface="+mn-cs"/>
+              </a:defRPr>
+            </a:lvl8pPr>
+            <a:lvl9pPr marL="3657509" algn="l" defTabSz="914377" rtl="0" eaLnBrk="1" latinLnBrk="0" hangingPunct="1">
+              <a:defRPr sz="1800" kern="1200">
+                <a:solidFill>
+                  <a:schemeClr val="lt1"/>
+                </a:solidFill>
+                <a:latin typeface="+mn-lt"/>
+                <a:ea typeface="+mn-ea"/>
+                <a:cs typeface="+mn-cs"/>
+              </a:defRPr>
+            </a:lvl9pPr>
+          </a:lstStyle>
+          <a:p>
+            <a:pPr algn="ctr"/>
+            <a:r>
+              <a:rPr lang="en-US" sz="1200" dirty="0" err="1">
+                <a:solidFill>
+                  <a:schemeClr val="bg1"/>
+                </a:solidFill>
+              </a:rPr>
+              <a:t>LLVG_PAINTER_impl.c</a:t>
+            </a:r>
+            <a:endParaRPr lang="en-US" sz="1200" dirty="0">
+              <a:solidFill>
+                <a:schemeClr val="bg1"/>
+              </a:solidFill>
+            </a:endParaRPr>
+          </a:p>
+        </p:txBody>
+      </p:sp>
+      <p:sp>
+        <p:nvSpPr>
+          <p:cNvPr id="42" name="Rounded Rectangle 17">
+            <a:extLst>
+              <a:ext uri="{FF2B5EF4-FFF2-40B4-BE49-F238E27FC236}">
+                <a16:creationId xmlns:a16="http://schemas.microsoft.com/office/drawing/2014/main" id="{73F55496-7569-4104-6758-F2E0827761FD}"/>
+              </a:ext>
+            </a:extLst>
+          </p:cNvPr>
+          <p:cNvSpPr/>
+          <p:nvPr/>
+        </p:nvSpPr>
+        <p:spPr>
+          <a:xfrm>
+            <a:off x="4676403" y="3175622"/>
+            <a:ext cx="1645920" cy="288000"/>
+          </a:xfrm>
+          <a:prstGeom prst="roundRect">
+            <a:avLst/>
+          </a:prstGeom>
+          <a:solidFill>
+            <a:srgbClr val="6CC24A"/>
+          </a:solidFill>
+          <a:ln>
+            <a:noFill/>
+          </a:ln>
+        </p:spPr>
+        <p:style>
+          <a:lnRef idx="2">
+            <a:schemeClr val="accent1">
+              <a:shade val="50000"/>
+            </a:schemeClr>
+          </a:lnRef>
+          <a:fillRef idx="1">
+            <a:schemeClr val="accent1"/>
+          </a:fillRef>
+          <a:effectRef idx="0">
+            <a:schemeClr val="accent1"/>
+          </a:effectRef>
+          <a:fontRef idx="minor">
+            <a:schemeClr val="lt1"/>
+          </a:fontRef>
+        </p:style>
+        <p:txBody>
+          <a:bodyPr rtlCol="0" anchor="ctr"/>
+          <a:lstStyle>
+            <a:defPPr>
+              <a:defRPr lang="en-US"/>
+            </a:defPPr>
+            <a:lvl1pPr marL="0" algn="l" defTabSz="914377" rtl="0" eaLnBrk="1" latinLnBrk="0" hangingPunct="1">
+              <a:defRPr sz="1800" kern="1200">
+                <a:solidFill>
+                  <a:schemeClr val="lt1"/>
+                </a:solidFill>
+                <a:latin typeface="+mn-lt"/>
+                <a:ea typeface="+mn-ea"/>
+                <a:cs typeface="+mn-cs"/>
+              </a:defRPr>
+            </a:lvl1pPr>
+            <a:lvl2pPr marL="457189" algn="l" defTabSz="914377" rtl="0" eaLnBrk="1" latinLnBrk="0" hangingPunct="1">
+              <a:defRPr sz="1800" kern="1200">
+                <a:solidFill>
+                  <a:schemeClr val="lt1"/>
+                </a:solidFill>
+                <a:latin typeface="+mn-lt"/>
+                <a:ea typeface="+mn-ea"/>
+                <a:cs typeface="+mn-cs"/>
+              </a:defRPr>
+            </a:lvl2pPr>
+            <a:lvl3pPr marL="914377" algn="l" defTabSz="914377" rtl="0" eaLnBrk="1" latinLnBrk="0" hangingPunct="1">
+              <a:defRPr sz="1800" kern="1200">
+                <a:solidFill>
+                  <a:schemeClr val="lt1"/>
+                </a:solidFill>
+                <a:latin typeface="+mn-lt"/>
+                <a:ea typeface="+mn-ea"/>
+                <a:cs typeface="+mn-cs"/>
+              </a:defRPr>
+            </a:lvl3pPr>
+            <a:lvl4pPr marL="1371566" algn="l" defTabSz="914377" rtl="0" eaLnBrk="1" latinLnBrk="0" hangingPunct="1">
+              <a:defRPr sz="1800" kern="1200">
+                <a:solidFill>
+                  <a:schemeClr val="lt1"/>
+                </a:solidFill>
+                <a:latin typeface="+mn-lt"/>
+                <a:ea typeface="+mn-ea"/>
+                <a:cs typeface="+mn-cs"/>
+              </a:defRPr>
+            </a:lvl4pPr>
+            <a:lvl5pPr marL="1828754" algn="l" defTabSz="914377" rtl="0" eaLnBrk="1" latinLnBrk="0" hangingPunct="1">
+              <a:defRPr sz="1800" kern="1200">
+                <a:solidFill>
+                  <a:schemeClr val="lt1"/>
+                </a:solidFill>
+                <a:latin typeface="+mn-lt"/>
+                <a:ea typeface="+mn-ea"/>
+                <a:cs typeface="+mn-cs"/>
+              </a:defRPr>
+            </a:lvl5pPr>
+            <a:lvl6pPr marL="2285943" algn="l" defTabSz="914377" rtl="0" eaLnBrk="1" latinLnBrk="0" hangingPunct="1">
+              <a:defRPr sz="1800" kern="1200">
+                <a:solidFill>
+                  <a:schemeClr val="lt1"/>
+                </a:solidFill>
+                <a:latin typeface="+mn-lt"/>
+                <a:ea typeface="+mn-ea"/>
+                <a:cs typeface="+mn-cs"/>
+              </a:defRPr>
+            </a:lvl6pPr>
+            <a:lvl7pPr marL="2743131" algn="l" defTabSz="914377" rtl="0" eaLnBrk="1" latinLnBrk="0" hangingPunct="1">
+              <a:defRPr sz="1800" kern="1200">
+                <a:solidFill>
+                  <a:schemeClr val="lt1"/>
+                </a:solidFill>
+                <a:latin typeface="+mn-lt"/>
+                <a:ea typeface="+mn-ea"/>
+                <a:cs typeface="+mn-cs"/>
+              </a:defRPr>
+            </a:lvl7pPr>
+            <a:lvl8pPr marL="3200320" algn="l" defTabSz="914377" rtl="0" eaLnBrk="1" latinLnBrk="0" hangingPunct="1">
+              <a:defRPr sz="1800" kern="1200">
+                <a:solidFill>
+                  <a:schemeClr val="lt1"/>
+                </a:solidFill>
+                <a:latin typeface="+mn-lt"/>
+                <a:ea typeface="+mn-ea"/>
+                <a:cs typeface="+mn-cs"/>
+              </a:defRPr>
+            </a:lvl8pPr>
+            <a:lvl9pPr marL="3657509" algn="l" defTabSz="914377" rtl="0" eaLnBrk="1" latinLnBrk="0" hangingPunct="1">
+              <a:defRPr sz="1800" kern="1200">
+                <a:solidFill>
+                  <a:schemeClr val="lt1"/>
+                </a:solidFill>
+                <a:latin typeface="+mn-lt"/>
+                <a:ea typeface="+mn-ea"/>
+                <a:cs typeface="+mn-cs"/>
+              </a:defRPr>
+            </a:lvl9pPr>
+          </a:lstStyle>
+          <a:p>
+            <a:pPr algn="ctr"/>
+            <a:r>
+              <a:rPr lang="en-US" sz="1200" dirty="0" err="1">
+                <a:solidFill>
+                  <a:schemeClr val="bg1"/>
+                </a:solidFill>
+              </a:rPr>
+              <a:t>vg_drawing.h</a:t>
+            </a:r>
+            <a:endParaRPr lang="en-US" sz="1200" dirty="0">
+              <a:solidFill>
+                <a:schemeClr val="bg1"/>
+              </a:solidFill>
+            </a:endParaRPr>
+          </a:p>
+        </p:txBody>
+      </p:sp>
+      <p:cxnSp>
+        <p:nvCxnSpPr>
+          <p:cNvPr id="45" name="Straight Arrow Connector 44">
+            <a:extLst>
+              <a:ext uri="{FF2B5EF4-FFF2-40B4-BE49-F238E27FC236}">
+                <a16:creationId xmlns:a16="http://schemas.microsoft.com/office/drawing/2014/main" id="{75EB335B-7677-1717-2AC5-4A619F3C3AB7}"/>
+              </a:ext>
+            </a:extLst>
+          </p:cNvPr>
+          <p:cNvCxnSpPr>
+            <a:cxnSpLocks/>
+            <a:stCxn id="39" idx="3"/>
+            <a:endCxn id="42" idx="1"/>
+          </p:cNvCxnSpPr>
+          <p:nvPr/>
+        </p:nvCxnSpPr>
+        <p:spPr>
+          <a:xfrm>
+            <a:off x="4418583" y="3319622"/>
+            <a:ext cx="257820" cy="0"/>
+          </a:xfrm>
+          <a:prstGeom prst="straightConnector1">
+            <a:avLst/>
+          </a:prstGeom>
+          <a:ln>
+            <a:tailEnd type="triangle"/>
+          </a:ln>
+        </p:spPr>
+        <p:style>
+          <a:lnRef idx="1">
+            <a:schemeClr val="accent2"/>
+          </a:lnRef>
+          <a:fillRef idx="0">
+            <a:schemeClr val="accent2"/>
+          </a:fillRef>
+          <a:effectRef idx="0">
+            <a:schemeClr val="accent2"/>
+          </a:effectRef>
+          <a:fontRef idx="minor">
+            <a:schemeClr val="tx1"/>
+          </a:fontRef>
+        </p:style>
+      </p:cxnSp>
+      <p:sp>
+        <p:nvSpPr>
+          <p:cNvPr id="70" name="Rounded Rectangle 17">
+            <a:extLst>
+              <a:ext uri="{FF2B5EF4-FFF2-40B4-BE49-F238E27FC236}">
+                <a16:creationId xmlns:a16="http://schemas.microsoft.com/office/drawing/2014/main" id="{4E847F94-3645-4247-1E1F-68BEB20DCF53}"/>
+              </a:ext>
+            </a:extLst>
+          </p:cNvPr>
+          <p:cNvSpPr/>
+          <p:nvPr/>
+        </p:nvSpPr>
+        <p:spPr>
+          <a:xfrm>
+            <a:off x="4660368" y="4044934"/>
+            <a:ext cx="1645920" cy="288000"/>
+          </a:xfrm>
+          <a:prstGeom prst="roundRect">
+            <a:avLst/>
+          </a:prstGeom>
+          <a:solidFill>
+            <a:srgbClr val="6CC24A"/>
+          </a:solidFill>
+          <a:ln>
+            <a:noFill/>
+          </a:ln>
+        </p:spPr>
+        <p:style>
+          <a:lnRef idx="2">
+            <a:schemeClr val="accent1">
+              <a:shade val="50000"/>
+            </a:schemeClr>
+          </a:lnRef>
+          <a:fillRef idx="1">
+            <a:schemeClr val="accent1"/>
+          </a:fillRef>
+          <a:effectRef idx="0">
+            <a:schemeClr val="accent1"/>
+          </a:effectRef>
+          <a:fontRef idx="minor">
+            <a:schemeClr val="lt1"/>
+          </a:fontRef>
+        </p:style>
+        <p:txBody>
+          <a:bodyPr rtlCol="0" anchor="ctr"/>
+          <a:lstStyle>
+            <a:defPPr>
+              <a:defRPr lang="en-US"/>
+            </a:defPPr>
+            <a:lvl1pPr marL="0" algn="l" defTabSz="914377" rtl="0" eaLnBrk="1" latinLnBrk="0" hangingPunct="1">
+              <a:defRPr sz="1800" kern="1200">
+                <a:solidFill>
+                  <a:schemeClr val="lt1"/>
+                </a:solidFill>
+                <a:latin typeface="+mn-lt"/>
+                <a:ea typeface="+mn-ea"/>
+                <a:cs typeface="+mn-cs"/>
+              </a:defRPr>
+            </a:lvl1pPr>
+            <a:lvl2pPr marL="457189" algn="l" defTabSz="914377" rtl="0" eaLnBrk="1" latinLnBrk="0" hangingPunct="1">
+              <a:defRPr sz="1800" kern="1200">
+                <a:solidFill>
+                  <a:schemeClr val="lt1"/>
+                </a:solidFill>
+                <a:latin typeface="+mn-lt"/>
+                <a:ea typeface="+mn-ea"/>
+                <a:cs typeface="+mn-cs"/>
+              </a:defRPr>
+            </a:lvl2pPr>
+            <a:lvl3pPr marL="914377" algn="l" defTabSz="914377" rtl="0" eaLnBrk="1" latinLnBrk="0" hangingPunct="1">
+              <a:defRPr sz="1800" kern="1200">
+                <a:solidFill>
+                  <a:schemeClr val="lt1"/>
+                </a:solidFill>
+                <a:latin typeface="+mn-lt"/>
+                <a:ea typeface="+mn-ea"/>
+                <a:cs typeface="+mn-cs"/>
+              </a:defRPr>
+            </a:lvl3pPr>
+            <a:lvl4pPr marL="1371566" algn="l" defTabSz="914377" rtl="0" eaLnBrk="1" latinLnBrk="0" hangingPunct="1">
+              <a:defRPr sz="1800" kern="1200">
+                <a:solidFill>
+                  <a:schemeClr val="lt1"/>
+                </a:solidFill>
+                <a:latin typeface="+mn-lt"/>
+                <a:ea typeface="+mn-ea"/>
+                <a:cs typeface="+mn-cs"/>
+              </a:defRPr>
+            </a:lvl4pPr>
+            <a:lvl5pPr marL="1828754" algn="l" defTabSz="914377" rtl="0" eaLnBrk="1" latinLnBrk="0" hangingPunct="1">
+              <a:defRPr sz="1800" kern="1200">
+                <a:solidFill>
+                  <a:schemeClr val="lt1"/>
+                </a:solidFill>
+                <a:latin typeface="+mn-lt"/>
+                <a:ea typeface="+mn-ea"/>
+                <a:cs typeface="+mn-cs"/>
+              </a:defRPr>
+            </a:lvl5pPr>
+            <a:lvl6pPr marL="2285943" algn="l" defTabSz="914377" rtl="0" eaLnBrk="1" latinLnBrk="0" hangingPunct="1">
+              <a:defRPr sz="1800" kern="1200">
+                <a:solidFill>
+                  <a:schemeClr val="lt1"/>
+                </a:solidFill>
+                <a:latin typeface="+mn-lt"/>
+                <a:ea typeface="+mn-ea"/>
+                <a:cs typeface="+mn-cs"/>
+              </a:defRPr>
+            </a:lvl6pPr>
+            <a:lvl7pPr marL="2743131" algn="l" defTabSz="914377" rtl="0" eaLnBrk="1" latinLnBrk="0" hangingPunct="1">
+              <a:defRPr sz="1800" kern="1200">
+                <a:solidFill>
+                  <a:schemeClr val="lt1"/>
+                </a:solidFill>
+                <a:latin typeface="+mn-lt"/>
+                <a:ea typeface="+mn-ea"/>
+                <a:cs typeface="+mn-cs"/>
+              </a:defRPr>
+            </a:lvl7pPr>
+            <a:lvl8pPr marL="3200320" algn="l" defTabSz="914377" rtl="0" eaLnBrk="1" latinLnBrk="0" hangingPunct="1">
+              <a:defRPr sz="1800" kern="1200">
+                <a:solidFill>
+                  <a:schemeClr val="lt1"/>
+                </a:solidFill>
+                <a:latin typeface="+mn-lt"/>
+                <a:ea typeface="+mn-ea"/>
+                <a:cs typeface="+mn-cs"/>
+              </a:defRPr>
+            </a:lvl8pPr>
+            <a:lvl9pPr marL="3657509" algn="l" defTabSz="914377" rtl="0" eaLnBrk="1" latinLnBrk="0" hangingPunct="1">
+              <a:defRPr sz="1800" kern="1200">
+                <a:solidFill>
+                  <a:schemeClr val="lt1"/>
+                </a:solidFill>
+                <a:latin typeface="+mn-lt"/>
+                <a:ea typeface="+mn-ea"/>
+                <a:cs typeface="+mn-cs"/>
+              </a:defRPr>
+            </a:lvl9pPr>
+          </a:lstStyle>
+          <a:p>
+            <a:pPr algn="ctr"/>
+            <a:r>
+              <a:rPr lang="en-US" sz="1200" dirty="0" err="1">
+                <a:solidFill>
+                  <a:schemeClr val="bg1"/>
+                </a:solidFill>
+              </a:rPr>
+              <a:t>ui_drawing.h</a:t>
+            </a:r>
+            <a:endParaRPr lang="en-US" sz="1200" dirty="0">
+              <a:solidFill>
+                <a:schemeClr val="bg1"/>
+              </a:solidFill>
+            </a:endParaRPr>
+          </a:p>
+        </p:txBody>
+      </p:sp>
+      <p:cxnSp>
+        <p:nvCxnSpPr>
+          <p:cNvPr id="71" name="Straight Arrow Connector 70">
+            <a:extLst>
+              <a:ext uri="{FF2B5EF4-FFF2-40B4-BE49-F238E27FC236}">
+                <a16:creationId xmlns:a16="http://schemas.microsoft.com/office/drawing/2014/main" id="{E5B30137-5517-0CDD-4BD4-45CF00A2CCE0}"/>
+              </a:ext>
+            </a:extLst>
+          </p:cNvPr>
+          <p:cNvCxnSpPr>
+            <a:cxnSpLocks/>
+            <a:stCxn id="5" idx="3"/>
+            <a:endCxn id="70" idx="1"/>
+          </p:cNvCxnSpPr>
+          <p:nvPr/>
+        </p:nvCxnSpPr>
+        <p:spPr>
+          <a:xfrm>
+            <a:off x="4446329" y="4188934"/>
+            <a:ext cx="214039" cy="0"/>
+          </a:xfrm>
+          <a:prstGeom prst="straightConnector1">
+            <a:avLst/>
+          </a:prstGeom>
+          <a:ln>
+            <a:tailEnd type="triangle"/>
+          </a:ln>
+        </p:spPr>
+        <p:style>
+          <a:lnRef idx="1">
+            <a:schemeClr val="accent2"/>
+          </a:lnRef>
+          <a:fillRef idx="0">
+            <a:schemeClr val="accent2"/>
+          </a:fillRef>
+          <a:effectRef idx="0">
+            <a:schemeClr val="accent2"/>
+          </a:effectRef>
+          <a:fontRef idx="minor">
+            <a:schemeClr val="tx1"/>
+          </a:fontRef>
+        </p:style>
+      </p:cxnSp>
+      <p:sp>
+        <p:nvSpPr>
+          <p:cNvPr id="76" name="Rounded Rectangle 17">
+            <a:extLst>
+              <a:ext uri="{FF2B5EF4-FFF2-40B4-BE49-F238E27FC236}">
+                <a16:creationId xmlns:a16="http://schemas.microsoft.com/office/drawing/2014/main" id="{DD907EAE-C67C-2C37-E209-BE7E8A4364D9}"/>
+              </a:ext>
+            </a:extLst>
+          </p:cNvPr>
+          <p:cNvSpPr/>
+          <p:nvPr/>
+        </p:nvSpPr>
+        <p:spPr>
+          <a:xfrm>
+            <a:off x="6737631" y="5440719"/>
+            <a:ext cx="1645920" cy="288000"/>
+          </a:xfrm>
+          <a:prstGeom prst="roundRect">
+            <a:avLst/>
+          </a:prstGeom>
+          <a:solidFill>
+            <a:srgbClr val="6CC24A"/>
+          </a:solidFill>
+          <a:ln>
+            <a:noFill/>
+          </a:ln>
+        </p:spPr>
+        <p:style>
+          <a:lnRef idx="2">
+            <a:schemeClr val="accent1">
+              <a:shade val="50000"/>
+            </a:schemeClr>
+          </a:lnRef>
+          <a:fillRef idx="1">
+            <a:schemeClr val="accent1"/>
+          </a:fillRef>
+          <a:effectRef idx="0">
+            <a:schemeClr val="accent1"/>
+          </a:effectRef>
+          <a:fontRef idx="minor">
+            <a:schemeClr val="lt1"/>
+          </a:fontRef>
+        </p:style>
+        <p:txBody>
+          <a:bodyPr rtlCol="0" anchor="ctr"/>
+          <a:lstStyle>
+            <a:defPPr>
+              <a:defRPr lang="en-US"/>
+            </a:defPPr>
+            <a:lvl1pPr marL="0" algn="l" defTabSz="914377" rtl="0" eaLnBrk="1" latinLnBrk="0" hangingPunct="1">
+              <a:defRPr sz="1800" kern="1200">
+                <a:solidFill>
+                  <a:schemeClr val="lt1"/>
+                </a:solidFill>
+                <a:latin typeface="+mn-lt"/>
+                <a:ea typeface="+mn-ea"/>
+                <a:cs typeface="+mn-cs"/>
+              </a:defRPr>
+            </a:lvl1pPr>
+            <a:lvl2pPr marL="457189" algn="l" defTabSz="914377" rtl="0" eaLnBrk="1" latinLnBrk="0" hangingPunct="1">
+              <a:defRPr sz="1800" kern="1200">
+                <a:solidFill>
+                  <a:schemeClr val="lt1"/>
+                </a:solidFill>
+                <a:latin typeface="+mn-lt"/>
+                <a:ea typeface="+mn-ea"/>
+                <a:cs typeface="+mn-cs"/>
+              </a:defRPr>
+            </a:lvl2pPr>
+            <a:lvl3pPr marL="914377" algn="l" defTabSz="914377" rtl="0" eaLnBrk="1" latinLnBrk="0" hangingPunct="1">
+              <a:defRPr sz="1800" kern="1200">
+                <a:solidFill>
+                  <a:schemeClr val="lt1"/>
+                </a:solidFill>
+                <a:latin typeface="+mn-lt"/>
+                <a:ea typeface="+mn-ea"/>
+                <a:cs typeface="+mn-cs"/>
+              </a:defRPr>
+            </a:lvl3pPr>
+            <a:lvl4pPr marL="1371566" algn="l" defTabSz="914377" rtl="0" eaLnBrk="1" latinLnBrk="0" hangingPunct="1">
+              <a:defRPr sz="1800" kern="1200">
+                <a:solidFill>
+                  <a:schemeClr val="lt1"/>
+                </a:solidFill>
+                <a:latin typeface="+mn-lt"/>
+                <a:ea typeface="+mn-ea"/>
+                <a:cs typeface="+mn-cs"/>
+              </a:defRPr>
+            </a:lvl4pPr>
+            <a:lvl5pPr marL="1828754" algn="l" defTabSz="914377" rtl="0" eaLnBrk="1" latinLnBrk="0" hangingPunct="1">
+              <a:defRPr sz="1800" kern="1200">
+                <a:solidFill>
+                  <a:schemeClr val="lt1"/>
+                </a:solidFill>
+                <a:latin typeface="+mn-lt"/>
+                <a:ea typeface="+mn-ea"/>
+                <a:cs typeface="+mn-cs"/>
+              </a:defRPr>
+            </a:lvl5pPr>
+            <a:lvl6pPr marL="2285943" algn="l" defTabSz="914377" rtl="0" eaLnBrk="1" latinLnBrk="0" hangingPunct="1">
+              <a:defRPr sz="1800" kern="1200">
+                <a:solidFill>
+                  <a:schemeClr val="lt1"/>
+                </a:solidFill>
+                <a:latin typeface="+mn-lt"/>
+                <a:ea typeface="+mn-ea"/>
+                <a:cs typeface="+mn-cs"/>
+              </a:defRPr>
+            </a:lvl6pPr>
+            <a:lvl7pPr marL="2743131" algn="l" defTabSz="914377" rtl="0" eaLnBrk="1" latinLnBrk="0" hangingPunct="1">
+              <a:defRPr sz="1800" kern="1200">
+                <a:solidFill>
+                  <a:schemeClr val="lt1"/>
+                </a:solidFill>
+                <a:latin typeface="+mn-lt"/>
+                <a:ea typeface="+mn-ea"/>
+                <a:cs typeface="+mn-cs"/>
+              </a:defRPr>
+            </a:lvl7pPr>
+            <a:lvl8pPr marL="3200320" algn="l" defTabSz="914377" rtl="0" eaLnBrk="1" latinLnBrk="0" hangingPunct="1">
+              <a:defRPr sz="1800" kern="1200">
+                <a:solidFill>
+                  <a:schemeClr val="lt1"/>
+                </a:solidFill>
+                <a:latin typeface="+mn-lt"/>
+                <a:ea typeface="+mn-ea"/>
+                <a:cs typeface="+mn-cs"/>
+              </a:defRPr>
+            </a:lvl8pPr>
+            <a:lvl9pPr marL="3657509" algn="l" defTabSz="914377" rtl="0" eaLnBrk="1" latinLnBrk="0" hangingPunct="1">
+              <a:defRPr sz="1800" kern="1200">
+                <a:solidFill>
+                  <a:schemeClr val="lt1"/>
+                </a:solidFill>
+                <a:latin typeface="+mn-lt"/>
+                <a:ea typeface="+mn-ea"/>
+                <a:cs typeface="+mn-cs"/>
+              </a:defRPr>
+            </a:lvl9pPr>
+          </a:lstStyle>
+          <a:p>
+            <a:pPr algn="ctr"/>
+            <a:r>
+              <a:rPr lang="en-US" sz="1200" dirty="0" err="1">
+                <a:solidFill>
+                  <a:schemeClr val="bg1"/>
+                </a:solidFill>
+              </a:rPr>
+              <a:t>drawing_vglite.h</a:t>
+            </a:r>
+            <a:endParaRPr lang="en-US" sz="1200" dirty="0">
+              <a:solidFill>
+                <a:schemeClr val="bg1"/>
+              </a:solidFill>
+            </a:endParaRPr>
+          </a:p>
+        </p:txBody>
+      </p:sp>
+      <p:cxnSp>
+        <p:nvCxnSpPr>
+          <p:cNvPr id="78" name="Straight Arrow Connector 77">
+            <a:extLst>
+              <a:ext uri="{FF2B5EF4-FFF2-40B4-BE49-F238E27FC236}">
+                <a16:creationId xmlns:a16="http://schemas.microsoft.com/office/drawing/2014/main" id="{D4D661B9-A174-0757-432C-1D02472FE09F}"/>
+              </a:ext>
+            </a:extLst>
+          </p:cNvPr>
+          <p:cNvCxnSpPr>
+            <a:cxnSpLocks/>
+            <a:stCxn id="16" idx="3"/>
+            <a:endCxn id="76" idx="1"/>
+          </p:cNvCxnSpPr>
+          <p:nvPr/>
+        </p:nvCxnSpPr>
+        <p:spPr>
+          <a:xfrm>
+            <a:off x="6304690" y="5584719"/>
+            <a:ext cx="432941" cy="0"/>
+          </a:xfrm>
+          <a:prstGeom prst="straightConnector1">
+            <a:avLst/>
+          </a:prstGeom>
+          <a:ln>
+            <a:tailEnd type="triangle"/>
+          </a:ln>
+        </p:spPr>
+        <p:style>
+          <a:lnRef idx="1">
+            <a:schemeClr val="accent1"/>
+          </a:lnRef>
+          <a:fillRef idx="0">
+            <a:schemeClr val="accent1"/>
+          </a:fillRef>
+          <a:effectRef idx="0">
+            <a:schemeClr val="accent1"/>
+          </a:effectRef>
+          <a:fontRef idx="minor">
+            <a:schemeClr val="tx1"/>
+          </a:fontRef>
+        </p:style>
+      </p:cxnSp>
+      <p:sp>
+        <p:nvSpPr>
+          <p:cNvPr id="94" name="Rounded Rectangle 19">
+            <a:extLst>
+              <a:ext uri="{FF2B5EF4-FFF2-40B4-BE49-F238E27FC236}">
+                <a16:creationId xmlns:a16="http://schemas.microsoft.com/office/drawing/2014/main" id="{F41703E7-62D3-54A0-8AB7-A63501F562CA}"/>
+              </a:ext>
+            </a:extLst>
+          </p:cNvPr>
+          <p:cNvSpPr/>
+          <p:nvPr/>
+        </p:nvSpPr>
+        <p:spPr>
+          <a:xfrm>
+            <a:off x="291036" y="5421846"/>
+            <a:ext cx="1645920" cy="288000"/>
+          </a:xfrm>
+          <a:prstGeom prst="roundRect">
+            <a:avLst/>
+          </a:prstGeom>
+          <a:solidFill>
+            <a:srgbClr val="6CC24A"/>
+          </a:solidFill>
+          <a:ln>
+            <a:noFill/>
+          </a:ln>
+        </p:spPr>
+        <p:style>
+          <a:lnRef idx="2">
+            <a:schemeClr val="accent1">
+              <a:shade val="50000"/>
+            </a:schemeClr>
+          </a:lnRef>
+          <a:fillRef idx="1">
+            <a:schemeClr val="accent1"/>
+          </a:fillRef>
+          <a:effectRef idx="0">
+            <a:schemeClr val="accent1"/>
+          </a:effectRef>
+          <a:fontRef idx="minor">
+            <a:schemeClr val="lt1"/>
+          </a:fontRef>
+        </p:style>
+        <p:txBody>
+          <a:bodyPr rtlCol="0" anchor="ctr"/>
+          <a:lstStyle>
+            <a:defPPr>
+              <a:defRPr lang="en-US"/>
+            </a:defPPr>
+            <a:lvl1pPr marL="0" algn="l" defTabSz="914377" rtl="0" eaLnBrk="1" latinLnBrk="0" hangingPunct="1">
+              <a:defRPr sz="1800" kern="1200">
+                <a:solidFill>
+                  <a:schemeClr val="lt1"/>
+                </a:solidFill>
+                <a:latin typeface="+mn-lt"/>
+                <a:ea typeface="+mn-ea"/>
+                <a:cs typeface="+mn-cs"/>
+              </a:defRPr>
+            </a:lvl1pPr>
+            <a:lvl2pPr marL="457189" algn="l" defTabSz="914377" rtl="0" eaLnBrk="1" latinLnBrk="0" hangingPunct="1">
+              <a:defRPr sz="1800" kern="1200">
+                <a:solidFill>
+                  <a:schemeClr val="lt1"/>
+                </a:solidFill>
+                <a:latin typeface="+mn-lt"/>
+                <a:ea typeface="+mn-ea"/>
+                <a:cs typeface="+mn-cs"/>
+              </a:defRPr>
+            </a:lvl2pPr>
+            <a:lvl3pPr marL="914377" algn="l" defTabSz="914377" rtl="0" eaLnBrk="1" latinLnBrk="0" hangingPunct="1">
+              <a:defRPr sz="1800" kern="1200">
+                <a:solidFill>
+                  <a:schemeClr val="lt1"/>
+                </a:solidFill>
+                <a:latin typeface="+mn-lt"/>
+                <a:ea typeface="+mn-ea"/>
+                <a:cs typeface="+mn-cs"/>
+              </a:defRPr>
+            </a:lvl3pPr>
+            <a:lvl4pPr marL="1371566" algn="l" defTabSz="914377" rtl="0" eaLnBrk="1" latinLnBrk="0" hangingPunct="1">
+              <a:defRPr sz="1800" kern="1200">
+                <a:solidFill>
+                  <a:schemeClr val="lt1"/>
+                </a:solidFill>
+                <a:latin typeface="+mn-lt"/>
+                <a:ea typeface="+mn-ea"/>
+                <a:cs typeface="+mn-cs"/>
+              </a:defRPr>
+            </a:lvl4pPr>
+            <a:lvl5pPr marL="1828754" algn="l" defTabSz="914377" rtl="0" eaLnBrk="1" latinLnBrk="0" hangingPunct="1">
+              <a:defRPr sz="1800" kern="1200">
+                <a:solidFill>
+                  <a:schemeClr val="lt1"/>
+                </a:solidFill>
+                <a:latin typeface="+mn-lt"/>
+                <a:ea typeface="+mn-ea"/>
+                <a:cs typeface="+mn-cs"/>
+              </a:defRPr>
+            </a:lvl5pPr>
+            <a:lvl6pPr marL="2285943" algn="l" defTabSz="914377" rtl="0" eaLnBrk="1" latinLnBrk="0" hangingPunct="1">
+              <a:defRPr sz="1800" kern="1200">
+                <a:solidFill>
+                  <a:schemeClr val="lt1"/>
+                </a:solidFill>
+                <a:latin typeface="+mn-lt"/>
+                <a:ea typeface="+mn-ea"/>
+                <a:cs typeface="+mn-cs"/>
+              </a:defRPr>
+            </a:lvl6pPr>
+            <a:lvl7pPr marL="2743131" algn="l" defTabSz="914377" rtl="0" eaLnBrk="1" latinLnBrk="0" hangingPunct="1">
+              <a:defRPr sz="1800" kern="1200">
+                <a:solidFill>
+                  <a:schemeClr val="lt1"/>
+                </a:solidFill>
+                <a:latin typeface="+mn-lt"/>
+                <a:ea typeface="+mn-ea"/>
+                <a:cs typeface="+mn-cs"/>
+              </a:defRPr>
+            </a:lvl7pPr>
+            <a:lvl8pPr marL="3200320" algn="l" defTabSz="914377" rtl="0" eaLnBrk="1" latinLnBrk="0" hangingPunct="1">
+              <a:defRPr sz="1800" kern="1200">
+                <a:solidFill>
+                  <a:schemeClr val="lt1"/>
+                </a:solidFill>
+                <a:latin typeface="+mn-lt"/>
+                <a:ea typeface="+mn-ea"/>
+                <a:cs typeface="+mn-cs"/>
+              </a:defRPr>
+            </a:lvl8pPr>
+            <a:lvl9pPr marL="3657509" algn="l" defTabSz="914377" rtl="0" eaLnBrk="1" latinLnBrk="0" hangingPunct="1">
+              <a:defRPr sz="1800" kern="1200">
+                <a:solidFill>
+                  <a:schemeClr val="lt1"/>
+                </a:solidFill>
+                <a:latin typeface="+mn-lt"/>
+                <a:ea typeface="+mn-ea"/>
+                <a:cs typeface="+mn-cs"/>
+              </a:defRPr>
+            </a:lvl9pPr>
+          </a:lstStyle>
+          <a:p>
+            <a:pPr algn="ctr"/>
+            <a:r>
+              <a:rPr lang="en-US" sz="1200" dirty="0" err="1">
+                <a:solidFill>
+                  <a:schemeClr val="bg1"/>
+                </a:solidFill>
+              </a:rPr>
+              <a:t>ui_drawing_soft.h</a:t>
+            </a:r>
+            <a:endParaRPr lang="en-US" sz="1200" dirty="0">
+              <a:solidFill>
+                <a:schemeClr val="bg1"/>
+              </a:solidFill>
+            </a:endParaRPr>
+          </a:p>
+        </p:txBody>
+      </p:sp>
+      <p:cxnSp>
+        <p:nvCxnSpPr>
+          <p:cNvPr id="97" name="Straight Arrow Connector 96">
+            <a:extLst>
+              <a:ext uri="{FF2B5EF4-FFF2-40B4-BE49-F238E27FC236}">
+                <a16:creationId xmlns:a16="http://schemas.microsoft.com/office/drawing/2014/main" id="{4350D573-187F-C81C-BC39-EA302B22E8D7}"/>
+              </a:ext>
+            </a:extLst>
+          </p:cNvPr>
+          <p:cNvCxnSpPr>
+            <a:cxnSpLocks/>
+            <a:stCxn id="16" idx="1"/>
+            <a:endCxn id="94" idx="3"/>
+          </p:cNvCxnSpPr>
+          <p:nvPr/>
+        </p:nvCxnSpPr>
+        <p:spPr>
+          <a:xfrm flipH="1" flipV="1">
+            <a:off x="1936956" y="5565846"/>
+            <a:ext cx="2721814" cy="18873"/>
+          </a:xfrm>
+          <a:prstGeom prst="straightConnector1">
+            <a:avLst/>
+          </a:prstGeom>
+          <a:ln>
+            <a:tailEnd type="triangle"/>
+          </a:ln>
+        </p:spPr>
+        <p:style>
+          <a:lnRef idx="1">
+            <a:schemeClr val="accent2"/>
+          </a:lnRef>
+          <a:fillRef idx="0">
+            <a:schemeClr val="accent2"/>
+          </a:fillRef>
+          <a:effectRef idx="0">
+            <a:schemeClr val="accent2"/>
+          </a:effectRef>
+          <a:fontRef idx="minor">
+            <a:schemeClr val="tx1"/>
+          </a:fontRef>
+        </p:style>
+      </p:cxnSp>
+      <p:sp>
+        <p:nvSpPr>
+          <p:cNvPr id="129" name="Rounded Rectangle 47">
+            <a:extLst>
+              <a:ext uri="{FF2B5EF4-FFF2-40B4-BE49-F238E27FC236}">
+                <a16:creationId xmlns:a16="http://schemas.microsoft.com/office/drawing/2014/main" id="{29F6E64C-69E5-4233-652E-AE7A5905192A}"/>
+              </a:ext>
+            </a:extLst>
+          </p:cNvPr>
+          <p:cNvSpPr/>
+          <p:nvPr/>
+        </p:nvSpPr>
+        <p:spPr>
+          <a:xfrm>
+            <a:off x="7284522" y="3634865"/>
+            <a:ext cx="1645920" cy="288000"/>
+          </a:xfrm>
+          <a:prstGeom prst="roundRect">
+            <a:avLst/>
+          </a:prstGeom>
+          <a:solidFill>
+            <a:srgbClr val="00AEC7"/>
+          </a:solidFill>
+          <a:ln>
+            <a:noFill/>
+          </a:ln>
+        </p:spPr>
+        <p:style>
+          <a:lnRef idx="2">
+            <a:schemeClr val="accent1">
+              <a:shade val="50000"/>
+            </a:schemeClr>
+          </a:lnRef>
+          <a:fillRef idx="1">
+            <a:schemeClr val="accent1"/>
+          </a:fillRef>
+          <a:effectRef idx="0">
+            <a:schemeClr val="accent1"/>
+          </a:effectRef>
+          <a:fontRef idx="minor">
+            <a:schemeClr val="lt1"/>
+          </a:fontRef>
+        </p:style>
+        <p:txBody>
+          <a:bodyPr rtlCol="0" anchor="ctr"/>
+          <a:lstStyle>
+            <a:defPPr>
+              <a:defRPr lang="en-US"/>
+            </a:defPPr>
+            <a:lvl1pPr marL="0" algn="l" defTabSz="914377" rtl="0" eaLnBrk="1" latinLnBrk="0" hangingPunct="1">
+              <a:defRPr sz="1800" kern="1200">
+                <a:solidFill>
+                  <a:schemeClr val="lt1"/>
+                </a:solidFill>
+                <a:latin typeface="+mn-lt"/>
+                <a:ea typeface="+mn-ea"/>
+                <a:cs typeface="+mn-cs"/>
+              </a:defRPr>
+            </a:lvl1pPr>
+            <a:lvl2pPr marL="457189" algn="l" defTabSz="914377" rtl="0" eaLnBrk="1" latinLnBrk="0" hangingPunct="1">
+              <a:defRPr sz="1800" kern="1200">
+                <a:solidFill>
+                  <a:schemeClr val="lt1"/>
+                </a:solidFill>
+                <a:latin typeface="+mn-lt"/>
+                <a:ea typeface="+mn-ea"/>
+                <a:cs typeface="+mn-cs"/>
+              </a:defRPr>
+            </a:lvl2pPr>
+            <a:lvl3pPr marL="914377" algn="l" defTabSz="914377" rtl="0" eaLnBrk="1" latinLnBrk="0" hangingPunct="1">
+              <a:defRPr sz="1800" kern="1200">
+                <a:solidFill>
+                  <a:schemeClr val="lt1"/>
+                </a:solidFill>
+                <a:latin typeface="+mn-lt"/>
+                <a:ea typeface="+mn-ea"/>
+                <a:cs typeface="+mn-cs"/>
+              </a:defRPr>
+            </a:lvl3pPr>
+            <a:lvl4pPr marL="1371566" algn="l" defTabSz="914377" rtl="0" eaLnBrk="1" latinLnBrk="0" hangingPunct="1">
+              <a:defRPr sz="1800" kern="1200">
+                <a:solidFill>
+                  <a:schemeClr val="lt1"/>
+                </a:solidFill>
+                <a:latin typeface="+mn-lt"/>
+                <a:ea typeface="+mn-ea"/>
+                <a:cs typeface="+mn-cs"/>
+              </a:defRPr>
+            </a:lvl4pPr>
+            <a:lvl5pPr marL="1828754" algn="l" defTabSz="914377" rtl="0" eaLnBrk="1" latinLnBrk="0" hangingPunct="1">
+              <a:defRPr sz="1800" kern="1200">
+                <a:solidFill>
+                  <a:schemeClr val="lt1"/>
+                </a:solidFill>
+                <a:latin typeface="+mn-lt"/>
+                <a:ea typeface="+mn-ea"/>
+                <a:cs typeface="+mn-cs"/>
+              </a:defRPr>
+            </a:lvl5pPr>
+            <a:lvl6pPr marL="2285943" algn="l" defTabSz="914377" rtl="0" eaLnBrk="1" latinLnBrk="0" hangingPunct="1">
+              <a:defRPr sz="1800" kern="1200">
+                <a:solidFill>
+                  <a:schemeClr val="lt1"/>
+                </a:solidFill>
+                <a:latin typeface="+mn-lt"/>
+                <a:ea typeface="+mn-ea"/>
+                <a:cs typeface="+mn-cs"/>
+              </a:defRPr>
+            </a:lvl6pPr>
+            <a:lvl7pPr marL="2743131" algn="l" defTabSz="914377" rtl="0" eaLnBrk="1" latinLnBrk="0" hangingPunct="1">
+              <a:defRPr sz="1800" kern="1200">
+                <a:solidFill>
+                  <a:schemeClr val="lt1"/>
+                </a:solidFill>
+                <a:latin typeface="+mn-lt"/>
+                <a:ea typeface="+mn-ea"/>
+                <a:cs typeface="+mn-cs"/>
+              </a:defRPr>
+            </a:lvl7pPr>
+            <a:lvl8pPr marL="3200320" algn="l" defTabSz="914377" rtl="0" eaLnBrk="1" latinLnBrk="0" hangingPunct="1">
+              <a:defRPr sz="1800" kern="1200">
+                <a:solidFill>
+                  <a:schemeClr val="lt1"/>
+                </a:solidFill>
+                <a:latin typeface="+mn-lt"/>
+                <a:ea typeface="+mn-ea"/>
+                <a:cs typeface="+mn-cs"/>
+              </a:defRPr>
+            </a:lvl8pPr>
+            <a:lvl9pPr marL="3657509" algn="l" defTabSz="914377" rtl="0" eaLnBrk="1" latinLnBrk="0" hangingPunct="1">
+              <a:defRPr sz="1800" kern="1200">
+                <a:solidFill>
+                  <a:schemeClr val="lt1"/>
+                </a:solidFill>
+                <a:latin typeface="+mn-lt"/>
+                <a:ea typeface="+mn-ea"/>
+                <a:cs typeface="+mn-cs"/>
+              </a:defRPr>
+            </a:lvl9pPr>
+          </a:lstStyle>
+          <a:p>
+            <a:pPr algn="ctr"/>
+            <a:r>
+              <a:rPr lang="en-US" sz="1100" dirty="0" err="1">
+                <a:solidFill>
+                  <a:schemeClr val="bg1"/>
+                </a:solidFill>
+              </a:rPr>
+              <a:t>LLVG_RAW_impl.c</a:t>
+            </a:r>
+            <a:endParaRPr lang="en-US" sz="1100" dirty="0">
+              <a:solidFill>
+                <a:schemeClr val="bg1"/>
+              </a:solidFill>
+            </a:endParaRPr>
+          </a:p>
+        </p:txBody>
+      </p:sp>
+      <p:sp>
+        <p:nvSpPr>
+          <p:cNvPr id="141" name="Rounded Rectangle 47">
+            <a:extLst>
+              <a:ext uri="{FF2B5EF4-FFF2-40B4-BE49-F238E27FC236}">
+                <a16:creationId xmlns:a16="http://schemas.microsoft.com/office/drawing/2014/main" id="{2A4631F1-B3B4-6932-D9A0-12BBBF3E270E}"/>
+              </a:ext>
+            </a:extLst>
+          </p:cNvPr>
+          <p:cNvSpPr/>
+          <p:nvPr/>
+        </p:nvSpPr>
+        <p:spPr>
+          <a:xfrm>
+            <a:off x="7284522" y="4036076"/>
+            <a:ext cx="1645920" cy="288000"/>
+          </a:xfrm>
+          <a:prstGeom prst="roundRect">
+            <a:avLst/>
+          </a:prstGeom>
+          <a:solidFill>
+            <a:srgbClr val="00AEC7"/>
+          </a:solidFill>
+          <a:ln>
+            <a:noFill/>
+          </a:ln>
+        </p:spPr>
+        <p:style>
+          <a:lnRef idx="2">
+            <a:schemeClr val="accent1">
+              <a:shade val="50000"/>
+            </a:schemeClr>
+          </a:lnRef>
+          <a:fillRef idx="1">
+            <a:schemeClr val="accent1"/>
+          </a:fillRef>
+          <a:effectRef idx="0">
+            <a:schemeClr val="accent1"/>
+          </a:effectRef>
+          <a:fontRef idx="minor">
+            <a:schemeClr val="lt1"/>
+          </a:fontRef>
+        </p:style>
+        <p:txBody>
+          <a:bodyPr rtlCol="0" anchor="ctr"/>
+          <a:lstStyle>
+            <a:defPPr>
+              <a:defRPr lang="en-US"/>
+            </a:defPPr>
+            <a:lvl1pPr marL="0" algn="l" defTabSz="914377" rtl="0" eaLnBrk="1" latinLnBrk="0" hangingPunct="1">
+              <a:defRPr sz="1800" kern="1200">
+                <a:solidFill>
+                  <a:schemeClr val="lt1"/>
+                </a:solidFill>
+                <a:latin typeface="+mn-lt"/>
+                <a:ea typeface="+mn-ea"/>
+                <a:cs typeface="+mn-cs"/>
+              </a:defRPr>
+            </a:lvl1pPr>
+            <a:lvl2pPr marL="457189" algn="l" defTabSz="914377" rtl="0" eaLnBrk="1" latinLnBrk="0" hangingPunct="1">
+              <a:defRPr sz="1800" kern="1200">
+                <a:solidFill>
+                  <a:schemeClr val="lt1"/>
+                </a:solidFill>
+                <a:latin typeface="+mn-lt"/>
+                <a:ea typeface="+mn-ea"/>
+                <a:cs typeface="+mn-cs"/>
+              </a:defRPr>
+            </a:lvl2pPr>
+            <a:lvl3pPr marL="914377" algn="l" defTabSz="914377" rtl="0" eaLnBrk="1" latinLnBrk="0" hangingPunct="1">
+              <a:defRPr sz="1800" kern="1200">
+                <a:solidFill>
+                  <a:schemeClr val="lt1"/>
+                </a:solidFill>
+                <a:latin typeface="+mn-lt"/>
+                <a:ea typeface="+mn-ea"/>
+                <a:cs typeface="+mn-cs"/>
+              </a:defRPr>
+            </a:lvl3pPr>
+            <a:lvl4pPr marL="1371566" algn="l" defTabSz="914377" rtl="0" eaLnBrk="1" latinLnBrk="0" hangingPunct="1">
+              <a:defRPr sz="1800" kern="1200">
+                <a:solidFill>
+                  <a:schemeClr val="lt1"/>
+                </a:solidFill>
+                <a:latin typeface="+mn-lt"/>
+                <a:ea typeface="+mn-ea"/>
+                <a:cs typeface="+mn-cs"/>
+              </a:defRPr>
+            </a:lvl4pPr>
+            <a:lvl5pPr marL="1828754" algn="l" defTabSz="914377" rtl="0" eaLnBrk="1" latinLnBrk="0" hangingPunct="1">
+              <a:defRPr sz="1800" kern="1200">
+                <a:solidFill>
+                  <a:schemeClr val="lt1"/>
+                </a:solidFill>
+                <a:latin typeface="+mn-lt"/>
+                <a:ea typeface="+mn-ea"/>
+                <a:cs typeface="+mn-cs"/>
+              </a:defRPr>
+            </a:lvl5pPr>
+            <a:lvl6pPr marL="2285943" algn="l" defTabSz="914377" rtl="0" eaLnBrk="1" latinLnBrk="0" hangingPunct="1">
+              <a:defRPr sz="1800" kern="1200">
+                <a:solidFill>
+                  <a:schemeClr val="lt1"/>
+                </a:solidFill>
+                <a:latin typeface="+mn-lt"/>
+                <a:ea typeface="+mn-ea"/>
+                <a:cs typeface="+mn-cs"/>
+              </a:defRPr>
+            </a:lvl6pPr>
+            <a:lvl7pPr marL="2743131" algn="l" defTabSz="914377" rtl="0" eaLnBrk="1" latinLnBrk="0" hangingPunct="1">
+              <a:defRPr sz="1800" kern="1200">
+                <a:solidFill>
+                  <a:schemeClr val="lt1"/>
+                </a:solidFill>
+                <a:latin typeface="+mn-lt"/>
+                <a:ea typeface="+mn-ea"/>
+                <a:cs typeface="+mn-cs"/>
+              </a:defRPr>
+            </a:lvl7pPr>
+            <a:lvl8pPr marL="3200320" algn="l" defTabSz="914377" rtl="0" eaLnBrk="1" latinLnBrk="0" hangingPunct="1">
+              <a:defRPr sz="1800" kern="1200">
+                <a:solidFill>
+                  <a:schemeClr val="lt1"/>
+                </a:solidFill>
+                <a:latin typeface="+mn-lt"/>
+                <a:ea typeface="+mn-ea"/>
+                <a:cs typeface="+mn-cs"/>
+              </a:defRPr>
+            </a:lvl8pPr>
+            <a:lvl9pPr marL="3657509" algn="l" defTabSz="914377" rtl="0" eaLnBrk="1" latinLnBrk="0" hangingPunct="1">
+              <a:defRPr sz="1800" kern="1200">
+                <a:solidFill>
+                  <a:schemeClr val="lt1"/>
+                </a:solidFill>
+                <a:latin typeface="+mn-lt"/>
+                <a:ea typeface="+mn-ea"/>
+                <a:cs typeface="+mn-cs"/>
+              </a:defRPr>
+            </a:lvl9pPr>
+          </a:lstStyle>
+          <a:p>
+            <a:pPr algn="ctr"/>
+            <a:r>
+              <a:rPr lang="en-US" sz="1100" dirty="0" err="1">
+                <a:solidFill>
+                  <a:schemeClr val="bg1"/>
+                </a:solidFill>
+              </a:rPr>
+              <a:t>ui_drawing_bvic</a:t>
+            </a:r>
+            <a:endParaRPr lang="en-US" sz="1100" dirty="0">
+              <a:solidFill>
+                <a:schemeClr val="bg1"/>
+              </a:solidFill>
+            </a:endParaRPr>
+          </a:p>
+        </p:txBody>
+      </p:sp>
+      <p:cxnSp>
+        <p:nvCxnSpPr>
+          <p:cNvPr id="142" name="Straight Arrow Connector 141">
+            <a:extLst>
+              <a:ext uri="{FF2B5EF4-FFF2-40B4-BE49-F238E27FC236}">
+                <a16:creationId xmlns:a16="http://schemas.microsoft.com/office/drawing/2014/main" id="{9140099A-8064-B503-9A38-DC1DBE4E68C3}"/>
+              </a:ext>
+            </a:extLst>
+          </p:cNvPr>
+          <p:cNvCxnSpPr>
+            <a:cxnSpLocks/>
+            <a:stCxn id="141" idx="1"/>
+            <a:endCxn id="70" idx="3"/>
+          </p:cNvCxnSpPr>
+          <p:nvPr/>
+        </p:nvCxnSpPr>
+        <p:spPr>
+          <a:xfrm flipH="1">
+            <a:off x="6306288" y="4180076"/>
+            <a:ext cx="978234" cy="8858"/>
+          </a:xfrm>
+          <a:prstGeom prst="straightConnector1">
+            <a:avLst/>
+          </a:prstGeom>
+          <a:ln>
+            <a:tailEnd type="triangle"/>
+          </a:ln>
+        </p:spPr>
+        <p:style>
+          <a:lnRef idx="1">
+            <a:schemeClr val="accent1"/>
+          </a:lnRef>
+          <a:fillRef idx="0">
+            <a:schemeClr val="accent1"/>
+          </a:fillRef>
+          <a:effectRef idx="0">
+            <a:schemeClr val="accent1"/>
+          </a:effectRef>
+          <a:fontRef idx="minor">
+            <a:schemeClr val="tx1"/>
+          </a:fontRef>
+        </p:style>
+      </p:cxnSp>
     </p:spTree>
     <p:extLst>
       <p:ext uri="{BB962C8B-B14F-4D97-AF65-F5344CB8AC3E}">

</xml_diff>

<commit_message>
harmonize colors with graphs
</commit_message>
<xml_diff>
--- a/VEEPortingGuide/images/vgLL.pptx
+++ b/VEEPortingGuide/images/vgLL.pptx
@@ -204,7 +204,7 @@
           <a:p>
             <a:fld id="{F47202D6-4449-4ABC-9430-570B72DCED4F}" type="datetimeFigureOut">
               <a:rPr lang="en-US" smtClean="0"/>
-              <a:t>23/06/05</a:t>
+              <a:t>23/06/06</a:t>
             </a:fld>
             <a:endParaRPr lang="en-US"/>
           </a:p>
@@ -956,7 +956,7 @@
           <a:p>
             <a:fld id="{4E285625-C24A-4341-90BC-6CD71F835625}" type="datetimeFigureOut">
               <a:rPr lang="en-GB" smtClean="0"/>
-              <a:t>05/06/2023</a:t>
+              <a:t>06/06/2023</a:t>
             </a:fld>
             <a:endParaRPr lang="en-GB"/>
           </a:p>
@@ -1156,7 +1156,7 @@
           <a:p>
             <a:fld id="{4E285625-C24A-4341-90BC-6CD71F835625}" type="datetimeFigureOut">
               <a:rPr lang="en-GB" smtClean="0"/>
-              <a:t>05/06/2023</a:t>
+              <a:t>06/06/2023</a:t>
             </a:fld>
             <a:endParaRPr lang="en-GB"/>
           </a:p>
@@ -1366,7 +1366,7 @@
           <a:p>
             <a:fld id="{4E285625-C24A-4341-90BC-6CD71F835625}" type="datetimeFigureOut">
               <a:rPr lang="en-GB" smtClean="0"/>
-              <a:t>05/06/2023</a:t>
+              <a:t>06/06/2023</a:t>
             </a:fld>
             <a:endParaRPr lang="en-GB"/>
           </a:p>
@@ -1566,7 +1566,7 @@
           <a:p>
             <a:fld id="{4E285625-C24A-4341-90BC-6CD71F835625}" type="datetimeFigureOut">
               <a:rPr lang="en-GB" smtClean="0"/>
-              <a:t>05/06/2023</a:t>
+              <a:t>06/06/2023</a:t>
             </a:fld>
             <a:endParaRPr lang="en-GB"/>
           </a:p>
@@ -1842,7 +1842,7 @@
           <a:p>
             <a:fld id="{4E285625-C24A-4341-90BC-6CD71F835625}" type="datetimeFigureOut">
               <a:rPr lang="en-GB" smtClean="0"/>
-              <a:t>05/06/2023</a:t>
+              <a:t>06/06/2023</a:t>
             </a:fld>
             <a:endParaRPr lang="en-GB"/>
           </a:p>
@@ -2110,7 +2110,7 @@
           <a:p>
             <a:fld id="{4E285625-C24A-4341-90BC-6CD71F835625}" type="datetimeFigureOut">
               <a:rPr lang="en-GB" smtClean="0"/>
-              <a:t>05/06/2023</a:t>
+              <a:t>06/06/2023</a:t>
             </a:fld>
             <a:endParaRPr lang="en-GB"/>
           </a:p>
@@ -2525,7 +2525,7 @@
           <a:p>
             <a:fld id="{4E285625-C24A-4341-90BC-6CD71F835625}" type="datetimeFigureOut">
               <a:rPr lang="en-GB" smtClean="0"/>
-              <a:t>05/06/2023</a:t>
+              <a:t>06/06/2023</a:t>
             </a:fld>
             <a:endParaRPr lang="en-GB"/>
           </a:p>
@@ -2667,7 +2667,7 @@
           <a:p>
             <a:fld id="{4E285625-C24A-4341-90BC-6CD71F835625}" type="datetimeFigureOut">
               <a:rPr lang="en-GB" smtClean="0"/>
-              <a:t>05/06/2023</a:t>
+              <a:t>06/06/2023</a:t>
             </a:fld>
             <a:endParaRPr lang="en-GB"/>
           </a:p>
@@ -2780,7 +2780,7 @@
           <a:p>
             <a:fld id="{4E285625-C24A-4341-90BC-6CD71F835625}" type="datetimeFigureOut">
               <a:rPr lang="en-GB" smtClean="0"/>
-              <a:t>05/06/2023</a:t>
+              <a:t>06/06/2023</a:t>
             </a:fld>
             <a:endParaRPr lang="en-GB"/>
           </a:p>
@@ -3093,7 +3093,7 @@
           <a:p>
             <a:fld id="{4E285625-C24A-4341-90BC-6CD71F835625}" type="datetimeFigureOut">
               <a:rPr lang="en-GB" smtClean="0"/>
-              <a:t>05/06/2023</a:t>
+              <a:t>06/06/2023</a:t>
             </a:fld>
             <a:endParaRPr lang="en-GB"/>
           </a:p>
@@ -3382,7 +3382,7 @@
           <a:p>
             <a:fld id="{4E285625-C24A-4341-90BC-6CD71F835625}" type="datetimeFigureOut">
               <a:rPr lang="en-GB" smtClean="0"/>
-              <a:t>05/06/2023</a:t>
+              <a:t>06/06/2023</a:t>
             </a:fld>
             <a:endParaRPr lang="en-GB"/>
           </a:p>
@@ -3625,7 +3625,7 @@
           <a:p>
             <a:fld id="{4E285625-C24A-4341-90BC-6CD71F835625}" type="datetimeFigureOut">
               <a:rPr lang="en-GB" smtClean="0"/>
-              <a:t>05/06/2023</a:t>
+              <a:t>06/06/2023</a:t>
             </a:fld>
             <a:endParaRPr lang="en-GB"/>
           </a:p>
@@ -4249,7 +4249,7 @@
             <a:avLst/>
           </a:prstGeom>
           <a:solidFill>
-            <a:srgbClr val="6CC24A"/>
+            <a:srgbClr val="00AEC7"/>
           </a:solidFill>
           <a:ln>
             <a:noFill/>
@@ -4562,7 +4562,7 @@
             <a:avLst/>
           </a:prstGeom>
           <a:solidFill>
-            <a:srgbClr val="6CC24A"/>
+            <a:srgbClr val="00AEC7"/>
           </a:solidFill>
           <a:ln>
             <a:noFill/>
@@ -4759,7 +4759,7 @@
             <a:avLst/>
           </a:prstGeom>
           <a:solidFill>
-            <a:srgbClr val="00AEC7"/>
+            <a:srgbClr val="EE502E"/>
           </a:solidFill>
           <a:ln>
             <a:noFill/>
@@ -4917,7 +4917,7 @@
             <a:avLst/>
           </a:prstGeom>
           <a:solidFill>
-            <a:srgbClr val="6CC24A"/>
+            <a:srgbClr val="00AEC7"/>
           </a:solidFill>
           <a:ln>
             <a:noFill/>
@@ -5075,7 +5075,7 @@
             <a:avLst/>
           </a:prstGeom>
           <a:solidFill>
-            <a:srgbClr val="6CC24A"/>
+            <a:srgbClr val="00AEC7"/>
           </a:solidFill>
           <a:ln>
             <a:noFill/>
@@ -5233,7 +5233,7 @@
             <a:avLst/>
           </a:prstGeom>
           <a:solidFill>
-            <a:srgbClr val="00AEC7"/>
+            <a:srgbClr val="EE502E"/>
           </a:solidFill>
           <a:ln>
             <a:noFill/>
@@ -5425,7 +5425,7 @@
             <a:avLst/>
           </a:prstGeom>
           <a:solidFill>
-            <a:srgbClr val="00AEC7"/>
+            <a:srgbClr val="EE502E"/>
           </a:solidFill>
           <a:ln>
             <a:noFill/>
@@ -5583,7 +5583,7 @@
             <a:avLst/>
           </a:prstGeom>
           <a:solidFill>
-            <a:srgbClr val="00AEC7"/>
+            <a:srgbClr val="EE502E"/>
           </a:solidFill>
           <a:ln>
             <a:noFill/>
@@ -5741,7 +5741,7 @@
             <a:avLst/>
           </a:prstGeom>
           <a:solidFill>
-            <a:srgbClr val="6CC24A"/>
+            <a:srgbClr val="00AEC7"/>
           </a:solidFill>
           <a:ln>
             <a:noFill/>
@@ -5899,7 +5899,7 @@
             <a:avLst/>
           </a:prstGeom>
           <a:solidFill>
-            <a:srgbClr val="6CC24A"/>
+            <a:srgbClr val="00AEC7"/>
           </a:solidFill>
           <a:ln>
             <a:noFill/>
@@ -6057,7 +6057,7 @@
             <a:avLst/>
           </a:prstGeom>
           <a:solidFill>
-            <a:srgbClr val="6CC24A"/>
+            <a:srgbClr val="00AEC7"/>
           </a:solidFill>
           <a:ln>
             <a:noFill/>
@@ -6215,7 +6215,7 @@
             <a:avLst/>
           </a:prstGeom>
           <a:solidFill>
-            <a:srgbClr val="00AEC7"/>
+            <a:srgbClr val="EE502E"/>
           </a:solidFill>
           <a:ln>
             <a:noFill/>
@@ -6373,7 +6373,7 @@
             <a:avLst/>
           </a:prstGeom>
           <a:solidFill>
-            <a:srgbClr val="6CC24A"/>
+            <a:srgbClr val="00AEC7"/>
           </a:solidFill>
           <a:ln>
             <a:noFill/>
@@ -6531,7 +6531,7 @@
             <a:avLst/>
           </a:prstGeom>
           <a:solidFill>
-            <a:srgbClr val="00AEC7"/>
+            <a:srgbClr val="EE502E"/>
           </a:solidFill>
           <a:ln>
             <a:noFill/>
@@ -6689,7 +6689,7 @@
             <a:avLst/>
           </a:prstGeom>
           <a:solidFill>
-            <a:srgbClr val="00AEC7"/>
+            <a:srgbClr val="EE502E"/>
           </a:solidFill>
           <a:ln>
             <a:noFill/>
@@ -6847,7 +6847,7 @@
             <a:avLst/>
           </a:prstGeom>
           <a:solidFill>
-            <a:srgbClr val="00AEC7"/>
+            <a:srgbClr val="EE502E"/>
           </a:solidFill>
           <a:ln>
             <a:noFill/>
@@ -7005,7 +7005,7 @@
             <a:avLst/>
           </a:prstGeom>
           <a:solidFill>
-            <a:srgbClr val="00AEC7"/>
+            <a:srgbClr val="EE502E"/>
           </a:solidFill>
           <a:ln>
             <a:noFill/>
@@ -7163,7 +7163,7 @@
             <a:avLst/>
           </a:prstGeom>
           <a:solidFill>
-            <a:srgbClr val="00AEC7"/>
+            <a:srgbClr val="EE502E"/>
           </a:solidFill>
           <a:ln>
             <a:noFill/>
@@ -7321,7 +7321,7 @@
             <a:avLst/>
           </a:prstGeom>
           <a:solidFill>
-            <a:srgbClr val="00AEC7"/>
+            <a:srgbClr val="EE502E"/>
           </a:solidFill>
           <a:ln>
             <a:noFill/>
@@ -7479,7 +7479,7 @@
             <a:avLst/>
           </a:prstGeom>
           <a:solidFill>
-            <a:srgbClr val="6CC24A"/>
+            <a:srgbClr val="00AEC7"/>
           </a:solidFill>
           <a:ln>
             <a:noFill/>
@@ -7618,10 +7618,10 @@
       </p:sp>
       <p:grpSp>
         <p:nvGrpSpPr>
-          <p:cNvPr id="21" name="Group 20">
+          <p:cNvPr id="52" name="Group 51">
             <a:extLst>
               <a:ext uri="{FF2B5EF4-FFF2-40B4-BE49-F238E27FC236}">
-                <a16:creationId xmlns:a16="http://schemas.microsoft.com/office/drawing/2014/main" id="{74EAC1CE-A652-8D8B-2FEE-A90BFA1F4B43}"/>
+                <a16:creationId xmlns:a16="http://schemas.microsoft.com/office/drawing/2014/main" id="{E6BFB303-AB30-476D-42F6-17F2E928A01A}"/>
               </a:ext>
             </a:extLst>
           </p:cNvPr>
@@ -7630,7 +7630,7 @@
         </p:nvGrpSpPr>
         <p:grpSpPr>
           <a:xfrm>
-            <a:off x="363722" y="5213276"/>
+            <a:off x="315544" y="5161319"/>
             <a:ext cx="1809751" cy="276999"/>
             <a:chOff x="1181100" y="4410075"/>
             <a:chExt cx="1809751" cy="276999"/>
@@ -7638,10 +7638,10 @@
         </p:grpSpPr>
         <p:sp>
           <p:nvSpPr>
-            <p:cNvPr id="22" name="Oval 21">
+            <p:cNvPr id="53" name="Oval 52">
               <a:extLst>
                 <a:ext uri="{FF2B5EF4-FFF2-40B4-BE49-F238E27FC236}">
-                  <a16:creationId xmlns:a16="http://schemas.microsoft.com/office/drawing/2014/main" id="{00969D4E-F485-5E1A-8FA9-A03F033E1FA6}"/>
+                  <a16:creationId xmlns:a16="http://schemas.microsoft.com/office/drawing/2014/main" id="{1F41B3FB-BBB0-4109-49E8-36631EB3291B}"/>
                 </a:ext>
               </a:extLst>
             </p:cNvPr>
@@ -7689,10 +7689,10 @@
         </p:sp>
         <p:sp>
           <p:nvSpPr>
-            <p:cNvPr id="24" name="TextBox 23">
+            <p:cNvPr id="54" name="TextBox 53">
               <a:extLst>
                 <a:ext uri="{FF2B5EF4-FFF2-40B4-BE49-F238E27FC236}">
-                  <a16:creationId xmlns:a16="http://schemas.microsoft.com/office/drawing/2014/main" id="{FA4D52FA-7A95-0872-7179-E3628EEBF2CE}"/>
+                  <a16:creationId xmlns:a16="http://schemas.microsoft.com/office/drawing/2014/main" id="{C51B2069-8049-BF68-D436-3B37441A3F03}"/>
                 </a:ext>
               </a:extLst>
             </p:cNvPr>
@@ -7725,10 +7725,10 @@
       </p:grpSp>
       <p:grpSp>
         <p:nvGrpSpPr>
-          <p:cNvPr id="26" name="Group 25">
+          <p:cNvPr id="55" name="Group 54">
             <a:extLst>
               <a:ext uri="{FF2B5EF4-FFF2-40B4-BE49-F238E27FC236}">
-                <a16:creationId xmlns:a16="http://schemas.microsoft.com/office/drawing/2014/main" id="{4D12CFDB-3040-977A-643A-196EB7FD5479}"/>
+                <a16:creationId xmlns:a16="http://schemas.microsoft.com/office/drawing/2014/main" id="{E4BCF8B9-B34E-1934-7D03-7F0A9892C96A}"/>
               </a:ext>
             </a:extLst>
           </p:cNvPr>
@@ -7737,7 +7737,7 @@
         </p:nvGrpSpPr>
         <p:grpSpPr>
           <a:xfrm>
-            <a:off x="363722" y="5762000"/>
+            <a:off x="315544" y="5710043"/>
             <a:ext cx="1809751" cy="276999"/>
             <a:chOff x="1181100" y="4410075"/>
             <a:chExt cx="1809751" cy="276999"/>
@@ -7745,115 +7745,10 @@
         </p:grpSpPr>
         <p:sp>
           <p:nvSpPr>
-            <p:cNvPr id="27" name="Oval 26">
+            <p:cNvPr id="56" name="Oval 55">
               <a:extLst>
                 <a:ext uri="{FF2B5EF4-FFF2-40B4-BE49-F238E27FC236}">
-                  <a16:creationId xmlns:a16="http://schemas.microsoft.com/office/drawing/2014/main" id="{C7FAB082-A8BB-05CD-BCC2-36A2897FA47D}"/>
-                </a:ext>
-              </a:extLst>
-            </p:cNvPr>
-            <p:cNvSpPr/>
-            <p:nvPr/>
-          </p:nvSpPr>
-          <p:spPr>
-            <a:xfrm>
-              <a:off x="1181100" y="4410075"/>
-              <a:ext cx="247650" cy="238125"/>
-            </a:xfrm>
-            <a:prstGeom prst="ellipse">
-              <a:avLst/>
-            </a:prstGeom>
-            <a:solidFill>
-              <a:srgbClr val="00AEC7"/>
-            </a:solidFill>
-          </p:spPr>
-          <p:style>
-            <a:lnRef idx="2">
-              <a:schemeClr val="accent1">
-                <a:shade val="50000"/>
-              </a:schemeClr>
-            </a:lnRef>
-            <a:fillRef idx="1">
-              <a:schemeClr val="accent1"/>
-            </a:fillRef>
-            <a:effectRef idx="0">
-              <a:schemeClr val="accent1"/>
-            </a:effectRef>
-            <a:fontRef idx="minor">
-              <a:schemeClr val="lt1"/>
-            </a:fontRef>
-          </p:style>
-          <p:txBody>
-            <a:bodyPr rtlCol="0" anchor="ctr"/>
-            <a:lstStyle/>
-            <a:p>
-              <a:pPr algn="ctr"/>
-              <a:endParaRPr lang="en-US" dirty="0"/>
-            </a:p>
-          </p:txBody>
-        </p:sp>
-        <p:sp>
-          <p:nvSpPr>
-            <p:cNvPr id="28" name="TextBox 27">
-              <a:extLst>
-                <a:ext uri="{FF2B5EF4-FFF2-40B4-BE49-F238E27FC236}">
-                  <a16:creationId xmlns:a16="http://schemas.microsoft.com/office/drawing/2014/main" id="{22B5569B-F046-85E6-1C7B-51E6E523B8D8}"/>
-                </a:ext>
-              </a:extLst>
-            </p:cNvPr>
-            <p:cNvSpPr txBox="1"/>
-            <p:nvPr/>
-          </p:nvSpPr>
-          <p:spPr>
-            <a:xfrm>
-              <a:off x="1428751" y="4410075"/>
-              <a:ext cx="1562100" cy="276999"/>
-            </a:xfrm>
-            <a:prstGeom prst="rect">
-              <a:avLst/>
-            </a:prstGeom>
-            <a:noFill/>
-          </p:spPr>
-          <p:txBody>
-            <a:bodyPr wrap="square" rtlCol="0">
-              <a:spAutoFit/>
-            </a:bodyPr>
-            <a:lstStyle/>
-            <a:p>
-              <a:r>
-                <a:rPr lang="en-US" sz="1200" dirty="0"/>
-                <a:t>C file</a:t>
-              </a:r>
-            </a:p>
-          </p:txBody>
-        </p:sp>
-      </p:grpSp>
-      <p:grpSp>
-        <p:nvGrpSpPr>
-          <p:cNvPr id="30" name="Group 29">
-            <a:extLst>
-              <a:ext uri="{FF2B5EF4-FFF2-40B4-BE49-F238E27FC236}">
-                <a16:creationId xmlns:a16="http://schemas.microsoft.com/office/drawing/2014/main" id="{165F493C-CEFB-5BF4-1985-12800DE21731}"/>
-              </a:ext>
-            </a:extLst>
-          </p:cNvPr>
-          <p:cNvGrpSpPr/>
-          <p:nvPr/>
-        </p:nvGrpSpPr>
-        <p:grpSpPr>
-          <a:xfrm>
-            <a:off x="363722" y="6036362"/>
-            <a:ext cx="1809751" cy="276999"/>
-            <a:chOff x="1181100" y="4410075"/>
-            <a:chExt cx="1809751" cy="276999"/>
-          </a:xfrm>
-        </p:grpSpPr>
-        <p:sp>
-          <p:nvSpPr>
-            <p:cNvPr id="31" name="Oval 30">
-              <a:extLst>
-                <a:ext uri="{FF2B5EF4-FFF2-40B4-BE49-F238E27FC236}">
-                  <a16:creationId xmlns:a16="http://schemas.microsoft.com/office/drawing/2014/main" id="{018422C4-4176-00C5-4F86-DD83230C8388}"/>
+                  <a16:creationId xmlns:a16="http://schemas.microsoft.com/office/drawing/2014/main" id="{FDEEA6FD-46A2-E533-456C-D615577AA8D2}"/>
                 </a:ext>
               </a:extLst>
             </p:cNvPr>
@@ -7899,10 +7794,115 @@
         </p:sp>
         <p:sp>
           <p:nvSpPr>
-            <p:cNvPr id="32" name="TextBox 31">
+            <p:cNvPr id="57" name="TextBox 56">
               <a:extLst>
                 <a:ext uri="{FF2B5EF4-FFF2-40B4-BE49-F238E27FC236}">
-                  <a16:creationId xmlns:a16="http://schemas.microsoft.com/office/drawing/2014/main" id="{B8A5D192-106D-01D6-3F62-710CF62E9250}"/>
+                  <a16:creationId xmlns:a16="http://schemas.microsoft.com/office/drawing/2014/main" id="{D028FBC8-FC5E-40B9-6D6F-77561E7BBFF8}"/>
+                </a:ext>
+              </a:extLst>
+            </p:cNvPr>
+            <p:cNvSpPr txBox="1"/>
+            <p:nvPr/>
+          </p:nvSpPr>
+          <p:spPr>
+            <a:xfrm>
+              <a:off x="1428751" y="4410075"/>
+              <a:ext cx="1562100" cy="276999"/>
+            </a:xfrm>
+            <a:prstGeom prst="rect">
+              <a:avLst/>
+            </a:prstGeom>
+            <a:noFill/>
+          </p:spPr>
+          <p:txBody>
+            <a:bodyPr wrap="square" rtlCol="0">
+              <a:spAutoFit/>
+            </a:bodyPr>
+            <a:lstStyle/>
+            <a:p>
+              <a:r>
+                <a:rPr lang="en-US" sz="1200" dirty="0"/>
+                <a:t>C file</a:t>
+              </a:r>
+            </a:p>
+          </p:txBody>
+        </p:sp>
+      </p:grpSp>
+      <p:grpSp>
+        <p:nvGrpSpPr>
+          <p:cNvPr id="58" name="Group 57">
+            <a:extLst>
+              <a:ext uri="{FF2B5EF4-FFF2-40B4-BE49-F238E27FC236}">
+                <a16:creationId xmlns:a16="http://schemas.microsoft.com/office/drawing/2014/main" id="{F18CD4EC-E3D9-4EB5-3C2A-D354540CF2EB}"/>
+              </a:ext>
+            </a:extLst>
+          </p:cNvPr>
+          <p:cNvGrpSpPr/>
+          <p:nvPr/>
+        </p:nvGrpSpPr>
+        <p:grpSpPr>
+          <a:xfrm>
+            <a:off x="315544" y="5984405"/>
+            <a:ext cx="1809751" cy="276999"/>
+            <a:chOff x="1181100" y="4410075"/>
+            <a:chExt cx="1809751" cy="276999"/>
+          </a:xfrm>
+        </p:grpSpPr>
+        <p:sp>
+          <p:nvSpPr>
+            <p:cNvPr id="59" name="Oval 58">
+              <a:extLst>
+                <a:ext uri="{FF2B5EF4-FFF2-40B4-BE49-F238E27FC236}">
+                  <a16:creationId xmlns:a16="http://schemas.microsoft.com/office/drawing/2014/main" id="{15112249-B5BA-8469-A12E-C07298326F6C}"/>
+                </a:ext>
+              </a:extLst>
+            </p:cNvPr>
+            <p:cNvSpPr/>
+            <p:nvPr/>
+          </p:nvSpPr>
+          <p:spPr>
+            <a:xfrm>
+              <a:off x="1181100" y="4410075"/>
+              <a:ext cx="247650" cy="238125"/>
+            </a:xfrm>
+            <a:prstGeom prst="ellipse">
+              <a:avLst/>
+            </a:prstGeom>
+            <a:solidFill>
+              <a:srgbClr val="6CC24A"/>
+            </a:solidFill>
+          </p:spPr>
+          <p:style>
+            <a:lnRef idx="2">
+              <a:schemeClr val="accent1">
+                <a:shade val="50000"/>
+              </a:schemeClr>
+            </a:lnRef>
+            <a:fillRef idx="1">
+              <a:schemeClr val="accent1"/>
+            </a:fillRef>
+            <a:effectRef idx="0">
+              <a:schemeClr val="accent1"/>
+            </a:effectRef>
+            <a:fontRef idx="minor">
+              <a:schemeClr val="lt1"/>
+            </a:fontRef>
+          </p:style>
+          <p:txBody>
+            <a:bodyPr rtlCol="0" anchor="ctr"/>
+            <a:lstStyle/>
+            <a:p>
+              <a:pPr algn="ctr"/>
+              <a:endParaRPr lang="en-US" dirty="0"/>
+            </a:p>
+          </p:txBody>
+        </p:sp>
+        <p:sp>
+          <p:nvSpPr>
+            <p:cNvPr id="60" name="TextBox 59">
+              <a:extLst>
+                <a:ext uri="{FF2B5EF4-FFF2-40B4-BE49-F238E27FC236}">
+                  <a16:creationId xmlns:a16="http://schemas.microsoft.com/office/drawing/2014/main" id="{CF58DBF6-6FE6-F916-B73B-7A53CC98B410}"/>
                 </a:ext>
               </a:extLst>
             </p:cNvPr>
@@ -7935,10 +7935,10 @@
       </p:grpSp>
       <p:grpSp>
         <p:nvGrpSpPr>
-          <p:cNvPr id="34" name="Group 33">
+          <p:cNvPr id="61" name="Group 60">
             <a:extLst>
               <a:ext uri="{FF2B5EF4-FFF2-40B4-BE49-F238E27FC236}">
-                <a16:creationId xmlns:a16="http://schemas.microsoft.com/office/drawing/2014/main" id="{2820B026-F9A5-7C94-19D9-4E1AD072FCC0}"/>
+                <a16:creationId xmlns:a16="http://schemas.microsoft.com/office/drawing/2014/main" id="{754D5DBD-C112-A5F8-37A8-AFEFABE1C546}"/>
               </a:ext>
             </a:extLst>
           </p:cNvPr>
@@ -7947,7 +7947,7 @@
         </p:nvGrpSpPr>
         <p:grpSpPr>
           <a:xfrm>
-            <a:off x="363722" y="5487638"/>
+            <a:off x="315544" y="5435681"/>
             <a:ext cx="1809751" cy="276999"/>
             <a:chOff x="1181100" y="4410075"/>
             <a:chExt cx="1809751" cy="276999"/>
@@ -7955,10 +7955,10 @@
         </p:grpSpPr>
         <p:sp>
           <p:nvSpPr>
-            <p:cNvPr id="36" name="Oval 35">
+            <p:cNvPr id="62" name="Oval 61">
               <a:extLst>
                 <a:ext uri="{FF2B5EF4-FFF2-40B4-BE49-F238E27FC236}">
-                  <a16:creationId xmlns:a16="http://schemas.microsoft.com/office/drawing/2014/main" id="{AB9DDD1E-C64C-21BA-21CE-F332854A9299}"/>
+                  <a16:creationId xmlns:a16="http://schemas.microsoft.com/office/drawing/2014/main" id="{9876AABD-7522-ADFC-2809-1754C22618BE}"/>
                 </a:ext>
               </a:extLst>
             </p:cNvPr>
@@ -7974,7 +7974,7 @@
               <a:avLst/>
             </a:prstGeom>
             <a:solidFill>
-              <a:schemeClr val="accent6"/>
+              <a:srgbClr val="00AEC7"/>
             </a:solidFill>
             <a:ln w="12700">
               <a:solidFill>
@@ -8007,10 +8007,10 @@
         </p:sp>
         <p:sp>
           <p:nvSpPr>
-            <p:cNvPr id="37" name="TextBox 36">
+            <p:cNvPr id="63" name="TextBox 62">
               <a:extLst>
                 <a:ext uri="{FF2B5EF4-FFF2-40B4-BE49-F238E27FC236}">
-                  <a16:creationId xmlns:a16="http://schemas.microsoft.com/office/drawing/2014/main" id="{86042E37-C2C8-800E-C967-4DCC7144A33F}"/>
+                  <a16:creationId xmlns:a16="http://schemas.microsoft.com/office/drawing/2014/main" id="{0B162FF7-4891-7AAB-EF2C-B23C7A23B632}"/>
                 </a:ext>
               </a:extLst>
             </p:cNvPr>
@@ -8154,7 +8154,7 @@
             <a:avLst/>
           </a:prstGeom>
           <a:solidFill>
-            <a:srgbClr val="EE502E"/>
+            <a:srgbClr val="6CC24A"/>
           </a:solidFill>
           <a:ln>
             <a:noFill/>
@@ -8439,10 +8439,10 @@
       </p:sp>
       <p:grpSp>
         <p:nvGrpSpPr>
-          <p:cNvPr id="26" name="Group 25">
+          <p:cNvPr id="2" name="Group 1">
             <a:extLst>
               <a:ext uri="{FF2B5EF4-FFF2-40B4-BE49-F238E27FC236}">
-                <a16:creationId xmlns:a16="http://schemas.microsoft.com/office/drawing/2014/main" id="{974C1ECD-D379-D99C-9215-98D1708BD7D2}"/>
+                <a16:creationId xmlns:a16="http://schemas.microsoft.com/office/drawing/2014/main" id="{3D33B70D-C5AF-64E0-130B-05BB01EB7853}"/>
               </a:ext>
             </a:extLst>
           </p:cNvPr>
@@ -8451,7 +8451,7 @@
         </p:nvGrpSpPr>
         <p:grpSpPr>
           <a:xfrm>
-            <a:off x="393202" y="2545189"/>
+            <a:off x="335184" y="2764570"/>
             <a:ext cx="1809751" cy="276999"/>
             <a:chOff x="1181100" y="4410075"/>
             <a:chExt cx="1809751" cy="276999"/>
@@ -8459,10 +8459,10 @@
         </p:grpSpPr>
         <p:sp>
           <p:nvSpPr>
-            <p:cNvPr id="27" name="Oval 26">
+            <p:cNvPr id="3" name="Oval 2">
               <a:extLst>
                 <a:ext uri="{FF2B5EF4-FFF2-40B4-BE49-F238E27FC236}">
-                  <a16:creationId xmlns:a16="http://schemas.microsoft.com/office/drawing/2014/main" id="{568292FF-5AD0-8187-2B55-9A0AD5507A58}"/>
+                  <a16:creationId xmlns:a16="http://schemas.microsoft.com/office/drawing/2014/main" id="{806573DC-8C80-63D5-AE6B-0C2BE62FFE03}"/>
                 </a:ext>
               </a:extLst>
             </p:cNvPr>
@@ -8510,10 +8510,10 @@
         </p:sp>
         <p:sp>
           <p:nvSpPr>
-            <p:cNvPr id="28" name="TextBox 27">
+            <p:cNvPr id="4" name="TextBox 3">
               <a:extLst>
                 <a:ext uri="{FF2B5EF4-FFF2-40B4-BE49-F238E27FC236}">
-                  <a16:creationId xmlns:a16="http://schemas.microsoft.com/office/drawing/2014/main" id="{47ADF71E-B934-DE09-11DF-9214BD4C5FBA}"/>
+                  <a16:creationId xmlns:a16="http://schemas.microsoft.com/office/drawing/2014/main" id="{0957C73E-7CED-F7A9-396A-CC055E3D809F}"/>
                 </a:ext>
               </a:extLst>
             </p:cNvPr>
@@ -8546,10 +8546,10 @@
       </p:grpSp>
       <p:grpSp>
         <p:nvGrpSpPr>
-          <p:cNvPr id="34" name="Group 33">
+          <p:cNvPr id="8" name="Group 7">
             <a:extLst>
               <a:ext uri="{FF2B5EF4-FFF2-40B4-BE49-F238E27FC236}">
-                <a16:creationId xmlns:a16="http://schemas.microsoft.com/office/drawing/2014/main" id="{591A9C23-5E18-74AF-1789-909F8B3319D1}"/>
+                <a16:creationId xmlns:a16="http://schemas.microsoft.com/office/drawing/2014/main" id="{CD6EE45A-F8F5-3B7C-A1C4-7E1CEC6E148D}"/>
               </a:ext>
             </a:extLst>
           </p:cNvPr>
@@ -8558,7 +8558,7 @@
         </p:nvGrpSpPr>
         <p:grpSpPr>
           <a:xfrm>
-            <a:off x="393202" y="2917320"/>
+            <a:off x="335184" y="3152001"/>
             <a:ext cx="1809751" cy="276999"/>
             <a:chOff x="1181100" y="4410075"/>
             <a:chExt cx="1809751" cy="276999"/>
@@ -8566,10 +8566,10 @@
         </p:grpSpPr>
         <p:sp>
           <p:nvSpPr>
-            <p:cNvPr id="36" name="Oval 35">
+            <p:cNvPr id="10" name="Oval 9">
               <a:extLst>
                 <a:ext uri="{FF2B5EF4-FFF2-40B4-BE49-F238E27FC236}">
-                  <a16:creationId xmlns:a16="http://schemas.microsoft.com/office/drawing/2014/main" id="{E75A16C7-2D7E-17EA-D51E-6575F7AA6C43}"/>
+                  <a16:creationId xmlns:a16="http://schemas.microsoft.com/office/drawing/2014/main" id="{4F6BFD2F-A69D-362D-7D95-EA9E3B987306}"/>
                 </a:ext>
               </a:extLst>
             </p:cNvPr>
@@ -8585,7 +8585,7 @@
               <a:avLst/>
             </a:prstGeom>
             <a:solidFill>
-              <a:srgbClr val="EE502E"/>
+              <a:srgbClr val="6CC24A"/>
             </a:solidFill>
           </p:spPr>
           <p:style>
@@ -8615,10 +8615,10 @@
         </p:sp>
         <p:sp>
           <p:nvSpPr>
-            <p:cNvPr id="37" name="TextBox 36">
+            <p:cNvPr id="11" name="TextBox 10">
               <a:extLst>
                 <a:ext uri="{FF2B5EF4-FFF2-40B4-BE49-F238E27FC236}">
-                  <a16:creationId xmlns:a16="http://schemas.microsoft.com/office/drawing/2014/main" id="{3C6BAD9A-9EBB-4A43-1D01-662134EE0680}"/>
+                  <a16:creationId xmlns:a16="http://schemas.microsoft.com/office/drawing/2014/main" id="{66186C43-7834-959D-DE27-9783810EB7F4}"/>
                 </a:ext>
               </a:extLst>
             </p:cNvPr>
@@ -8979,7 +8979,7 @@
             <a:avLst/>
           </a:prstGeom>
           <a:solidFill>
-            <a:srgbClr val="00AEC7"/>
+            <a:srgbClr val="EE502E"/>
           </a:solidFill>
           <a:ln>
             <a:noFill/>
@@ -9244,7 +9244,7 @@
             <a:avLst/>
           </a:prstGeom>
           <a:solidFill>
-            <a:srgbClr val="6CC24A"/>
+            <a:srgbClr val="00AEC7"/>
           </a:solidFill>
           <a:ln>
             <a:noFill/>
@@ -9973,7 +9973,7 @@
             <a:avLst/>
           </a:prstGeom>
           <a:solidFill>
-            <a:srgbClr val="00AEC7"/>
+            <a:srgbClr val="EE502E"/>
           </a:solidFill>
           <a:ln>
             <a:noFill/>
@@ -10131,7 +10131,7 @@
             <a:avLst/>
           </a:prstGeom>
           <a:solidFill>
-            <a:srgbClr val="00AEC7"/>
+            <a:srgbClr val="EE502E"/>
           </a:solidFill>
           <a:ln>
             <a:noFill/>
@@ -10398,7 +10398,7 @@
             <a:avLst/>
           </a:prstGeom>
           <a:solidFill>
-            <a:srgbClr val="6CC24A"/>
+            <a:srgbClr val="00AEC7"/>
           </a:solidFill>
           <a:ln>
             <a:noFill/>
@@ -10556,7 +10556,7 @@
             <a:avLst/>
           </a:prstGeom>
           <a:solidFill>
-            <a:srgbClr val="6CC24A"/>
+            <a:srgbClr val="00AEC7"/>
           </a:solidFill>
           <a:ln>
             <a:noFill/>
@@ -10714,7 +10714,7 @@
             <a:avLst/>
           </a:prstGeom>
           <a:solidFill>
-            <a:srgbClr val="6CC24A"/>
+            <a:srgbClr val="00AEC7"/>
           </a:solidFill>
           <a:ln>
             <a:noFill/>
@@ -11409,7 +11409,7 @@
             <a:avLst/>
           </a:prstGeom>
           <a:solidFill>
-            <a:srgbClr val="00AEC7"/>
+            <a:srgbClr val="EE502E"/>
           </a:solidFill>
           <a:ln>
             <a:noFill/>
@@ -11602,7 +11602,7 @@
             <a:avLst/>
           </a:prstGeom>
           <a:solidFill>
-            <a:srgbClr val="00AEC7"/>
+            <a:srgbClr val="EE502E"/>
           </a:solidFill>
           <a:ln>
             <a:noFill/>
@@ -11869,7 +11869,7 @@
             <a:avLst/>
           </a:prstGeom>
           <a:solidFill>
-            <a:srgbClr val="6CC24A"/>
+            <a:srgbClr val="00AEC7"/>
           </a:solidFill>
           <a:ln>
             <a:noFill/>
@@ -12038,7 +12038,7 @@
             <a:avLst/>
           </a:prstGeom>
           <a:solidFill>
-            <a:srgbClr val="6CC24A"/>
+            <a:srgbClr val="00AEC7"/>
           </a:solidFill>
           <a:ln>
             <a:noFill/>
@@ -12196,7 +12196,7 @@
             <a:avLst/>
           </a:prstGeom>
           <a:solidFill>
-            <a:srgbClr val="6CC24A"/>
+            <a:srgbClr val="00AEC7"/>
           </a:solidFill>
           <a:ln>
             <a:noFill/>
@@ -12926,7 +12926,7 @@
             <a:avLst/>
           </a:prstGeom>
           <a:solidFill>
-            <a:srgbClr val="00AEC7"/>
+            <a:srgbClr val="EE502E"/>
           </a:solidFill>
           <a:ln>
             <a:noFill/>
@@ -13156,7 +13156,7 @@
             <a:avLst/>
           </a:prstGeom>
           <a:solidFill>
-            <a:srgbClr val="00AEC7"/>
+            <a:srgbClr val="EE502E"/>
           </a:solidFill>
           <a:ln>
             <a:noFill/>
@@ -13314,7 +13314,7 @@
             <a:avLst/>
           </a:prstGeom>
           <a:solidFill>
-            <a:srgbClr val="EE502E"/>
+            <a:srgbClr val="6CC24A"/>
           </a:solidFill>
           <a:ln>
             <a:noFill/>
@@ -13467,7 +13467,7 @@
             <a:avLst/>
           </a:prstGeom>
           <a:solidFill>
-            <a:srgbClr val="EE502E"/>
+            <a:srgbClr val="6CC24A"/>
           </a:solidFill>
           <a:ln>
             <a:noFill/>
@@ -13620,7 +13620,7 @@
             <a:avLst/>
           </a:prstGeom>
           <a:solidFill>
-            <a:srgbClr val="6CC24A"/>
+            <a:srgbClr val="00AEC7"/>
           </a:solidFill>
           <a:ln>
             <a:noFill/>
@@ -13778,7 +13778,7 @@
             <a:avLst/>
           </a:prstGeom>
           <a:solidFill>
-            <a:srgbClr val="6CC24A"/>
+            <a:srgbClr val="00AEC7"/>
           </a:solidFill>
           <a:ln>
             <a:noFill/>
@@ -14473,7 +14473,7 @@
             <a:avLst/>
           </a:prstGeom>
           <a:solidFill>
-            <a:srgbClr val="00AEC7"/>
+            <a:srgbClr val="EE502E"/>
           </a:solidFill>
           <a:ln>
             <a:noFill/>
@@ -14595,14 +14595,14 @@
           <a:p>
             <a:pPr algn="ctr"/>
             <a:r>
-              <a:rPr lang="en-US" sz="900" dirty="0" err="1">
+              <a:rPr lang="en-US" sz="1100" dirty="0" err="1">
                 <a:solidFill>
                   <a:schemeClr val="bg1"/>
                 </a:solidFill>
               </a:rPr>
               <a:t>LLVG_BVI_impl.c</a:t>
             </a:r>
-            <a:endParaRPr lang="en-US" sz="900" dirty="0">
+            <a:endParaRPr lang="en-US" sz="1100" dirty="0">
               <a:solidFill>
                 <a:schemeClr val="bg1"/>
               </a:solidFill>
@@ -14666,7 +14666,7 @@
             <a:avLst/>
           </a:prstGeom>
           <a:solidFill>
-            <a:srgbClr val="00AEC7"/>
+            <a:srgbClr val="EE502E"/>
           </a:solidFill>
           <a:ln>
             <a:noFill/>
@@ -14933,7 +14933,7 @@
             <a:avLst/>
           </a:prstGeom>
           <a:solidFill>
-            <a:srgbClr val="6CC24A"/>
+            <a:srgbClr val="00AEC7"/>
           </a:solidFill>
           <a:ln>
             <a:noFill/>
@@ -15091,7 +15091,7 @@
             <a:avLst/>
           </a:prstGeom>
           <a:solidFill>
-            <a:srgbClr val="6CC24A"/>
+            <a:srgbClr val="00AEC7"/>
           </a:solidFill>
           <a:ln>
             <a:noFill/>
@@ -15375,7 +15375,7 @@
             <a:avLst/>
           </a:prstGeom>
           <a:solidFill>
-            <a:srgbClr val="6CC24A"/>
+            <a:srgbClr val="00AEC7"/>
           </a:solidFill>
           <a:ln>
             <a:noFill/>
@@ -15636,7 +15636,7 @@
             <a:avLst/>
           </a:prstGeom>
           <a:solidFill>
-            <a:srgbClr val="00AEC7"/>
+            <a:srgbClr val="EE502E"/>
           </a:solidFill>
           <a:ln>
             <a:noFill/>
@@ -15890,7 +15890,7 @@
             <a:avLst/>
           </a:prstGeom>
           <a:solidFill>
-            <a:srgbClr val="6CC24A"/>
+            <a:srgbClr val="00AEC7"/>
           </a:solidFill>
           <a:ln>
             <a:noFill/>
@@ -16048,7 +16048,7 @@
             <a:avLst/>
           </a:prstGeom>
           <a:solidFill>
-            <a:srgbClr val="6CC24A"/>
+            <a:srgbClr val="00AEC7"/>
           </a:solidFill>
           <a:ln>
             <a:noFill/>
@@ -16206,7 +16206,7 @@
             <a:avLst/>
           </a:prstGeom>
           <a:solidFill>
-            <a:srgbClr val="6CC24A"/>
+            <a:srgbClr val="00AEC7"/>
           </a:solidFill>
           <a:ln>
             <a:noFill/>
@@ -16364,7 +16364,7 @@
             <a:avLst/>
           </a:prstGeom>
           <a:solidFill>
-            <a:srgbClr val="6CC24A"/>
+            <a:srgbClr val="00AEC7"/>
           </a:solidFill>
           <a:ln>
             <a:noFill/>
@@ -16522,7 +16522,7 @@
             <a:avLst/>
           </a:prstGeom>
           <a:solidFill>
-            <a:srgbClr val="6CC24A"/>
+            <a:srgbClr val="00AEC7"/>
           </a:solidFill>
           <a:ln>
             <a:noFill/>
@@ -16783,7 +16783,7 @@
             <a:avLst/>
           </a:prstGeom>
           <a:solidFill>
-            <a:srgbClr val="00AEC7"/>
+            <a:srgbClr val="EE502E"/>
           </a:solidFill>
           <a:ln>
             <a:noFill/>
@@ -16941,7 +16941,7 @@
             <a:avLst/>
           </a:prstGeom>
           <a:solidFill>
-            <a:srgbClr val="00AEC7"/>
+            <a:srgbClr val="EE502E"/>
           </a:solidFill>
           <a:ln>
             <a:noFill/>
@@ -17099,7 +17099,7 @@
             <a:avLst/>
           </a:prstGeom>
           <a:solidFill>
-            <a:srgbClr val="6CC24A"/>
+            <a:srgbClr val="00AEC7"/>
           </a:solidFill>
           <a:ln>
             <a:noFill/>
@@ -17257,7 +17257,7 @@
             <a:avLst/>
           </a:prstGeom>
           <a:solidFill>
-            <a:srgbClr val="00AEC7"/>
+            <a:srgbClr val="EE502E"/>
           </a:solidFill>
           <a:ln>
             <a:noFill/>
@@ -17415,7 +17415,7 @@
             <a:avLst/>
           </a:prstGeom>
           <a:solidFill>
-            <a:srgbClr val="6CC24A"/>
+            <a:srgbClr val="00AEC7"/>
           </a:solidFill>
           <a:ln>
             <a:noFill/>
@@ -17573,7 +17573,7 @@
             <a:avLst/>
           </a:prstGeom>
           <a:solidFill>
-            <a:srgbClr val="00AEC7"/>
+            <a:srgbClr val="EE502E"/>
           </a:solidFill>
           <a:ln>
             <a:noFill/>
@@ -17834,7 +17834,7 @@
             <a:avLst/>
           </a:prstGeom>
           <a:solidFill>
-            <a:srgbClr val="00AEC7"/>
+            <a:srgbClr val="EE502E"/>
           </a:solidFill>
           <a:ln>
             <a:noFill/>
@@ -17992,7 +17992,7 @@
             <a:avLst/>
           </a:prstGeom>
           <a:solidFill>
-            <a:srgbClr val="00AEC7"/>
+            <a:srgbClr val="EE502E"/>
           </a:solidFill>
           <a:ln>
             <a:noFill/>
@@ -18712,7 +18712,7 @@
               <a:avLst/>
             </a:prstGeom>
             <a:solidFill>
-              <a:srgbClr val="6CC24A"/>
+              <a:srgbClr val="00AEC7"/>
             </a:solidFill>
             <a:ln>
               <a:noFill/>
@@ -18865,7 +18865,7 @@
               <a:avLst/>
             </a:prstGeom>
             <a:solidFill>
-              <a:srgbClr val="00AEC7"/>
+              <a:srgbClr val="EE502E"/>
             </a:solidFill>
             <a:ln>
               <a:noFill/>
@@ -19122,7 +19122,7 @@
             <a:avLst/>
           </a:prstGeom>
           <a:solidFill>
-            <a:srgbClr val="6CC24A"/>
+            <a:srgbClr val="00AEC7"/>
           </a:solidFill>
           <a:ln>
             <a:noFill/>
@@ -19280,7 +19280,7 @@
             <a:avLst/>
           </a:prstGeom>
           <a:solidFill>
-            <a:srgbClr val="6CC24A"/>
+            <a:srgbClr val="00AEC7"/>
           </a:solidFill>
           <a:ln>
             <a:noFill/>
@@ -19438,7 +19438,7 @@
             <a:avLst/>
           </a:prstGeom>
           <a:solidFill>
-            <a:srgbClr val="00AEC7"/>
+            <a:srgbClr val="EE502E"/>
           </a:solidFill>
           <a:ln>
             <a:noFill/>
@@ -19596,7 +19596,7 @@
             <a:avLst/>
           </a:prstGeom>
           <a:solidFill>
-            <a:srgbClr val="00AEC7"/>
+            <a:srgbClr val="EE502E"/>
           </a:solidFill>
           <a:ln>
             <a:noFill/>
@@ -19754,7 +19754,7 @@
             <a:avLst/>
           </a:prstGeom>
           <a:solidFill>
-            <a:srgbClr val="00AEC7"/>
+            <a:srgbClr val="EE502E"/>
           </a:solidFill>
           <a:ln>
             <a:noFill/>
@@ -20634,7 +20634,7 @@
               <a:avLst/>
             </a:prstGeom>
             <a:solidFill>
-              <a:srgbClr val="6CC24A"/>
+              <a:srgbClr val="00AEC7"/>
             </a:solidFill>
             <a:ln>
               <a:noFill/>
@@ -20787,7 +20787,7 @@
               <a:avLst/>
             </a:prstGeom>
             <a:solidFill>
-              <a:srgbClr val="00AEC7"/>
+              <a:srgbClr val="EE502E"/>
             </a:solidFill>
             <a:ln>
               <a:noFill/>
@@ -21070,7 +21070,7 @@
               <a:avLst/>
             </a:prstGeom>
             <a:solidFill>
-              <a:srgbClr val="6CC24A"/>
+              <a:srgbClr val="00AEC7"/>
             </a:solidFill>
             <a:ln>
               <a:noFill/>
@@ -21223,7 +21223,7 @@
               <a:avLst/>
             </a:prstGeom>
             <a:solidFill>
-              <a:srgbClr val="00AEC7"/>
+              <a:srgbClr val="EE502E"/>
             </a:solidFill>
             <a:ln>
               <a:noFill/>
@@ -21377,7 +21377,7 @@
             <a:avLst/>
           </a:prstGeom>
           <a:solidFill>
-            <a:srgbClr val="6CC24A"/>
+            <a:srgbClr val="00AEC7"/>
           </a:solidFill>
           <a:ln>
             <a:noFill/>
@@ -21535,7 +21535,7 @@
             <a:avLst/>
           </a:prstGeom>
           <a:solidFill>
-            <a:srgbClr val="00AEC7"/>
+            <a:srgbClr val="EE502E"/>
           </a:solidFill>
           <a:ln>
             <a:noFill/>
@@ -21693,7 +21693,7 @@
             <a:avLst/>
           </a:prstGeom>
           <a:solidFill>
-            <a:srgbClr val="6CC24A"/>
+            <a:srgbClr val="00AEC7"/>
           </a:solidFill>
           <a:ln>
             <a:noFill/>
@@ -21894,7 +21894,7 @@
             <a:avLst/>
           </a:prstGeom>
           <a:solidFill>
-            <a:srgbClr val="6CC24A"/>
+            <a:srgbClr val="00AEC7"/>
           </a:solidFill>
           <a:ln>
             <a:noFill/>
@@ -22095,7 +22095,7 @@
             <a:avLst/>
           </a:prstGeom>
           <a:solidFill>
-            <a:srgbClr val="6CC24A"/>
+            <a:srgbClr val="00AEC7"/>
           </a:solidFill>
           <a:ln>
             <a:noFill/>
@@ -22296,7 +22296,7 @@
             <a:avLst/>
           </a:prstGeom>
           <a:solidFill>
-            <a:srgbClr val="6CC24A"/>
+            <a:srgbClr val="00AEC7"/>
           </a:solidFill>
           <a:ln>
             <a:noFill/>
@@ -22497,7 +22497,7 @@
             <a:avLst/>
           </a:prstGeom>
           <a:solidFill>
-            <a:srgbClr val="00AEC7"/>
+            <a:srgbClr val="EE502E"/>
           </a:solidFill>
           <a:ln>
             <a:noFill/>
@@ -22655,7 +22655,7 @@
             <a:avLst/>
           </a:prstGeom>
           <a:solidFill>
-            <a:srgbClr val="00AEC7"/>
+            <a:srgbClr val="EE502E"/>
           </a:solidFill>
           <a:ln>
             <a:noFill/>

</xml_diff>

<commit_message>
Update the names in vg_llapi_emb.png
</commit_message>
<xml_diff>
--- a/VEEPortingGuide/images/vgLL.pptx
+++ b/VEEPortingGuide/images/vgLL.pptx
@@ -1,6 +1,6 @@
 
 <file path=ppt/presentation.xml><?xml version="1.0" encoding="utf-8"?>
-<p:presentation xmlns:a="http://schemas.openxmlformats.org/drawingml/2006/main" xmlns:r="http://schemas.openxmlformats.org/officeDocument/2006/relationships" xmlns:p="http://schemas.openxmlformats.org/presentationml/2006/main" saveSubsetFonts="1">
+<p:presentation xmlns:a="http://schemas.openxmlformats.org/drawingml/2006/main" xmlns:r="http://schemas.openxmlformats.org/officeDocument/2006/relationships" xmlns:p="http://schemas.openxmlformats.org/presentationml/2006/main" removePersonalInfoOnSave="1" saveSubsetFonts="1">
   <p:sldMasterIdLst>
     <p:sldMasterId id="2147483648" r:id="rId1"/>
   </p:sldMasterIdLst>
@@ -204,7 +204,7 @@
           <a:p>
             <a:fld id="{F47202D6-4449-4ABC-9430-570B72DCED4F}" type="datetimeFigureOut">
               <a:rPr lang="en-US" smtClean="0"/>
-              <a:t>2024-07-03</a:t>
+              <a:t>7/11/2024</a:t>
             </a:fld>
             <a:endParaRPr lang="en-US"/>
           </a:p>
@@ -956,7 +956,7 @@
           <a:p>
             <a:fld id="{4E285625-C24A-4341-90BC-6CD71F835625}" type="datetimeFigureOut">
               <a:rPr lang="en-GB" smtClean="0"/>
-              <a:t>03/07/2024</a:t>
+              <a:t>11/07/2024</a:t>
             </a:fld>
             <a:endParaRPr lang="en-GB"/>
           </a:p>
@@ -1156,7 +1156,7 @@
           <a:p>
             <a:fld id="{4E285625-C24A-4341-90BC-6CD71F835625}" type="datetimeFigureOut">
               <a:rPr lang="en-GB" smtClean="0"/>
-              <a:t>03/07/2024</a:t>
+              <a:t>11/07/2024</a:t>
             </a:fld>
             <a:endParaRPr lang="en-GB"/>
           </a:p>
@@ -1366,7 +1366,7 @@
           <a:p>
             <a:fld id="{4E285625-C24A-4341-90BC-6CD71F835625}" type="datetimeFigureOut">
               <a:rPr lang="en-GB" smtClean="0"/>
-              <a:t>03/07/2024</a:t>
+              <a:t>11/07/2024</a:t>
             </a:fld>
             <a:endParaRPr lang="en-GB"/>
           </a:p>
@@ -1566,7 +1566,7 @@
           <a:p>
             <a:fld id="{4E285625-C24A-4341-90BC-6CD71F835625}" type="datetimeFigureOut">
               <a:rPr lang="en-GB" smtClean="0"/>
-              <a:t>03/07/2024</a:t>
+              <a:t>11/07/2024</a:t>
             </a:fld>
             <a:endParaRPr lang="en-GB"/>
           </a:p>
@@ -1842,7 +1842,7 @@
           <a:p>
             <a:fld id="{4E285625-C24A-4341-90BC-6CD71F835625}" type="datetimeFigureOut">
               <a:rPr lang="en-GB" smtClean="0"/>
-              <a:t>03/07/2024</a:t>
+              <a:t>11/07/2024</a:t>
             </a:fld>
             <a:endParaRPr lang="en-GB"/>
           </a:p>
@@ -2110,7 +2110,7 @@
           <a:p>
             <a:fld id="{4E285625-C24A-4341-90BC-6CD71F835625}" type="datetimeFigureOut">
               <a:rPr lang="en-GB" smtClean="0"/>
-              <a:t>03/07/2024</a:t>
+              <a:t>11/07/2024</a:t>
             </a:fld>
             <a:endParaRPr lang="en-GB"/>
           </a:p>
@@ -2525,7 +2525,7 @@
           <a:p>
             <a:fld id="{4E285625-C24A-4341-90BC-6CD71F835625}" type="datetimeFigureOut">
               <a:rPr lang="en-GB" smtClean="0"/>
-              <a:t>03/07/2024</a:t>
+              <a:t>11/07/2024</a:t>
             </a:fld>
             <a:endParaRPr lang="en-GB"/>
           </a:p>
@@ -2667,7 +2667,7 @@
           <a:p>
             <a:fld id="{4E285625-C24A-4341-90BC-6CD71F835625}" type="datetimeFigureOut">
               <a:rPr lang="en-GB" smtClean="0"/>
-              <a:t>03/07/2024</a:t>
+              <a:t>11/07/2024</a:t>
             </a:fld>
             <a:endParaRPr lang="en-GB"/>
           </a:p>
@@ -2780,7 +2780,7 @@
           <a:p>
             <a:fld id="{4E285625-C24A-4341-90BC-6CD71F835625}" type="datetimeFigureOut">
               <a:rPr lang="en-GB" smtClean="0"/>
-              <a:t>03/07/2024</a:t>
+              <a:t>11/07/2024</a:t>
             </a:fld>
             <a:endParaRPr lang="en-GB"/>
           </a:p>
@@ -3093,7 +3093,7 @@
           <a:p>
             <a:fld id="{4E285625-C24A-4341-90BC-6CD71F835625}" type="datetimeFigureOut">
               <a:rPr lang="en-GB" smtClean="0"/>
-              <a:t>03/07/2024</a:t>
+              <a:t>11/07/2024</a:t>
             </a:fld>
             <a:endParaRPr lang="en-GB"/>
           </a:p>
@@ -3382,7 +3382,7 @@
           <a:p>
             <a:fld id="{4E285625-C24A-4341-90BC-6CD71F835625}" type="datetimeFigureOut">
               <a:rPr lang="en-GB" smtClean="0"/>
-              <a:t>03/07/2024</a:t>
+              <a:t>11/07/2024</a:t>
             </a:fld>
             <a:endParaRPr lang="en-GB"/>
           </a:p>
@@ -3625,7 +3625,7 @@
           <a:p>
             <a:fld id="{4E285625-C24A-4341-90BC-6CD71F835625}" type="datetimeFigureOut">
               <a:rPr lang="en-GB" smtClean="0"/>
-              <a:t>03/07/2024</a:t>
+              <a:t>11/07/2024</a:t>
             </a:fld>
             <a:endParaRPr lang="en-GB"/>
           </a:p>
@@ -4714,7 +4714,7 @@
         <p:spPr>
           <a:xfrm>
             <a:off x="363722" y="1874745"/>
-            <a:ext cx="3120599" cy="276999"/>
+            <a:ext cx="3934154" cy="276999"/>
           </a:xfrm>
           <a:prstGeom prst="rect">
             <a:avLst/>
@@ -4728,7 +4728,7 @@
           <a:p>
             <a:r>
               <a:rPr lang="en-US" sz="1200" dirty="0"/>
-              <a:t>C module - </a:t>
+              <a:t>This C abstraction layer - </a:t>
             </a:r>
             <a:r>
               <a:rPr lang="en-US" sz="1200" dirty="0" err="1"/>
@@ -5385,7 +5385,7 @@
         <p:spPr>
           <a:xfrm>
             <a:off x="452052" y="4068694"/>
-            <a:ext cx="1513812" cy="276999"/>
+            <a:ext cx="2405659" cy="276999"/>
           </a:xfrm>
           <a:prstGeom prst="rect">
             <a:avLst/>
@@ -5399,7 +5399,7 @@
           <a:p>
             <a:r>
               <a:rPr lang="en-US" sz="1200" dirty="0"/>
-              <a:t>BSP (or another CCO)</a:t>
+              <a:t>BSP (or another C abstraction layer)</a:t>
             </a:r>
           </a:p>
         </p:txBody>
@@ -5552,167 +5552,9 @@
                   <a:schemeClr val="bg1"/>
                 </a:solidFill>
               </a:rPr>
-              <a:t>microvg_path.c</a:t>
+              <a:t>vg_path.c</a:t>
             </a:r>
             <a:endParaRPr lang="en-US" sz="1200" dirty="0">
-              <a:solidFill>
-                <a:schemeClr val="bg1"/>
-              </a:solidFill>
-            </a:endParaRPr>
-          </a:p>
-        </p:txBody>
-      </p:sp>
-      <p:sp>
-        <p:nvSpPr>
-          <p:cNvPr id="49" name="Rounded Rectangle 48">
-            <a:extLst>
-              <a:ext uri="{FF2B5EF4-FFF2-40B4-BE49-F238E27FC236}">
-                <a16:creationId xmlns:a16="http://schemas.microsoft.com/office/drawing/2014/main" id="{91353A18-7AED-4983-963D-7743C7D308A0}"/>
-              </a:ext>
-            </a:extLst>
-          </p:cNvPr>
-          <p:cNvSpPr/>
-          <p:nvPr/>
-        </p:nvSpPr>
-        <p:spPr>
-          <a:xfrm>
-            <a:off x="5945892" y="4483166"/>
-            <a:ext cx="1645920" cy="288000"/>
-          </a:xfrm>
-          <a:prstGeom prst="roundRect">
-            <a:avLst/>
-          </a:prstGeom>
-          <a:solidFill>
-            <a:srgbClr val="EE502E"/>
-          </a:solidFill>
-          <a:ln>
-            <a:noFill/>
-          </a:ln>
-        </p:spPr>
-        <p:style>
-          <a:lnRef idx="2">
-            <a:schemeClr val="accent1">
-              <a:shade val="50000"/>
-            </a:schemeClr>
-          </a:lnRef>
-          <a:fillRef idx="1">
-            <a:schemeClr val="accent1"/>
-          </a:fillRef>
-          <a:effectRef idx="0">
-            <a:schemeClr val="accent1"/>
-          </a:effectRef>
-          <a:fontRef idx="minor">
-            <a:schemeClr val="lt1"/>
-          </a:fontRef>
-        </p:style>
-        <p:txBody>
-          <a:bodyPr rtlCol="0" anchor="ctr"/>
-          <a:lstStyle>
-            <a:defPPr>
-              <a:defRPr lang="en-US"/>
-            </a:defPPr>
-            <a:lvl1pPr marL="0" algn="l" defTabSz="914377" rtl="0" eaLnBrk="1" latinLnBrk="0" hangingPunct="1">
-              <a:defRPr sz="1800" kern="1200">
-                <a:solidFill>
-                  <a:schemeClr val="lt1"/>
-                </a:solidFill>
-                <a:latin typeface="+mn-lt"/>
-                <a:ea typeface="+mn-ea"/>
-                <a:cs typeface="+mn-cs"/>
-              </a:defRPr>
-            </a:lvl1pPr>
-            <a:lvl2pPr marL="457189" algn="l" defTabSz="914377" rtl="0" eaLnBrk="1" latinLnBrk="0" hangingPunct="1">
-              <a:defRPr sz="1800" kern="1200">
-                <a:solidFill>
-                  <a:schemeClr val="lt1"/>
-                </a:solidFill>
-                <a:latin typeface="+mn-lt"/>
-                <a:ea typeface="+mn-ea"/>
-                <a:cs typeface="+mn-cs"/>
-              </a:defRPr>
-            </a:lvl2pPr>
-            <a:lvl3pPr marL="914377" algn="l" defTabSz="914377" rtl="0" eaLnBrk="1" latinLnBrk="0" hangingPunct="1">
-              <a:defRPr sz="1800" kern="1200">
-                <a:solidFill>
-                  <a:schemeClr val="lt1"/>
-                </a:solidFill>
-                <a:latin typeface="+mn-lt"/>
-                <a:ea typeface="+mn-ea"/>
-                <a:cs typeface="+mn-cs"/>
-              </a:defRPr>
-            </a:lvl3pPr>
-            <a:lvl4pPr marL="1371566" algn="l" defTabSz="914377" rtl="0" eaLnBrk="1" latinLnBrk="0" hangingPunct="1">
-              <a:defRPr sz="1800" kern="1200">
-                <a:solidFill>
-                  <a:schemeClr val="lt1"/>
-                </a:solidFill>
-                <a:latin typeface="+mn-lt"/>
-                <a:ea typeface="+mn-ea"/>
-                <a:cs typeface="+mn-cs"/>
-              </a:defRPr>
-            </a:lvl4pPr>
-            <a:lvl5pPr marL="1828754" algn="l" defTabSz="914377" rtl="0" eaLnBrk="1" latinLnBrk="0" hangingPunct="1">
-              <a:defRPr sz="1800" kern="1200">
-                <a:solidFill>
-                  <a:schemeClr val="lt1"/>
-                </a:solidFill>
-                <a:latin typeface="+mn-lt"/>
-                <a:ea typeface="+mn-ea"/>
-                <a:cs typeface="+mn-cs"/>
-              </a:defRPr>
-            </a:lvl5pPr>
-            <a:lvl6pPr marL="2285943" algn="l" defTabSz="914377" rtl="0" eaLnBrk="1" latinLnBrk="0" hangingPunct="1">
-              <a:defRPr sz="1800" kern="1200">
-                <a:solidFill>
-                  <a:schemeClr val="lt1"/>
-                </a:solidFill>
-                <a:latin typeface="+mn-lt"/>
-                <a:ea typeface="+mn-ea"/>
-                <a:cs typeface="+mn-cs"/>
-              </a:defRPr>
-            </a:lvl6pPr>
-            <a:lvl7pPr marL="2743131" algn="l" defTabSz="914377" rtl="0" eaLnBrk="1" latinLnBrk="0" hangingPunct="1">
-              <a:defRPr sz="1800" kern="1200">
-                <a:solidFill>
-                  <a:schemeClr val="lt1"/>
-                </a:solidFill>
-                <a:latin typeface="+mn-lt"/>
-                <a:ea typeface="+mn-ea"/>
-                <a:cs typeface="+mn-cs"/>
-              </a:defRPr>
-            </a:lvl7pPr>
-            <a:lvl8pPr marL="3200320" algn="l" defTabSz="914377" rtl="0" eaLnBrk="1" latinLnBrk="0" hangingPunct="1">
-              <a:defRPr sz="1800" kern="1200">
-                <a:solidFill>
-                  <a:schemeClr val="lt1"/>
-                </a:solidFill>
-                <a:latin typeface="+mn-lt"/>
-                <a:ea typeface="+mn-ea"/>
-                <a:cs typeface="+mn-cs"/>
-              </a:defRPr>
-            </a:lvl8pPr>
-            <a:lvl9pPr marL="3657509" algn="l" defTabSz="914377" rtl="0" eaLnBrk="1" latinLnBrk="0" hangingPunct="1">
-              <a:defRPr sz="1800" kern="1200">
-                <a:solidFill>
-                  <a:schemeClr val="lt1"/>
-                </a:solidFill>
-                <a:latin typeface="+mn-lt"/>
-                <a:ea typeface="+mn-ea"/>
-                <a:cs typeface="+mn-cs"/>
-              </a:defRPr>
-            </a:lvl9pPr>
-          </a:lstStyle>
-          <a:p>
-            <a:pPr algn="ctr"/>
-            <a:r>
-              <a:rPr lang="en-US" sz="900" dirty="0" err="1">
-                <a:solidFill>
-                  <a:schemeClr val="bg1"/>
-                </a:solidFill>
-              </a:rPr>
-              <a:t>LLVG_FONT_PAINTER_impl.c</a:t>
-            </a:r>
-            <a:endParaRPr lang="en-US" sz="900" dirty="0">
               <a:solidFill>
                 <a:schemeClr val="bg1"/>
               </a:solidFill>
@@ -6184,7 +6026,7 @@
                   <a:schemeClr val="bg1"/>
                 </a:solidFill>
               </a:rPr>
-              <a:t>microvg_path.h</a:t>
+              <a:t>vg_path.h</a:t>
             </a:r>
             <a:endParaRPr lang="en-US" sz="1200" dirty="0">
               <a:solidFill>
@@ -6208,7 +6050,7 @@
         </p:nvSpPr>
         <p:spPr>
           <a:xfrm>
-            <a:off x="4180388" y="2342701"/>
+            <a:off x="4180387" y="4483166"/>
             <a:ext cx="1645920" cy="288000"/>
           </a:xfrm>
           <a:prstGeom prst="roundRect">
@@ -6345,164 +6187,6 @@
               <a:t>LLVG_GRADIENT_impl.c</a:t>
             </a:r>
             <a:endParaRPr lang="en-US" sz="1100" dirty="0">
-              <a:solidFill>
-                <a:schemeClr val="bg1"/>
-              </a:solidFill>
-            </a:endParaRPr>
-          </a:p>
-        </p:txBody>
-      </p:sp>
-      <p:sp>
-        <p:nvSpPr>
-          <p:cNvPr id="10" name="Rounded Rectangle 17">
-            <a:extLst>
-              <a:ext uri="{FF2B5EF4-FFF2-40B4-BE49-F238E27FC236}">
-                <a16:creationId xmlns:a16="http://schemas.microsoft.com/office/drawing/2014/main" id="{6BB38531-618C-45D1-D45F-50750AB91A06}"/>
-              </a:ext>
-            </a:extLst>
-          </p:cNvPr>
-          <p:cNvSpPr/>
-          <p:nvPr/>
-        </p:nvSpPr>
-        <p:spPr>
-          <a:xfrm>
-            <a:off x="4180388" y="2766728"/>
-            <a:ext cx="1645920" cy="288000"/>
-          </a:xfrm>
-          <a:prstGeom prst="roundRect">
-            <a:avLst/>
-          </a:prstGeom>
-          <a:solidFill>
-            <a:srgbClr val="00AEC7"/>
-          </a:solidFill>
-          <a:ln>
-            <a:noFill/>
-          </a:ln>
-        </p:spPr>
-        <p:style>
-          <a:lnRef idx="2">
-            <a:schemeClr val="accent1">
-              <a:shade val="50000"/>
-            </a:schemeClr>
-          </a:lnRef>
-          <a:fillRef idx="1">
-            <a:schemeClr val="accent1"/>
-          </a:fillRef>
-          <a:effectRef idx="0">
-            <a:schemeClr val="accent1"/>
-          </a:effectRef>
-          <a:fontRef idx="minor">
-            <a:schemeClr val="lt1"/>
-          </a:fontRef>
-        </p:style>
-        <p:txBody>
-          <a:bodyPr rtlCol="0" anchor="ctr"/>
-          <a:lstStyle>
-            <a:defPPr>
-              <a:defRPr lang="en-US"/>
-            </a:defPPr>
-            <a:lvl1pPr marL="0" algn="l" defTabSz="914377" rtl="0" eaLnBrk="1" latinLnBrk="0" hangingPunct="1">
-              <a:defRPr sz="1800" kern="1200">
-                <a:solidFill>
-                  <a:schemeClr val="lt1"/>
-                </a:solidFill>
-                <a:latin typeface="+mn-lt"/>
-                <a:ea typeface="+mn-ea"/>
-                <a:cs typeface="+mn-cs"/>
-              </a:defRPr>
-            </a:lvl1pPr>
-            <a:lvl2pPr marL="457189" algn="l" defTabSz="914377" rtl="0" eaLnBrk="1" latinLnBrk="0" hangingPunct="1">
-              <a:defRPr sz="1800" kern="1200">
-                <a:solidFill>
-                  <a:schemeClr val="lt1"/>
-                </a:solidFill>
-                <a:latin typeface="+mn-lt"/>
-                <a:ea typeface="+mn-ea"/>
-                <a:cs typeface="+mn-cs"/>
-              </a:defRPr>
-            </a:lvl2pPr>
-            <a:lvl3pPr marL="914377" algn="l" defTabSz="914377" rtl="0" eaLnBrk="1" latinLnBrk="0" hangingPunct="1">
-              <a:defRPr sz="1800" kern="1200">
-                <a:solidFill>
-                  <a:schemeClr val="lt1"/>
-                </a:solidFill>
-                <a:latin typeface="+mn-lt"/>
-                <a:ea typeface="+mn-ea"/>
-                <a:cs typeface="+mn-cs"/>
-              </a:defRPr>
-            </a:lvl3pPr>
-            <a:lvl4pPr marL="1371566" algn="l" defTabSz="914377" rtl="0" eaLnBrk="1" latinLnBrk="0" hangingPunct="1">
-              <a:defRPr sz="1800" kern="1200">
-                <a:solidFill>
-                  <a:schemeClr val="lt1"/>
-                </a:solidFill>
-                <a:latin typeface="+mn-lt"/>
-                <a:ea typeface="+mn-ea"/>
-                <a:cs typeface="+mn-cs"/>
-              </a:defRPr>
-            </a:lvl4pPr>
-            <a:lvl5pPr marL="1828754" algn="l" defTabSz="914377" rtl="0" eaLnBrk="1" latinLnBrk="0" hangingPunct="1">
-              <a:defRPr sz="1800" kern="1200">
-                <a:solidFill>
-                  <a:schemeClr val="lt1"/>
-                </a:solidFill>
-                <a:latin typeface="+mn-lt"/>
-                <a:ea typeface="+mn-ea"/>
-                <a:cs typeface="+mn-cs"/>
-              </a:defRPr>
-            </a:lvl5pPr>
-            <a:lvl6pPr marL="2285943" algn="l" defTabSz="914377" rtl="0" eaLnBrk="1" latinLnBrk="0" hangingPunct="1">
-              <a:defRPr sz="1800" kern="1200">
-                <a:solidFill>
-                  <a:schemeClr val="lt1"/>
-                </a:solidFill>
-                <a:latin typeface="+mn-lt"/>
-                <a:ea typeface="+mn-ea"/>
-                <a:cs typeface="+mn-cs"/>
-              </a:defRPr>
-            </a:lvl6pPr>
-            <a:lvl7pPr marL="2743131" algn="l" defTabSz="914377" rtl="0" eaLnBrk="1" latinLnBrk="0" hangingPunct="1">
-              <a:defRPr sz="1800" kern="1200">
-                <a:solidFill>
-                  <a:schemeClr val="lt1"/>
-                </a:solidFill>
-                <a:latin typeface="+mn-lt"/>
-                <a:ea typeface="+mn-ea"/>
-                <a:cs typeface="+mn-cs"/>
-              </a:defRPr>
-            </a:lvl7pPr>
-            <a:lvl8pPr marL="3200320" algn="l" defTabSz="914377" rtl="0" eaLnBrk="1" latinLnBrk="0" hangingPunct="1">
-              <a:defRPr sz="1800" kern="1200">
-                <a:solidFill>
-                  <a:schemeClr val="lt1"/>
-                </a:solidFill>
-                <a:latin typeface="+mn-lt"/>
-                <a:ea typeface="+mn-ea"/>
-                <a:cs typeface="+mn-cs"/>
-              </a:defRPr>
-            </a:lvl8pPr>
-            <a:lvl9pPr marL="3657509" algn="l" defTabSz="914377" rtl="0" eaLnBrk="1" latinLnBrk="0" hangingPunct="1">
-              <a:defRPr sz="1800" kern="1200">
-                <a:solidFill>
-                  <a:schemeClr val="lt1"/>
-                </a:solidFill>
-                <a:latin typeface="+mn-lt"/>
-                <a:ea typeface="+mn-ea"/>
-                <a:cs typeface="+mn-cs"/>
-              </a:defRPr>
-            </a:lvl9pPr>
-          </a:lstStyle>
-          <a:p>
-            <a:pPr algn="ctr"/>
-            <a:r>
-              <a:rPr lang="en-US" sz="1200" dirty="0" err="1">
-                <a:solidFill>
-                  <a:schemeClr val="bg1"/>
-                </a:solidFill>
-              </a:rPr>
-              <a:t>microvg_gradient.h</a:t>
-            </a:r>
-            <a:endParaRPr lang="en-US" sz="1200" dirty="0">
               <a:solidFill>
                 <a:schemeClr val="bg1"/>
               </a:solidFill>
@@ -6670,164 +6354,6 @@
       </p:sp>
       <p:sp>
         <p:nvSpPr>
-          <p:cNvPr id="14" name="Rounded Rectangle 47">
-            <a:extLst>
-              <a:ext uri="{FF2B5EF4-FFF2-40B4-BE49-F238E27FC236}">
-                <a16:creationId xmlns:a16="http://schemas.microsoft.com/office/drawing/2014/main" id="{BF88C611-8C80-781D-46BF-39B18A64D412}"/>
-              </a:ext>
-            </a:extLst>
-          </p:cNvPr>
-          <p:cNvSpPr/>
-          <p:nvPr/>
-        </p:nvSpPr>
-        <p:spPr>
-          <a:xfrm>
-            <a:off x="4180388" y="4483166"/>
-            <a:ext cx="1645920" cy="288000"/>
-          </a:xfrm>
-          <a:prstGeom prst="roundRect">
-            <a:avLst/>
-          </a:prstGeom>
-          <a:solidFill>
-            <a:srgbClr val="EE502E"/>
-          </a:solidFill>
-          <a:ln>
-            <a:noFill/>
-          </a:ln>
-        </p:spPr>
-        <p:style>
-          <a:lnRef idx="2">
-            <a:schemeClr val="accent1">
-              <a:shade val="50000"/>
-            </a:schemeClr>
-          </a:lnRef>
-          <a:fillRef idx="1">
-            <a:schemeClr val="accent1"/>
-          </a:fillRef>
-          <a:effectRef idx="0">
-            <a:schemeClr val="accent1"/>
-          </a:effectRef>
-          <a:fontRef idx="minor">
-            <a:schemeClr val="lt1"/>
-          </a:fontRef>
-        </p:style>
-        <p:txBody>
-          <a:bodyPr rtlCol="0" anchor="ctr"/>
-          <a:lstStyle>
-            <a:defPPr>
-              <a:defRPr lang="en-US"/>
-            </a:defPPr>
-            <a:lvl1pPr marL="0" algn="l" defTabSz="914377" rtl="0" eaLnBrk="1" latinLnBrk="0" hangingPunct="1">
-              <a:defRPr sz="1800" kern="1200">
-                <a:solidFill>
-                  <a:schemeClr val="lt1"/>
-                </a:solidFill>
-                <a:latin typeface="+mn-lt"/>
-                <a:ea typeface="+mn-ea"/>
-                <a:cs typeface="+mn-cs"/>
-              </a:defRPr>
-            </a:lvl1pPr>
-            <a:lvl2pPr marL="457189" algn="l" defTabSz="914377" rtl="0" eaLnBrk="1" latinLnBrk="0" hangingPunct="1">
-              <a:defRPr sz="1800" kern="1200">
-                <a:solidFill>
-                  <a:schemeClr val="lt1"/>
-                </a:solidFill>
-                <a:latin typeface="+mn-lt"/>
-                <a:ea typeface="+mn-ea"/>
-                <a:cs typeface="+mn-cs"/>
-              </a:defRPr>
-            </a:lvl2pPr>
-            <a:lvl3pPr marL="914377" algn="l" defTabSz="914377" rtl="0" eaLnBrk="1" latinLnBrk="0" hangingPunct="1">
-              <a:defRPr sz="1800" kern="1200">
-                <a:solidFill>
-                  <a:schemeClr val="lt1"/>
-                </a:solidFill>
-                <a:latin typeface="+mn-lt"/>
-                <a:ea typeface="+mn-ea"/>
-                <a:cs typeface="+mn-cs"/>
-              </a:defRPr>
-            </a:lvl3pPr>
-            <a:lvl4pPr marL="1371566" algn="l" defTabSz="914377" rtl="0" eaLnBrk="1" latinLnBrk="0" hangingPunct="1">
-              <a:defRPr sz="1800" kern="1200">
-                <a:solidFill>
-                  <a:schemeClr val="lt1"/>
-                </a:solidFill>
-                <a:latin typeface="+mn-lt"/>
-                <a:ea typeface="+mn-ea"/>
-                <a:cs typeface="+mn-cs"/>
-              </a:defRPr>
-            </a:lvl4pPr>
-            <a:lvl5pPr marL="1828754" algn="l" defTabSz="914377" rtl="0" eaLnBrk="1" latinLnBrk="0" hangingPunct="1">
-              <a:defRPr sz="1800" kern="1200">
-                <a:solidFill>
-                  <a:schemeClr val="lt1"/>
-                </a:solidFill>
-                <a:latin typeface="+mn-lt"/>
-                <a:ea typeface="+mn-ea"/>
-                <a:cs typeface="+mn-cs"/>
-              </a:defRPr>
-            </a:lvl5pPr>
-            <a:lvl6pPr marL="2285943" algn="l" defTabSz="914377" rtl="0" eaLnBrk="1" latinLnBrk="0" hangingPunct="1">
-              <a:defRPr sz="1800" kern="1200">
-                <a:solidFill>
-                  <a:schemeClr val="lt1"/>
-                </a:solidFill>
-                <a:latin typeface="+mn-lt"/>
-                <a:ea typeface="+mn-ea"/>
-                <a:cs typeface="+mn-cs"/>
-              </a:defRPr>
-            </a:lvl6pPr>
-            <a:lvl7pPr marL="2743131" algn="l" defTabSz="914377" rtl="0" eaLnBrk="1" latinLnBrk="0" hangingPunct="1">
-              <a:defRPr sz="1800" kern="1200">
-                <a:solidFill>
-                  <a:schemeClr val="lt1"/>
-                </a:solidFill>
-                <a:latin typeface="+mn-lt"/>
-                <a:ea typeface="+mn-ea"/>
-                <a:cs typeface="+mn-cs"/>
-              </a:defRPr>
-            </a:lvl7pPr>
-            <a:lvl8pPr marL="3200320" algn="l" defTabSz="914377" rtl="0" eaLnBrk="1" latinLnBrk="0" hangingPunct="1">
-              <a:defRPr sz="1800" kern="1200">
-                <a:solidFill>
-                  <a:schemeClr val="lt1"/>
-                </a:solidFill>
-                <a:latin typeface="+mn-lt"/>
-                <a:ea typeface="+mn-ea"/>
-                <a:cs typeface="+mn-cs"/>
-              </a:defRPr>
-            </a:lvl8pPr>
-            <a:lvl9pPr marL="3657509" algn="l" defTabSz="914377" rtl="0" eaLnBrk="1" latinLnBrk="0" hangingPunct="1">
-              <a:defRPr sz="1800" kern="1200">
-                <a:solidFill>
-                  <a:schemeClr val="lt1"/>
-                </a:solidFill>
-                <a:latin typeface="+mn-lt"/>
-                <a:ea typeface="+mn-ea"/>
-                <a:cs typeface="+mn-cs"/>
-              </a:defRPr>
-            </a:lvl9pPr>
-          </a:lstStyle>
-          <a:p>
-            <a:pPr algn="ctr"/>
-            <a:r>
-              <a:rPr lang="en-US" sz="1200" dirty="0" err="1">
-                <a:solidFill>
-                  <a:schemeClr val="bg1"/>
-                </a:solidFill>
-              </a:rPr>
-              <a:t>microvg_gradient.c</a:t>
-            </a:r>
-            <a:endParaRPr lang="en-US" sz="1200" dirty="0">
-              <a:solidFill>
-                <a:schemeClr val="bg1"/>
-              </a:solidFill>
-            </a:endParaRPr>
-          </a:p>
-        </p:txBody>
-      </p:sp>
-      <p:sp>
-        <p:nvSpPr>
           <p:cNvPr id="2" name="Rounded Rectangle 17">
             <a:extLst>
               <a:ext uri="{FF2B5EF4-FFF2-40B4-BE49-F238E27FC236}">
@@ -7448,7 +6974,7 @@
                   <a:schemeClr val="bg1"/>
                 </a:solidFill>
               </a:rPr>
-              <a:t>LLVG_BVI_impl.c</a:t>
+              <a:t>vg_drawing_bvi.c</a:t>
             </a:r>
             <a:endParaRPr lang="en-US" sz="1200" dirty="0">
               <a:solidFill>
@@ -7842,7 +7368,7 @@
         </p:nvGrpSpPr>
         <p:grpSpPr>
           <a:xfrm>
-            <a:off x="315544" y="5984405"/>
+            <a:off x="-1796826" y="6112421"/>
             <a:ext cx="1809751" cy="276999"/>
             <a:chOff x="1181100" y="4410075"/>
             <a:chExt cx="1809751" cy="276999"/>
@@ -8035,12 +7561,486 @@
             <a:p>
               <a:r>
                 <a:rPr lang="en-US" sz="1200" dirty="0"/>
-                <a:t>H file</a:t>
+                <a:t>Header file</a:t>
               </a:r>
             </a:p>
           </p:txBody>
         </p:sp>
       </p:grpSp>
+      <p:sp>
+        <p:nvSpPr>
+          <p:cNvPr id="16" name="Rounded Rectangle 17">
+            <a:extLst>
+              <a:ext uri="{FF2B5EF4-FFF2-40B4-BE49-F238E27FC236}">
+                <a16:creationId xmlns:a16="http://schemas.microsoft.com/office/drawing/2014/main" id="{350E2881-E02F-FD6C-3368-803F722B40E7}"/>
+              </a:ext>
+            </a:extLst>
+          </p:cNvPr>
+          <p:cNvSpPr/>
+          <p:nvPr/>
+        </p:nvSpPr>
+        <p:spPr>
+          <a:xfrm>
+            <a:off x="5945892" y="2768563"/>
+            <a:ext cx="1645920" cy="288000"/>
+          </a:xfrm>
+          <a:prstGeom prst="roundRect">
+            <a:avLst/>
+          </a:prstGeom>
+          <a:solidFill>
+            <a:srgbClr val="00AEC7"/>
+          </a:solidFill>
+          <a:ln>
+            <a:noFill/>
+          </a:ln>
+        </p:spPr>
+        <p:style>
+          <a:lnRef idx="2">
+            <a:schemeClr val="accent1">
+              <a:shade val="50000"/>
+            </a:schemeClr>
+          </a:lnRef>
+          <a:fillRef idx="1">
+            <a:schemeClr val="accent1"/>
+          </a:fillRef>
+          <a:effectRef idx="0">
+            <a:schemeClr val="accent1"/>
+          </a:effectRef>
+          <a:fontRef idx="minor">
+            <a:schemeClr val="lt1"/>
+          </a:fontRef>
+        </p:style>
+        <p:txBody>
+          <a:bodyPr rtlCol="0" anchor="ctr"/>
+          <a:lstStyle>
+            <a:defPPr>
+              <a:defRPr lang="en-US"/>
+            </a:defPPr>
+            <a:lvl1pPr marL="0" algn="l" defTabSz="914377" rtl="0" eaLnBrk="1" latinLnBrk="0" hangingPunct="1">
+              <a:defRPr sz="1800" kern="1200">
+                <a:solidFill>
+                  <a:schemeClr val="lt1"/>
+                </a:solidFill>
+                <a:latin typeface="+mn-lt"/>
+                <a:ea typeface="+mn-ea"/>
+                <a:cs typeface="+mn-cs"/>
+              </a:defRPr>
+            </a:lvl1pPr>
+            <a:lvl2pPr marL="457189" algn="l" defTabSz="914377" rtl="0" eaLnBrk="1" latinLnBrk="0" hangingPunct="1">
+              <a:defRPr sz="1800" kern="1200">
+                <a:solidFill>
+                  <a:schemeClr val="lt1"/>
+                </a:solidFill>
+                <a:latin typeface="+mn-lt"/>
+                <a:ea typeface="+mn-ea"/>
+                <a:cs typeface="+mn-cs"/>
+              </a:defRPr>
+            </a:lvl2pPr>
+            <a:lvl3pPr marL="914377" algn="l" defTabSz="914377" rtl="0" eaLnBrk="1" latinLnBrk="0" hangingPunct="1">
+              <a:defRPr sz="1800" kern="1200">
+                <a:solidFill>
+                  <a:schemeClr val="lt1"/>
+                </a:solidFill>
+                <a:latin typeface="+mn-lt"/>
+                <a:ea typeface="+mn-ea"/>
+                <a:cs typeface="+mn-cs"/>
+              </a:defRPr>
+            </a:lvl3pPr>
+            <a:lvl4pPr marL="1371566" algn="l" defTabSz="914377" rtl="0" eaLnBrk="1" latinLnBrk="0" hangingPunct="1">
+              <a:defRPr sz="1800" kern="1200">
+                <a:solidFill>
+                  <a:schemeClr val="lt1"/>
+                </a:solidFill>
+                <a:latin typeface="+mn-lt"/>
+                <a:ea typeface="+mn-ea"/>
+                <a:cs typeface="+mn-cs"/>
+              </a:defRPr>
+            </a:lvl4pPr>
+            <a:lvl5pPr marL="1828754" algn="l" defTabSz="914377" rtl="0" eaLnBrk="1" latinLnBrk="0" hangingPunct="1">
+              <a:defRPr sz="1800" kern="1200">
+                <a:solidFill>
+                  <a:schemeClr val="lt1"/>
+                </a:solidFill>
+                <a:latin typeface="+mn-lt"/>
+                <a:ea typeface="+mn-ea"/>
+                <a:cs typeface="+mn-cs"/>
+              </a:defRPr>
+            </a:lvl5pPr>
+            <a:lvl6pPr marL="2285943" algn="l" defTabSz="914377" rtl="0" eaLnBrk="1" latinLnBrk="0" hangingPunct="1">
+              <a:defRPr sz="1800" kern="1200">
+                <a:solidFill>
+                  <a:schemeClr val="lt1"/>
+                </a:solidFill>
+                <a:latin typeface="+mn-lt"/>
+                <a:ea typeface="+mn-ea"/>
+                <a:cs typeface="+mn-cs"/>
+              </a:defRPr>
+            </a:lvl6pPr>
+            <a:lvl7pPr marL="2743131" algn="l" defTabSz="914377" rtl="0" eaLnBrk="1" latinLnBrk="0" hangingPunct="1">
+              <a:defRPr sz="1800" kern="1200">
+                <a:solidFill>
+                  <a:schemeClr val="lt1"/>
+                </a:solidFill>
+                <a:latin typeface="+mn-lt"/>
+                <a:ea typeface="+mn-ea"/>
+                <a:cs typeface="+mn-cs"/>
+              </a:defRPr>
+            </a:lvl7pPr>
+            <a:lvl8pPr marL="3200320" algn="l" defTabSz="914377" rtl="0" eaLnBrk="1" latinLnBrk="0" hangingPunct="1">
+              <a:defRPr sz="1800" kern="1200">
+                <a:solidFill>
+                  <a:schemeClr val="lt1"/>
+                </a:solidFill>
+                <a:latin typeface="+mn-lt"/>
+                <a:ea typeface="+mn-ea"/>
+                <a:cs typeface="+mn-cs"/>
+              </a:defRPr>
+            </a:lvl8pPr>
+            <a:lvl9pPr marL="3657509" algn="l" defTabSz="914377" rtl="0" eaLnBrk="1" latinLnBrk="0" hangingPunct="1">
+              <a:defRPr sz="1800" kern="1200">
+                <a:solidFill>
+                  <a:schemeClr val="lt1"/>
+                </a:solidFill>
+                <a:latin typeface="+mn-lt"/>
+                <a:ea typeface="+mn-ea"/>
+                <a:cs typeface="+mn-cs"/>
+              </a:defRPr>
+            </a:lvl9pPr>
+          </a:lstStyle>
+          <a:p>
+            <a:pPr algn="ctr"/>
+            <a:r>
+              <a:rPr lang="en-US" sz="1200" dirty="0" err="1">
+                <a:solidFill>
+                  <a:schemeClr val="bg1"/>
+                </a:solidFill>
+              </a:rPr>
+              <a:t>vg_freetype.h</a:t>
+            </a:r>
+            <a:endParaRPr lang="en-US" sz="1200" dirty="0">
+              <a:solidFill>
+                <a:schemeClr val="bg1"/>
+              </a:solidFill>
+            </a:endParaRPr>
+          </a:p>
+        </p:txBody>
+      </p:sp>
+      <p:sp>
+        <p:nvSpPr>
+          <p:cNvPr id="21" name="Rounded Rectangle 17">
+            <a:extLst>
+              <a:ext uri="{FF2B5EF4-FFF2-40B4-BE49-F238E27FC236}">
+                <a16:creationId xmlns:a16="http://schemas.microsoft.com/office/drawing/2014/main" id="{3B959D62-57E8-4D09-CA3F-A87FCD4B3ED5}"/>
+              </a:ext>
+            </a:extLst>
+          </p:cNvPr>
+          <p:cNvSpPr/>
+          <p:nvPr/>
+        </p:nvSpPr>
+        <p:spPr>
+          <a:xfrm>
+            <a:off x="5945892" y="3167238"/>
+            <a:ext cx="1645920" cy="288000"/>
+          </a:xfrm>
+          <a:prstGeom prst="roundRect">
+            <a:avLst/>
+          </a:prstGeom>
+          <a:solidFill>
+            <a:srgbClr val="EE502E"/>
+          </a:solidFill>
+          <a:ln>
+            <a:noFill/>
+          </a:ln>
+        </p:spPr>
+        <p:style>
+          <a:lnRef idx="2">
+            <a:schemeClr val="accent1">
+              <a:shade val="50000"/>
+            </a:schemeClr>
+          </a:lnRef>
+          <a:fillRef idx="1">
+            <a:schemeClr val="accent1"/>
+          </a:fillRef>
+          <a:effectRef idx="0">
+            <a:schemeClr val="accent1"/>
+          </a:effectRef>
+          <a:fontRef idx="minor">
+            <a:schemeClr val="lt1"/>
+          </a:fontRef>
+        </p:style>
+        <p:txBody>
+          <a:bodyPr rtlCol="0" anchor="ctr"/>
+          <a:lstStyle>
+            <a:defPPr>
+              <a:defRPr lang="en-US"/>
+            </a:defPPr>
+            <a:lvl1pPr marL="0" algn="l" defTabSz="914377" rtl="0" eaLnBrk="1" latinLnBrk="0" hangingPunct="1">
+              <a:defRPr sz="1800" kern="1200">
+                <a:solidFill>
+                  <a:schemeClr val="lt1"/>
+                </a:solidFill>
+                <a:latin typeface="+mn-lt"/>
+                <a:ea typeface="+mn-ea"/>
+                <a:cs typeface="+mn-cs"/>
+              </a:defRPr>
+            </a:lvl1pPr>
+            <a:lvl2pPr marL="457189" algn="l" defTabSz="914377" rtl="0" eaLnBrk="1" latinLnBrk="0" hangingPunct="1">
+              <a:defRPr sz="1800" kern="1200">
+                <a:solidFill>
+                  <a:schemeClr val="lt1"/>
+                </a:solidFill>
+                <a:latin typeface="+mn-lt"/>
+                <a:ea typeface="+mn-ea"/>
+                <a:cs typeface="+mn-cs"/>
+              </a:defRPr>
+            </a:lvl2pPr>
+            <a:lvl3pPr marL="914377" algn="l" defTabSz="914377" rtl="0" eaLnBrk="1" latinLnBrk="0" hangingPunct="1">
+              <a:defRPr sz="1800" kern="1200">
+                <a:solidFill>
+                  <a:schemeClr val="lt1"/>
+                </a:solidFill>
+                <a:latin typeface="+mn-lt"/>
+                <a:ea typeface="+mn-ea"/>
+                <a:cs typeface="+mn-cs"/>
+              </a:defRPr>
+            </a:lvl3pPr>
+            <a:lvl4pPr marL="1371566" algn="l" defTabSz="914377" rtl="0" eaLnBrk="1" latinLnBrk="0" hangingPunct="1">
+              <a:defRPr sz="1800" kern="1200">
+                <a:solidFill>
+                  <a:schemeClr val="lt1"/>
+                </a:solidFill>
+                <a:latin typeface="+mn-lt"/>
+                <a:ea typeface="+mn-ea"/>
+                <a:cs typeface="+mn-cs"/>
+              </a:defRPr>
+            </a:lvl4pPr>
+            <a:lvl5pPr marL="1828754" algn="l" defTabSz="914377" rtl="0" eaLnBrk="1" latinLnBrk="0" hangingPunct="1">
+              <a:defRPr sz="1800" kern="1200">
+                <a:solidFill>
+                  <a:schemeClr val="lt1"/>
+                </a:solidFill>
+                <a:latin typeface="+mn-lt"/>
+                <a:ea typeface="+mn-ea"/>
+                <a:cs typeface="+mn-cs"/>
+              </a:defRPr>
+            </a:lvl5pPr>
+            <a:lvl6pPr marL="2285943" algn="l" defTabSz="914377" rtl="0" eaLnBrk="1" latinLnBrk="0" hangingPunct="1">
+              <a:defRPr sz="1800" kern="1200">
+                <a:solidFill>
+                  <a:schemeClr val="lt1"/>
+                </a:solidFill>
+                <a:latin typeface="+mn-lt"/>
+                <a:ea typeface="+mn-ea"/>
+                <a:cs typeface="+mn-cs"/>
+              </a:defRPr>
+            </a:lvl6pPr>
+            <a:lvl7pPr marL="2743131" algn="l" defTabSz="914377" rtl="0" eaLnBrk="1" latinLnBrk="0" hangingPunct="1">
+              <a:defRPr sz="1800" kern="1200">
+                <a:solidFill>
+                  <a:schemeClr val="lt1"/>
+                </a:solidFill>
+                <a:latin typeface="+mn-lt"/>
+                <a:ea typeface="+mn-ea"/>
+                <a:cs typeface="+mn-cs"/>
+              </a:defRPr>
+            </a:lvl7pPr>
+            <a:lvl8pPr marL="3200320" algn="l" defTabSz="914377" rtl="0" eaLnBrk="1" latinLnBrk="0" hangingPunct="1">
+              <a:defRPr sz="1800" kern="1200">
+                <a:solidFill>
+                  <a:schemeClr val="lt1"/>
+                </a:solidFill>
+                <a:latin typeface="+mn-lt"/>
+                <a:ea typeface="+mn-ea"/>
+                <a:cs typeface="+mn-cs"/>
+              </a:defRPr>
+            </a:lvl8pPr>
+            <a:lvl9pPr marL="3657509" algn="l" defTabSz="914377" rtl="0" eaLnBrk="1" latinLnBrk="0" hangingPunct="1">
+              <a:defRPr sz="1800" kern="1200">
+                <a:solidFill>
+                  <a:schemeClr val="lt1"/>
+                </a:solidFill>
+                <a:latin typeface="+mn-lt"/>
+                <a:ea typeface="+mn-ea"/>
+                <a:cs typeface="+mn-cs"/>
+              </a:defRPr>
+            </a:lvl9pPr>
+          </a:lstStyle>
+          <a:p>
+            <a:pPr algn="ctr"/>
+            <a:r>
+              <a:rPr lang="en-US" sz="1200" dirty="0" err="1">
+                <a:solidFill>
+                  <a:schemeClr val="bg1"/>
+                </a:solidFill>
+              </a:rPr>
+              <a:t>vg_freetype_path.c</a:t>
+            </a:r>
+            <a:endParaRPr lang="en-US" sz="1200" dirty="0">
+              <a:solidFill>
+                <a:schemeClr val="bg1"/>
+              </a:solidFill>
+            </a:endParaRPr>
+          </a:p>
+        </p:txBody>
+      </p:sp>
+      <p:sp>
+        <p:nvSpPr>
+          <p:cNvPr id="22" name="Rounded Rectangle 17">
+            <a:extLst>
+              <a:ext uri="{FF2B5EF4-FFF2-40B4-BE49-F238E27FC236}">
+                <a16:creationId xmlns:a16="http://schemas.microsoft.com/office/drawing/2014/main" id="{875B2786-DD85-FC16-2DEE-54B4852CB3AF}"/>
+              </a:ext>
+            </a:extLst>
+          </p:cNvPr>
+          <p:cNvSpPr/>
+          <p:nvPr/>
+        </p:nvSpPr>
+        <p:spPr>
+          <a:xfrm>
+            <a:off x="7711396" y="2774366"/>
+            <a:ext cx="1645920" cy="288000"/>
+          </a:xfrm>
+          <a:prstGeom prst="roundRect">
+            <a:avLst/>
+          </a:prstGeom>
+          <a:solidFill>
+            <a:srgbClr val="00AEC7"/>
+          </a:solidFill>
+          <a:ln>
+            <a:noFill/>
+          </a:ln>
+        </p:spPr>
+        <p:style>
+          <a:lnRef idx="2">
+            <a:schemeClr val="accent1">
+              <a:shade val="50000"/>
+            </a:schemeClr>
+          </a:lnRef>
+          <a:fillRef idx="1">
+            <a:schemeClr val="accent1"/>
+          </a:fillRef>
+          <a:effectRef idx="0">
+            <a:schemeClr val="accent1"/>
+          </a:effectRef>
+          <a:fontRef idx="minor">
+            <a:schemeClr val="lt1"/>
+          </a:fontRef>
+        </p:style>
+        <p:txBody>
+          <a:bodyPr rtlCol="0" anchor="ctr"/>
+          <a:lstStyle>
+            <a:defPPr>
+              <a:defRPr lang="en-US"/>
+            </a:defPPr>
+            <a:lvl1pPr marL="0" algn="l" defTabSz="914377" rtl="0" eaLnBrk="1" latinLnBrk="0" hangingPunct="1">
+              <a:defRPr sz="1800" kern="1200">
+                <a:solidFill>
+                  <a:schemeClr val="lt1"/>
+                </a:solidFill>
+                <a:latin typeface="+mn-lt"/>
+                <a:ea typeface="+mn-ea"/>
+                <a:cs typeface="+mn-cs"/>
+              </a:defRPr>
+            </a:lvl1pPr>
+            <a:lvl2pPr marL="457189" algn="l" defTabSz="914377" rtl="0" eaLnBrk="1" latinLnBrk="0" hangingPunct="1">
+              <a:defRPr sz="1800" kern="1200">
+                <a:solidFill>
+                  <a:schemeClr val="lt1"/>
+                </a:solidFill>
+                <a:latin typeface="+mn-lt"/>
+                <a:ea typeface="+mn-ea"/>
+                <a:cs typeface="+mn-cs"/>
+              </a:defRPr>
+            </a:lvl2pPr>
+            <a:lvl3pPr marL="914377" algn="l" defTabSz="914377" rtl="0" eaLnBrk="1" latinLnBrk="0" hangingPunct="1">
+              <a:defRPr sz="1800" kern="1200">
+                <a:solidFill>
+                  <a:schemeClr val="lt1"/>
+                </a:solidFill>
+                <a:latin typeface="+mn-lt"/>
+                <a:ea typeface="+mn-ea"/>
+                <a:cs typeface="+mn-cs"/>
+              </a:defRPr>
+            </a:lvl3pPr>
+            <a:lvl4pPr marL="1371566" algn="l" defTabSz="914377" rtl="0" eaLnBrk="1" latinLnBrk="0" hangingPunct="1">
+              <a:defRPr sz="1800" kern="1200">
+                <a:solidFill>
+                  <a:schemeClr val="lt1"/>
+                </a:solidFill>
+                <a:latin typeface="+mn-lt"/>
+                <a:ea typeface="+mn-ea"/>
+                <a:cs typeface="+mn-cs"/>
+              </a:defRPr>
+            </a:lvl4pPr>
+            <a:lvl5pPr marL="1828754" algn="l" defTabSz="914377" rtl="0" eaLnBrk="1" latinLnBrk="0" hangingPunct="1">
+              <a:defRPr sz="1800" kern="1200">
+                <a:solidFill>
+                  <a:schemeClr val="lt1"/>
+                </a:solidFill>
+                <a:latin typeface="+mn-lt"/>
+                <a:ea typeface="+mn-ea"/>
+                <a:cs typeface="+mn-cs"/>
+              </a:defRPr>
+            </a:lvl5pPr>
+            <a:lvl6pPr marL="2285943" algn="l" defTabSz="914377" rtl="0" eaLnBrk="1" latinLnBrk="0" hangingPunct="1">
+              <a:defRPr sz="1800" kern="1200">
+                <a:solidFill>
+                  <a:schemeClr val="lt1"/>
+                </a:solidFill>
+                <a:latin typeface="+mn-lt"/>
+                <a:ea typeface="+mn-ea"/>
+                <a:cs typeface="+mn-cs"/>
+              </a:defRPr>
+            </a:lvl6pPr>
+            <a:lvl7pPr marL="2743131" algn="l" defTabSz="914377" rtl="0" eaLnBrk="1" latinLnBrk="0" hangingPunct="1">
+              <a:defRPr sz="1800" kern="1200">
+                <a:solidFill>
+                  <a:schemeClr val="lt1"/>
+                </a:solidFill>
+                <a:latin typeface="+mn-lt"/>
+                <a:ea typeface="+mn-ea"/>
+                <a:cs typeface="+mn-cs"/>
+              </a:defRPr>
+            </a:lvl7pPr>
+            <a:lvl8pPr marL="3200320" algn="l" defTabSz="914377" rtl="0" eaLnBrk="1" latinLnBrk="0" hangingPunct="1">
+              <a:defRPr sz="1800" kern="1200">
+                <a:solidFill>
+                  <a:schemeClr val="lt1"/>
+                </a:solidFill>
+                <a:latin typeface="+mn-lt"/>
+                <a:ea typeface="+mn-ea"/>
+                <a:cs typeface="+mn-cs"/>
+              </a:defRPr>
+            </a:lvl8pPr>
+            <a:lvl9pPr marL="3657509" algn="l" defTabSz="914377" rtl="0" eaLnBrk="1" latinLnBrk="0" hangingPunct="1">
+              <a:defRPr sz="1800" kern="1200">
+                <a:solidFill>
+                  <a:schemeClr val="lt1"/>
+                </a:solidFill>
+                <a:latin typeface="+mn-lt"/>
+                <a:ea typeface="+mn-ea"/>
+                <a:cs typeface="+mn-cs"/>
+              </a:defRPr>
+            </a:lvl9pPr>
+          </a:lstStyle>
+          <a:p>
+            <a:pPr algn="ctr"/>
+            <a:r>
+              <a:rPr lang="en-US" sz="1200" dirty="0" err="1">
+                <a:solidFill>
+                  <a:schemeClr val="bg1"/>
+                </a:solidFill>
+              </a:rPr>
+              <a:t>vg_drawing_bvi.h</a:t>
+            </a:r>
+            <a:endParaRPr lang="en-US" sz="1200" dirty="0">
+              <a:solidFill>
+                <a:schemeClr val="bg1"/>
+              </a:solidFill>
+            </a:endParaRPr>
+          </a:p>
+        </p:txBody>
+      </p:sp>
     </p:spTree>
     <p:extLst>
       <p:ext uri="{BB962C8B-B14F-4D97-AF65-F5344CB8AC3E}">

</xml_diff>